<commit_message>
Update CO2 hunters slides
</commit_message>
<xml_diff>
--- a/outreach/games/CO2-hunters/CO2-hunters_slides.pptx
+++ b/outreach/games/CO2-hunters/CO2-hunters_slides.pptx
@@ -123,7 +123,7 @@
 <file path=ppt/revisionInfo.xml><?xml version="1.0" encoding="utf-8"?>
 <p1510:revInfo xmlns:a="http://schemas.openxmlformats.org/drawingml/2006/main" xmlns:r="http://schemas.openxmlformats.org/officeDocument/2006/relationships" xmlns:p1510="http://schemas.microsoft.com/office/powerpoint/2015/10/main">
   <p1510:revLst>
-    <p1510:client id="{B1DEC7C1-F3B5-4439-A997-04211256670D}" v="152" dt="2023-11-29T00:03:39.637"/>
+    <p1510:client id="{51143CCF-75BA-4DA2-8285-2D5EBD2C5F7F}" v="7" dt="2025-12-11T12:47:44.550"/>
   </p1510:revLst>
 </p1510:revInfo>
 </file>
@@ -131,3022 +131,123 @@
 <file path=ppt/changesInfos/changesInfo1.xml><?xml version="1.0" encoding="utf-8"?>
 <pc:chgInfo xmlns:a="http://schemas.openxmlformats.org/drawingml/2006/main" xmlns:r="http://schemas.openxmlformats.org/officeDocument/2006/relationships" xmlns:ac="http://schemas.microsoft.com/office/drawing/2013/main/command" xmlns:pc="http://schemas.microsoft.com/office/powerpoint/2013/main/command">
   <pc:docChgLst>
-    <pc:chgData name="Federico  Dattila" userId="3fbddd6b-c98a-4780-9364-b5d8323ec50d" providerId="ADAL" clId="{B1DEC7C1-F3B5-4439-A997-04211256670D}"/>
-    <pc:docChg chg="undo custSel addSld modSld sldOrd">
-      <pc:chgData name="Federico  Dattila" userId="3fbddd6b-c98a-4780-9364-b5d8323ec50d" providerId="ADAL" clId="{B1DEC7C1-F3B5-4439-A997-04211256670D}" dt="2023-11-29T00:11:21.570" v="1891" actId="20577"/>
+    <pc:chgData name="Federico  Dattila" userId="3fbddd6b-c98a-4780-9364-b5d8323ec50d" providerId="ADAL" clId="{74B85A1C-3F89-447F-BB10-160DA5B5EB87}"/>
+    <pc:docChg chg="undo custSel modSld">
+      <pc:chgData name="Federico  Dattila" userId="3fbddd6b-c98a-4780-9364-b5d8323ec50d" providerId="ADAL" clId="{74B85A1C-3F89-447F-BB10-160DA5B5EB87}" dt="2025-12-11T12:47:56.527" v="406" actId="404"/>
       <pc:docMkLst>
         <pc:docMk/>
       </pc:docMkLst>
       <pc:sldChg chg="addSp delSp modSp mod">
-        <pc:chgData name="Federico  Dattila" userId="3fbddd6b-c98a-4780-9364-b5d8323ec50d" providerId="ADAL" clId="{B1DEC7C1-F3B5-4439-A997-04211256670D}" dt="2023-11-29T00:06:22.092" v="1868" actId="20577"/>
-        <pc:sldMkLst>
-          <pc:docMk/>
-          <pc:sldMk cId="0" sldId="256"/>
-        </pc:sldMkLst>
-        <pc:spChg chg="mod">
-          <ac:chgData name="Federico  Dattila" userId="3fbddd6b-c98a-4780-9364-b5d8323ec50d" providerId="ADAL" clId="{B1DEC7C1-F3B5-4439-A997-04211256670D}" dt="2023-11-28T23:26:43.372" v="2" actId="20577"/>
-          <ac:spMkLst>
-            <pc:docMk/>
-            <pc:sldMk cId="0" sldId="256"/>
-            <ac:spMk id="7" creationId="{09495CBD-24A4-452D-97B2-D96D38B4BC8A}"/>
-          </ac:spMkLst>
-        </pc:spChg>
-        <pc:spChg chg="mod">
-          <ac:chgData name="Federico  Dattila" userId="3fbddd6b-c98a-4780-9364-b5d8323ec50d" providerId="ADAL" clId="{B1DEC7C1-F3B5-4439-A997-04211256670D}" dt="2023-11-29T00:06:22.092" v="1868" actId="20577"/>
-          <ac:spMkLst>
-            <pc:docMk/>
-            <pc:sldMk cId="0" sldId="256"/>
-            <ac:spMk id="9" creationId="{0E91CB7C-6CAE-460B-8B21-F46E73BF512A}"/>
-          </ac:spMkLst>
-        </pc:spChg>
-        <pc:spChg chg="del mod">
-          <ac:chgData name="Federico  Dattila" userId="3fbddd6b-c98a-4780-9364-b5d8323ec50d" providerId="ADAL" clId="{B1DEC7C1-F3B5-4439-A997-04211256670D}" dt="2023-11-28T23:27:36.646" v="37" actId="478"/>
-          <ac:spMkLst>
-            <pc:docMk/>
-            <pc:sldMk cId="0" sldId="256"/>
-            <ac:spMk id="15" creationId="{F0F9B711-3D18-F05F-84AA-236A571E2CAA}"/>
-          </ac:spMkLst>
-        </pc:spChg>
-        <pc:picChg chg="add mod">
-          <ac:chgData name="Federico  Dattila" userId="3fbddd6b-c98a-4780-9364-b5d8323ec50d" providerId="ADAL" clId="{B1DEC7C1-F3B5-4439-A997-04211256670D}" dt="2023-11-28T23:27:53.848" v="53" actId="1038"/>
-          <ac:picMkLst>
-            <pc:docMk/>
-            <pc:sldMk cId="0" sldId="256"/>
-            <ac:picMk id="6" creationId="{5A9EBB29-2541-EEB0-5018-08BE0267B466}"/>
-          </ac:picMkLst>
-        </pc:picChg>
-        <pc:picChg chg="del">
-          <ac:chgData name="Federico  Dattila" userId="3fbddd6b-c98a-4780-9364-b5d8323ec50d" providerId="ADAL" clId="{B1DEC7C1-F3B5-4439-A997-04211256670D}" dt="2023-11-28T23:27:44.670" v="39" actId="478"/>
-          <ac:picMkLst>
-            <pc:docMk/>
-            <pc:sldMk cId="0" sldId="256"/>
-            <ac:picMk id="13" creationId="{F777CB90-DFF1-033B-E16B-010AA6667ED1}"/>
-          </ac:picMkLst>
-        </pc:picChg>
-      </pc:sldChg>
-      <pc:sldChg chg="addSp modSp mod">
-        <pc:chgData name="Federico  Dattila" userId="3fbddd6b-c98a-4780-9364-b5d8323ec50d" providerId="ADAL" clId="{B1DEC7C1-F3B5-4439-A997-04211256670D}" dt="2023-11-28T23:57:54.541" v="1423" actId="20577"/>
-        <pc:sldMkLst>
-          <pc:docMk/>
-          <pc:sldMk cId="0" sldId="279"/>
-        </pc:sldMkLst>
-        <pc:spChg chg="add mod">
-          <ac:chgData name="Federico  Dattila" userId="3fbddd6b-c98a-4780-9364-b5d8323ec50d" providerId="ADAL" clId="{B1DEC7C1-F3B5-4439-A997-04211256670D}" dt="2023-11-28T23:57:54.541" v="1423" actId="20577"/>
-          <ac:spMkLst>
-            <pc:docMk/>
-            <pc:sldMk cId="0" sldId="279"/>
-            <ac:spMk id="5" creationId="{C950CD94-6872-FB95-6A8E-7E5F8FED3660}"/>
-          </ac:spMkLst>
-        </pc:spChg>
-      </pc:sldChg>
-      <pc:sldChg chg="addSp modSp mod">
-        <pc:chgData name="Federico  Dattila" userId="3fbddd6b-c98a-4780-9364-b5d8323ec50d" providerId="ADAL" clId="{B1DEC7C1-F3B5-4439-A997-04211256670D}" dt="2023-11-28T23:58:19.847" v="1425" actId="20577"/>
-        <pc:sldMkLst>
-          <pc:docMk/>
-          <pc:sldMk cId="0" sldId="299"/>
-        </pc:sldMkLst>
-        <pc:spChg chg="add mod">
-          <ac:chgData name="Federico  Dattila" userId="3fbddd6b-c98a-4780-9364-b5d8323ec50d" providerId="ADAL" clId="{B1DEC7C1-F3B5-4439-A997-04211256670D}" dt="2023-11-28T23:58:19.847" v="1425" actId="20577"/>
-          <ac:spMkLst>
-            <pc:docMk/>
-            <pc:sldMk cId="0" sldId="299"/>
-            <ac:spMk id="2" creationId="{59E1F54E-15D8-0BC4-D81C-06A2DDE5D96E}"/>
-          </ac:spMkLst>
-        </pc:spChg>
-      </pc:sldChg>
-      <pc:sldChg chg="modSp add mod setBg">
-        <pc:chgData name="Federico  Dattila" userId="3fbddd6b-c98a-4780-9364-b5d8323ec50d" providerId="ADAL" clId="{B1DEC7C1-F3B5-4439-A997-04211256670D}" dt="2023-11-28T23:49:28.055" v="1291" actId="1036"/>
-        <pc:sldMkLst>
-          <pc:docMk/>
-          <pc:sldMk cId="1094622440" sldId="302"/>
-        </pc:sldMkLst>
-        <pc:spChg chg="mod">
-          <ac:chgData name="Federico  Dattila" userId="3fbddd6b-c98a-4780-9364-b5d8323ec50d" providerId="ADAL" clId="{B1DEC7C1-F3B5-4439-A997-04211256670D}" dt="2023-11-28T23:49:28.055" v="1291" actId="1036"/>
-          <ac:spMkLst>
-            <pc:docMk/>
-            <pc:sldMk cId="1094622440" sldId="302"/>
-            <ac:spMk id="123" creationId="{00000000-0000-0000-0000-000000000000}"/>
-          </ac:spMkLst>
-        </pc:spChg>
-        <pc:spChg chg="mod">
-          <ac:chgData name="Federico  Dattila" userId="3fbddd6b-c98a-4780-9364-b5d8323ec50d" providerId="ADAL" clId="{B1DEC7C1-F3B5-4439-A997-04211256670D}" dt="2023-11-28T23:49:12.304" v="1284" actId="5793"/>
-          <ac:spMkLst>
-            <pc:docMk/>
-            <pc:sldMk cId="1094622440" sldId="302"/>
-            <ac:spMk id="124" creationId="{00000000-0000-0000-0000-000000000000}"/>
-          </ac:spMkLst>
-        </pc:spChg>
-      </pc:sldChg>
-      <pc:sldChg chg="modSp add mod">
-        <pc:chgData name="Federico  Dattila" userId="3fbddd6b-c98a-4780-9364-b5d8323ec50d" providerId="ADAL" clId="{B1DEC7C1-F3B5-4439-A997-04211256670D}" dt="2023-11-28T23:45:44.578" v="1118" actId="255"/>
-        <pc:sldMkLst>
-          <pc:docMk/>
-          <pc:sldMk cId="1844760682" sldId="303"/>
-        </pc:sldMkLst>
-        <pc:spChg chg="mod">
-          <ac:chgData name="Federico  Dattila" userId="3fbddd6b-c98a-4780-9364-b5d8323ec50d" providerId="ADAL" clId="{B1DEC7C1-F3B5-4439-A997-04211256670D}" dt="2023-11-28T23:45:44.578" v="1118" actId="255"/>
-          <ac:spMkLst>
-            <pc:docMk/>
-            <pc:sldMk cId="1844760682" sldId="303"/>
-            <ac:spMk id="8" creationId="{D5773A0C-24C6-4AF3-9C91-C64DD001EBDA}"/>
-          </ac:spMkLst>
-        </pc:spChg>
-        <pc:spChg chg="mod">
-          <ac:chgData name="Federico  Dattila" userId="3fbddd6b-c98a-4780-9364-b5d8323ec50d" providerId="ADAL" clId="{B1DEC7C1-F3B5-4439-A997-04211256670D}" dt="2023-11-28T23:45:28.085" v="1113" actId="255"/>
-          <ac:spMkLst>
-            <pc:docMk/>
-            <pc:sldMk cId="1844760682" sldId="303"/>
-            <ac:spMk id="103" creationId="{00000000-0000-0000-0000-000000000000}"/>
-          </ac:spMkLst>
-        </pc:spChg>
-      </pc:sldChg>
-      <pc:sldChg chg="modSp add mod modAnim">
-        <pc:chgData name="Federico  Dattila" userId="3fbddd6b-c98a-4780-9364-b5d8323ec50d" providerId="ADAL" clId="{B1DEC7C1-F3B5-4439-A997-04211256670D}" dt="2023-11-28T23:46:15.163" v="1124"/>
-        <pc:sldMkLst>
-          <pc:docMk/>
-          <pc:sldMk cId="1289898536" sldId="305"/>
-        </pc:sldMkLst>
-        <pc:spChg chg="mod">
-          <ac:chgData name="Federico  Dattila" userId="3fbddd6b-c98a-4780-9364-b5d8323ec50d" providerId="ADAL" clId="{B1DEC7C1-F3B5-4439-A997-04211256670D}" dt="2023-11-28T23:46:01.475" v="1122" actId="255"/>
-          <ac:spMkLst>
-            <pc:docMk/>
-            <pc:sldMk cId="1289898536" sldId="305"/>
-            <ac:spMk id="8" creationId="{D5773A0C-24C6-4AF3-9C91-C64DD001EBDA}"/>
-          </ac:spMkLst>
-        </pc:spChg>
-        <pc:spChg chg="mod">
-          <ac:chgData name="Federico  Dattila" userId="3fbddd6b-c98a-4780-9364-b5d8323ec50d" providerId="ADAL" clId="{B1DEC7C1-F3B5-4439-A997-04211256670D}" dt="2023-11-28T23:45:54.099" v="1120" actId="255"/>
-          <ac:spMkLst>
-            <pc:docMk/>
-            <pc:sldMk cId="1289898536" sldId="305"/>
-            <ac:spMk id="103" creationId="{00000000-0000-0000-0000-000000000000}"/>
-          </ac:spMkLst>
-        </pc:spChg>
-      </pc:sldChg>
-      <pc:sldChg chg="addSp delSp modSp add mod">
-        <pc:chgData name="Federico  Dattila" userId="3fbddd6b-c98a-4780-9364-b5d8323ec50d" providerId="ADAL" clId="{B1DEC7C1-F3B5-4439-A997-04211256670D}" dt="2023-11-28T23:47:03.575" v="1198" actId="2711"/>
-        <pc:sldMkLst>
-          <pc:docMk/>
-          <pc:sldMk cId="999233334" sldId="309"/>
-        </pc:sldMkLst>
-        <pc:spChg chg="add mod">
-          <ac:chgData name="Federico  Dattila" userId="3fbddd6b-c98a-4780-9364-b5d8323ec50d" providerId="ADAL" clId="{B1DEC7C1-F3B5-4439-A997-04211256670D}" dt="2023-11-28T23:46:39.924" v="1142" actId="20577"/>
-          <ac:spMkLst>
-            <pc:docMk/>
-            <pc:sldMk cId="999233334" sldId="309"/>
-            <ac:spMk id="2" creationId="{C333A8A2-D557-8624-E3DC-9B16BACBC00A}"/>
-          </ac:spMkLst>
-        </pc:spChg>
-        <pc:spChg chg="mod">
-          <ac:chgData name="Federico  Dattila" userId="3fbddd6b-c98a-4780-9364-b5d8323ec50d" providerId="ADAL" clId="{B1DEC7C1-F3B5-4439-A997-04211256670D}" dt="2023-11-28T23:47:03.575" v="1198" actId="2711"/>
-          <ac:spMkLst>
-            <pc:docMk/>
-            <pc:sldMk cId="999233334" sldId="309"/>
-            <ac:spMk id="6" creationId="{CFF71B04-5407-4D84-8C25-27F85F690C3E}"/>
-          </ac:spMkLst>
-        </pc:spChg>
-        <pc:spChg chg="del mod">
-          <ac:chgData name="Federico  Dattila" userId="3fbddd6b-c98a-4780-9364-b5d8323ec50d" providerId="ADAL" clId="{B1DEC7C1-F3B5-4439-A997-04211256670D}" dt="2023-11-28T23:46:23.745" v="1125" actId="478"/>
-          <ac:spMkLst>
-            <pc:docMk/>
-            <pc:sldMk cId="999233334" sldId="309"/>
-            <ac:spMk id="103" creationId="{00000000-0000-0000-0000-000000000000}"/>
-          </ac:spMkLst>
-        </pc:spChg>
-      </pc:sldChg>
-      <pc:sldChg chg="addSp delSp modSp add mod ord setBg delAnim modAnim">
-        <pc:chgData name="Federico  Dattila" userId="3fbddd6b-c98a-4780-9364-b5d8323ec50d" providerId="ADAL" clId="{B1DEC7C1-F3B5-4439-A997-04211256670D}" dt="2023-11-28T23:57:16.544" v="1420"/>
-        <pc:sldMkLst>
-          <pc:docMk/>
-          <pc:sldMk cId="169951774" sldId="322"/>
-        </pc:sldMkLst>
-        <pc:spChg chg="add mod">
-          <ac:chgData name="Federico  Dattila" userId="3fbddd6b-c98a-4780-9364-b5d8323ec50d" providerId="ADAL" clId="{B1DEC7C1-F3B5-4439-A997-04211256670D}" dt="2023-11-28T23:43:41.290" v="1085" actId="2711"/>
-          <ac:spMkLst>
-            <pc:docMk/>
-            <pc:sldMk cId="169951774" sldId="322"/>
-            <ac:spMk id="2" creationId="{5DDD212B-406D-84C1-3FC7-E003A99B698C}"/>
-          </ac:spMkLst>
-        </pc:spChg>
-        <pc:spChg chg="mod">
-          <ac:chgData name="Federico  Dattila" userId="3fbddd6b-c98a-4780-9364-b5d8323ec50d" providerId="ADAL" clId="{B1DEC7C1-F3B5-4439-A997-04211256670D}" dt="2023-11-28T23:44:20.552" v="1089" actId="255"/>
-          <ac:spMkLst>
-            <pc:docMk/>
-            <pc:sldMk cId="169951774" sldId="322"/>
-            <ac:spMk id="6" creationId="{FC77390B-0A39-4B9C-A41A-0B7DFBD71BE8}"/>
-          </ac:spMkLst>
-        </pc:spChg>
-        <pc:spChg chg="mod">
-          <ac:chgData name="Federico  Dattila" userId="3fbddd6b-c98a-4780-9364-b5d8323ec50d" providerId="ADAL" clId="{B1DEC7C1-F3B5-4439-A997-04211256670D}" dt="2023-11-28T23:44:25.011" v="1090" actId="1076"/>
-          <ac:spMkLst>
-            <pc:docMk/>
-            <pc:sldMk cId="169951774" sldId="322"/>
-            <ac:spMk id="7" creationId="{EB7A65D7-9DE0-4670-9891-F26A24EDD360}"/>
-          </ac:spMkLst>
-        </pc:spChg>
-        <pc:spChg chg="mod">
-          <ac:chgData name="Federico  Dattila" userId="3fbddd6b-c98a-4780-9364-b5d8323ec50d" providerId="ADAL" clId="{B1DEC7C1-F3B5-4439-A997-04211256670D}" dt="2023-11-28T23:44:27.724" v="1091" actId="1076"/>
-          <ac:spMkLst>
-            <pc:docMk/>
-            <pc:sldMk cId="169951774" sldId="322"/>
-            <ac:spMk id="8" creationId="{AAB6F7FC-2A6C-4B8C-B6AB-16155E3362D6}"/>
-          </ac:spMkLst>
-        </pc:spChg>
-        <pc:spChg chg="mod">
-          <ac:chgData name="Federico  Dattila" userId="3fbddd6b-c98a-4780-9364-b5d8323ec50d" providerId="ADAL" clId="{B1DEC7C1-F3B5-4439-A997-04211256670D}" dt="2023-11-28T23:44:31.043" v="1092" actId="1076"/>
-          <ac:spMkLst>
-            <pc:docMk/>
-            <pc:sldMk cId="169951774" sldId="322"/>
-            <ac:spMk id="9" creationId="{46C1BC34-DA10-44DC-9A7A-847146319010}"/>
-          </ac:spMkLst>
-        </pc:spChg>
-        <pc:spChg chg="mod">
-          <ac:chgData name="Federico  Dattila" userId="3fbddd6b-c98a-4780-9364-b5d8323ec50d" providerId="ADAL" clId="{B1DEC7C1-F3B5-4439-A997-04211256670D}" dt="2023-11-28T23:44:39.885" v="1095" actId="1076"/>
-          <ac:spMkLst>
-            <pc:docMk/>
-            <pc:sldMk cId="169951774" sldId="322"/>
-            <ac:spMk id="10" creationId="{174CF661-F817-47EF-A1EA-3227755C5AB3}"/>
-          </ac:spMkLst>
-        </pc:spChg>
-        <pc:spChg chg="mod">
-          <ac:chgData name="Federico  Dattila" userId="3fbddd6b-c98a-4780-9364-b5d8323ec50d" providerId="ADAL" clId="{B1DEC7C1-F3B5-4439-A997-04211256670D}" dt="2023-11-28T23:44:14.378" v="1088" actId="255"/>
-          <ac:spMkLst>
-            <pc:docMk/>
-            <pc:sldMk cId="169951774" sldId="322"/>
-            <ac:spMk id="17" creationId="{AEB37FB9-8EAD-46E0-B0C4-505E489D1D56}"/>
-          </ac:spMkLst>
-        </pc:spChg>
-        <pc:picChg chg="add mod">
-          <ac:chgData name="Federico  Dattila" userId="3fbddd6b-c98a-4780-9364-b5d8323ec50d" providerId="ADAL" clId="{B1DEC7C1-F3B5-4439-A997-04211256670D}" dt="2023-11-28T23:44:44.786" v="1104" actId="1036"/>
-          <ac:picMkLst>
-            <pc:docMk/>
-            <pc:sldMk cId="169951774" sldId="322"/>
-            <ac:picMk id="3" creationId="{028F1FFF-B680-008C-C68D-CE3D84DC7B36}"/>
-          </ac:picMkLst>
-        </pc:picChg>
-        <pc:picChg chg="add del mod">
-          <ac:chgData name="Federico  Dattila" userId="3fbddd6b-c98a-4780-9364-b5d8323ec50d" providerId="ADAL" clId="{B1DEC7C1-F3B5-4439-A997-04211256670D}" dt="2023-11-28T23:38:18.604" v="720" actId="478"/>
-          <ac:picMkLst>
-            <pc:docMk/>
-            <pc:sldMk cId="169951774" sldId="322"/>
-            <ac:picMk id="4" creationId="{2AE30439-38FD-B633-FBA4-0DE9FBDD154D}"/>
-          </ac:picMkLst>
-        </pc:picChg>
-        <pc:picChg chg="add mod">
-          <ac:chgData name="Federico  Dattila" userId="3fbddd6b-c98a-4780-9364-b5d8323ec50d" providerId="ADAL" clId="{B1DEC7C1-F3B5-4439-A997-04211256670D}" dt="2023-11-28T23:38:16.484" v="719" actId="1076"/>
-          <ac:picMkLst>
-            <pc:docMk/>
-            <pc:sldMk cId="169951774" sldId="322"/>
-            <ac:picMk id="5" creationId="{A75DE19E-BFD8-4967-9EF4-837BE923DE97}"/>
-          </ac:picMkLst>
-        </pc:picChg>
-        <pc:picChg chg="del">
-          <ac:chgData name="Federico  Dattila" userId="3fbddd6b-c98a-4780-9364-b5d8323ec50d" providerId="ADAL" clId="{B1DEC7C1-F3B5-4439-A997-04211256670D}" dt="2023-11-28T23:37:58.057" v="717" actId="478"/>
-          <ac:picMkLst>
-            <pc:docMk/>
-            <pc:sldMk cId="169951774" sldId="322"/>
-            <ac:picMk id="11" creationId="{2D04E01B-C3D0-4B90-9F96-669DBCAF14DA}"/>
-          </ac:picMkLst>
-        </pc:picChg>
-        <pc:picChg chg="add mod">
-          <ac:chgData name="Federico  Dattila" userId="3fbddd6b-c98a-4780-9364-b5d8323ec50d" providerId="ADAL" clId="{B1DEC7C1-F3B5-4439-A997-04211256670D}" dt="2023-11-28T23:38:29.400" v="725" actId="1037"/>
-          <ac:picMkLst>
-            <pc:docMk/>
-            <pc:sldMk cId="169951774" sldId="322"/>
-            <ac:picMk id="12" creationId="{B0A6A536-E330-CCDA-65F1-2925CD698EE5}"/>
-          </ac:picMkLst>
-        </pc:picChg>
-        <pc:picChg chg="del">
-          <ac:chgData name="Federico  Dattila" userId="3fbddd6b-c98a-4780-9364-b5d8323ec50d" providerId="ADAL" clId="{B1DEC7C1-F3B5-4439-A997-04211256670D}" dt="2023-11-28T23:37:58.057" v="717" actId="478"/>
-          <ac:picMkLst>
-            <pc:docMk/>
-            <pc:sldMk cId="169951774" sldId="322"/>
-            <ac:picMk id="13" creationId="{CD5A9FA0-8A97-447F-8E42-8C108D81AE0E}"/>
-          </ac:picMkLst>
-        </pc:picChg>
-        <pc:picChg chg="del">
-          <ac:chgData name="Federico  Dattila" userId="3fbddd6b-c98a-4780-9364-b5d8323ec50d" providerId="ADAL" clId="{B1DEC7C1-F3B5-4439-A997-04211256670D}" dt="2023-11-28T23:37:58.057" v="717" actId="478"/>
-          <ac:picMkLst>
-            <pc:docMk/>
-            <pc:sldMk cId="169951774" sldId="322"/>
-            <ac:picMk id="14" creationId="{CAE03B72-7C3D-4662-9BC0-1A151AA46799}"/>
-          </ac:picMkLst>
-        </pc:picChg>
-        <pc:picChg chg="del">
-          <ac:chgData name="Federico  Dattila" userId="3fbddd6b-c98a-4780-9364-b5d8323ec50d" providerId="ADAL" clId="{B1DEC7C1-F3B5-4439-A997-04211256670D}" dt="2023-11-28T23:37:58.057" v="717" actId="478"/>
-          <ac:picMkLst>
-            <pc:docMk/>
-            <pc:sldMk cId="169951774" sldId="322"/>
-            <ac:picMk id="15" creationId="{B564E72E-BEA8-4027-A0C4-C86D14629D87}"/>
-          </ac:picMkLst>
-        </pc:picChg>
-        <pc:picChg chg="add mod">
-          <ac:chgData name="Federico  Dattila" userId="3fbddd6b-c98a-4780-9364-b5d8323ec50d" providerId="ADAL" clId="{B1DEC7C1-F3B5-4439-A997-04211256670D}" dt="2023-11-28T23:44:32.858" v="1093" actId="1076"/>
-          <ac:picMkLst>
-            <pc:docMk/>
-            <pc:sldMk cId="169951774" sldId="322"/>
-            <ac:picMk id="16" creationId="{83C784F2-14EB-401D-CE6C-8CE86B2AFE0D}"/>
-          </ac:picMkLst>
-        </pc:picChg>
-      </pc:sldChg>
-      <pc:sldChg chg="modSp add mod setBg">
-        <pc:chgData name="Federico  Dattila" userId="3fbddd6b-c98a-4780-9364-b5d8323ec50d" providerId="ADAL" clId="{B1DEC7C1-F3B5-4439-A997-04211256670D}" dt="2023-11-28T23:45:20.931" v="1111" actId="255"/>
-        <pc:sldMkLst>
-          <pc:docMk/>
-          <pc:sldMk cId="0" sldId="361"/>
-        </pc:sldMkLst>
-        <pc:spChg chg="mod">
-          <ac:chgData name="Federico  Dattila" userId="3fbddd6b-c98a-4780-9364-b5d8323ec50d" providerId="ADAL" clId="{B1DEC7C1-F3B5-4439-A997-04211256670D}" dt="2023-11-28T23:45:20.931" v="1111" actId="255"/>
-          <ac:spMkLst>
-            <pc:docMk/>
-            <pc:sldMk cId="0" sldId="361"/>
-            <ac:spMk id="8" creationId="{D5773A0C-24C6-4AF3-9C91-C64DD001EBDA}"/>
-          </ac:spMkLst>
-        </pc:spChg>
-        <pc:spChg chg="mod">
-          <ac:chgData name="Federico  Dattila" userId="3fbddd6b-c98a-4780-9364-b5d8323ec50d" providerId="ADAL" clId="{B1DEC7C1-F3B5-4439-A997-04211256670D}" dt="2023-11-28T23:45:17.233" v="1110" actId="255"/>
-          <ac:spMkLst>
-            <pc:docMk/>
-            <pc:sldMk cId="0" sldId="361"/>
-            <ac:spMk id="103" creationId="{00000000-0000-0000-0000-000000000000}"/>
-          </ac:spMkLst>
-        </pc:spChg>
-      </pc:sldChg>
-      <pc:sldChg chg="addSp modSp mod modAnim">
-        <pc:chgData name="Federico  Dattila" userId="3fbddd6b-c98a-4780-9364-b5d8323ec50d" providerId="ADAL" clId="{B1DEC7C1-F3B5-4439-A997-04211256670D}" dt="2023-11-28T23:48:30.998" v="1254"/>
-        <pc:sldMkLst>
-          <pc:docMk/>
-          <pc:sldMk cId="3491877896" sldId="363"/>
-        </pc:sldMkLst>
-        <pc:spChg chg="add mod">
-          <ac:chgData name="Federico  Dattila" userId="3fbddd6b-c98a-4780-9364-b5d8323ec50d" providerId="ADAL" clId="{B1DEC7C1-F3B5-4439-A997-04211256670D}" dt="2023-11-28T23:48:26.340" v="1253" actId="20577"/>
-          <ac:spMkLst>
-            <pc:docMk/>
-            <pc:sldMk cId="3491877896" sldId="363"/>
-            <ac:spMk id="2" creationId="{A2951918-A7CC-360D-A05D-99EFDFE002D6}"/>
-          </ac:spMkLst>
-        </pc:spChg>
-      </pc:sldChg>
-      <pc:sldChg chg="addSp modSp mod">
-        <pc:chgData name="Federico  Dattila" userId="3fbddd6b-c98a-4780-9364-b5d8323ec50d" providerId="ADAL" clId="{B1DEC7C1-F3B5-4439-A997-04211256670D}" dt="2023-11-28T23:50:24.407" v="1300" actId="1036"/>
-        <pc:sldMkLst>
-          <pc:docMk/>
-          <pc:sldMk cId="1678568122" sldId="364"/>
-        </pc:sldMkLst>
-        <pc:picChg chg="add mod">
-          <ac:chgData name="Federico  Dattila" userId="3fbddd6b-c98a-4780-9364-b5d8323ec50d" providerId="ADAL" clId="{B1DEC7C1-F3B5-4439-A997-04211256670D}" dt="2023-11-28T23:50:24.407" v="1300" actId="1036"/>
-          <ac:picMkLst>
-            <pc:docMk/>
-            <pc:sldMk cId="1678568122" sldId="364"/>
-            <ac:picMk id="2" creationId="{076CD40E-4599-E1A2-B138-5F6CD0807E1C}"/>
-          </ac:picMkLst>
-        </pc:picChg>
-      </pc:sldChg>
-      <pc:sldChg chg="modSp mod">
-        <pc:chgData name="Federico  Dattila" userId="3fbddd6b-c98a-4780-9364-b5d8323ec50d" providerId="ADAL" clId="{B1DEC7C1-F3B5-4439-A997-04211256670D}" dt="2023-11-29T00:11:21.570" v="1891" actId="20577"/>
-        <pc:sldMkLst>
-          <pc:docMk/>
-          <pc:sldMk cId="3975943769" sldId="366"/>
-        </pc:sldMkLst>
-        <pc:spChg chg="mod">
-          <ac:chgData name="Federico  Dattila" userId="3fbddd6b-c98a-4780-9364-b5d8323ec50d" providerId="ADAL" clId="{B1DEC7C1-F3B5-4439-A997-04211256670D}" dt="2023-11-29T00:11:21.570" v="1891" actId="20577"/>
-          <ac:spMkLst>
-            <pc:docMk/>
-            <pc:sldMk cId="3975943769" sldId="366"/>
-            <ac:spMk id="15" creationId="{F0F9B711-3D18-F05F-84AA-236A571E2CAA}"/>
-          </ac:spMkLst>
-        </pc:spChg>
-      </pc:sldChg>
-      <pc:sldChg chg="modSp mod">
-        <pc:chgData name="Federico  Dattila" userId="3fbddd6b-c98a-4780-9364-b5d8323ec50d" providerId="ADAL" clId="{B1DEC7C1-F3B5-4439-A997-04211256670D}" dt="2023-11-28T23:54:14.983" v="1368" actId="20577"/>
-        <pc:sldMkLst>
-          <pc:docMk/>
-          <pc:sldMk cId="1908972765" sldId="367"/>
-        </pc:sldMkLst>
-        <pc:spChg chg="mod">
-          <ac:chgData name="Federico  Dattila" userId="3fbddd6b-c98a-4780-9364-b5d8323ec50d" providerId="ADAL" clId="{B1DEC7C1-F3B5-4439-A997-04211256670D}" dt="2023-11-28T23:54:14.983" v="1368" actId="20577"/>
-          <ac:spMkLst>
-            <pc:docMk/>
-            <pc:sldMk cId="1908972765" sldId="367"/>
-            <ac:spMk id="14" creationId="{8652BF97-302F-BD33-D092-00C827BF2E07}"/>
-          </ac:spMkLst>
-        </pc:spChg>
-      </pc:sldChg>
-      <pc:sldChg chg="addSp delSp modSp new mod setBg">
-        <pc:chgData name="Federico  Dattila" userId="3fbddd6b-c98a-4780-9364-b5d8323ec50d" providerId="ADAL" clId="{B1DEC7C1-F3B5-4439-A997-04211256670D}" dt="2023-11-29T00:06:33.649" v="1869" actId="6549"/>
-        <pc:sldMkLst>
-          <pc:docMk/>
-          <pc:sldMk cId="3731632374" sldId="368"/>
-        </pc:sldMkLst>
-        <pc:spChg chg="del">
-          <ac:chgData name="Federico  Dattila" userId="3fbddd6b-c98a-4780-9364-b5d8323ec50d" providerId="ADAL" clId="{B1DEC7C1-F3B5-4439-A997-04211256670D}" dt="2023-11-28T23:30:51.227" v="93" actId="478"/>
-          <ac:spMkLst>
-            <pc:docMk/>
-            <pc:sldMk cId="3731632374" sldId="368"/>
-            <ac:spMk id="2" creationId="{22DFC74F-C423-BC9E-CED1-8AADB37B8A04}"/>
-          </ac:spMkLst>
-        </pc:spChg>
-        <pc:spChg chg="del">
-          <ac:chgData name="Federico  Dattila" userId="3fbddd6b-c98a-4780-9364-b5d8323ec50d" providerId="ADAL" clId="{B1DEC7C1-F3B5-4439-A997-04211256670D}" dt="2023-11-28T23:30:52.509" v="94" actId="478"/>
-          <ac:spMkLst>
-            <pc:docMk/>
-            <pc:sldMk cId="3731632374" sldId="368"/>
-            <ac:spMk id="3" creationId="{7FDB4D06-9055-B96C-2B8C-F5807342511E}"/>
-          </ac:spMkLst>
-        </pc:spChg>
-        <pc:spChg chg="add mod">
-          <ac:chgData name="Federico  Dattila" userId="3fbddd6b-c98a-4780-9364-b5d8323ec50d" providerId="ADAL" clId="{B1DEC7C1-F3B5-4439-A997-04211256670D}" dt="2023-11-28T23:55:56.956" v="1414" actId="20577"/>
-          <ac:spMkLst>
-            <pc:docMk/>
-            <pc:sldMk cId="3731632374" sldId="368"/>
-            <ac:spMk id="4" creationId="{601C0699-0117-19A9-00D3-BB53568D8090}"/>
-          </ac:spMkLst>
-        </pc:spChg>
-        <pc:spChg chg="add mod">
-          <ac:chgData name="Federico  Dattila" userId="3fbddd6b-c98a-4780-9364-b5d8323ec50d" providerId="ADAL" clId="{B1DEC7C1-F3B5-4439-A997-04211256670D}" dt="2023-11-29T00:06:33.649" v="1869" actId="6549"/>
-          <ac:spMkLst>
-            <pc:docMk/>
-            <pc:sldMk cId="3731632374" sldId="368"/>
-            <ac:spMk id="5" creationId="{E6F78F90-79BE-DC5E-8E9E-76D0A2299A95}"/>
-          </ac:spMkLst>
-        </pc:spChg>
-      </pc:sldChg>
-      <pc:sldChg chg="addSp delSp modSp add mod setBg modAnim">
-        <pc:chgData name="Federico  Dattila" userId="3fbddd6b-c98a-4780-9364-b5d8323ec50d" providerId="ADAL" clId="{B1DEC7C1-F3B5-4439-A997-04211256670D}" dt="2023-11-28T23:56:36.204" v="1419" actId="20577"/>
-        <pc:sldMkLst>
-          <pc:docMk/>
-          <pc:sldMk cId="3913350342" sldId="369"/>
-        </pc:sldMkLst>
-        <pc:spChg chg="del">
-          <ac:chgData name="Federico  Dattila" userId="3fbddd6b-c98a-4780-9364-b5d8323ec50d" providerId="ADAL" clId="{B1DEC7C1-F3B5-4439-A997-04211256670D}" dt="2023-11-28T23:33:42.503" v="483" actId="478"/>
-          <ac:spMkLst>
-            <pc:docMk/>
-            <pc:sldMk cId="3913350342" sldId="369"/>
-            <ac:spMk id="4" creationId="{601C0699-0117-19A9-00D3-BB53568D8090}"/>
-          </ac:spMkLst>
-        </pc:spChg>
-        <pc:spChg chg="del">
-          <ac:chgData name="Federico  Dattila" userId="3fbddd6b-c98a-4780-9364-b5d8323ec50d" providerId="ADAL" clId="{B1DEC7C1-F3B5-4439-A997-04211256670D}" dt="2023-11-28T23:33:42.503" v="483" actId="478"/>
-          <ac:spMkLst>
-            <pc:docMk/>
-            <pc:sldMk cId="3913350342" sldId="369"/>
-            <ac:spMk id="5" creationId="{E6F78F90-79BE-DC5E-8E9E-76D0A2299A95}"/>
-          </ac:spMkLst>
-        </pc:spChg>
-        <pc:spChg chg="add mod">
-          <ac:chgData name="Federico  Dattila" userId="3fbddd6b-c98a-4780-9364-b5d8323ec50d" providerId="ADAL" clId="{B1DEC7C1-F3B5-4439-A997-04211256670D}" dt="2023-11-28T23:43:19.096" v="1084" actId="2711"/>
-          <ac:spMkLst>
-            <pc:docMk/>
-            <pc:sldMk cId="3913350342" sldId="369"/>
-            <ac:spMk id="9" creationId="{B30CAC51-9EDA-3EA0-701F-0BF390E20868}"/>
-          </ac:spMkLst>
-        </pc:spChg>
-        <pc:spChg chg="add mod">
-          <ac:chgData name="Federico  Dattila" userId="3fbddd6b-c98a-4780-9364-b5d8323ec50d" providerId="ADAL" clId="{B1DEC7C1-F3B5-4439-A997-04211256670D}" dt="2023-11-28T23:43:19.096" v="1084" actId="2711"/>
-          <ac:spMkLst>
-            <pc:docMk/>
-            <pc:sldMk cId="3913350342" sldId="369"/>
-            <ac:spMk id="10" creationId="{39815D49-D248-E015-52C3-A94DBADFD2BE}"/>
-          </ac:spMkLst>
-        </pc:spChg>
-        <pc:spChg chg="add mod">
-          <ac:chgData name="Federico  Dattila" userId="3fbddd6b-c98a-4780-9364-b5d8323ec50d" providerId="ADAL" clId="{B1DEC7C1-F3B5-4439-A997-04211256670D}" dt="2023-11-28T23:43:19.096" v="1084" actId="2711"/>
-          <ac:spMkLst>
-            <pc:docMk/>
-            <pc:sldMk cId="3913350342" sldId="369"/>
-            <ac:spMk id="11" creationId="{F5314883-5BD2-0E4C-21F1-D3D5C8722B5E}"/>
-          </ac:spMkLst>
-        </pc:spChg>
-        <pc:spChg chg="add mod">
-          <ac:chgData name="Federico  Dattila" userId="3fbddd6b-c98a-4780-9364-b5d8323ec50d" providerId="ADAL" clId="{B1DEC7C1-F3B5-4439-A997-04211256670D}" dt="2023-11-28T23:43:19.096" v="1084" actId="2711"/>
-          <ac:spMkLst>
-            <pc:docMk/>
-            <pc:sldMk cId="3913350342" sldId="369"/>
-            <ac:spMk id="12" creationId="{BB52A679-6023-A536-4722-D8F5E1BA43C1}"/>
-          </ac:spMkLst>
-        </pc:spChg>
-        <pc:spChg chg="add mod">
-          <ac:chgData name="Federico  Dattila" userId="3fbddd6b-c98a-4780-9364-b5d8323ec50d" providerId="ADAL" clId="{B1DEC7C1-F3B5-4439-A997-04211256670D}" dt="2023-11-28T23:56:36.204" v="1419" actId="20577"/>
-          <ac:spMkLst>
-            <pc:docMk/>
-            <pc:sldMk cId="3913350342" sldId="369"/>
-            <ac:spMk id="13" creationId="{22CED037-81D7-99CA-CAFA-16852DE0D555}"/>
-          </ac:spMkLst>
-        </pc:spChg>
-        <pc:spChg chg="add mod">
-          <ac:chgData name="Federico  Dattila" userId="3fbddd6b-c98a-4780-9364-b5d8323ec50d" providerId="ADAL" clId="{B1DEC7C1-F3B5-4439-A997-04211256670D}" dt="2023-11-28T23:43:19.096" v="1084" actId="2711"/>
-          <ac:spMkLst>
-            <pc:docMk/>
-            <pc:sldMk cId="3913350342" sldId="369"/>
-            <ac:spMk id="14" creationId="{874C9E29-3DE1-0FF7-ACF6-52C3185974E9}"/>
-          </ac:spMkLst>
-        </pc:spChg>
-        <pc:spChg chg="add mod">
-          <ac:chgData name="Federico  Dattila" userId="3fbddd6b-c98a-4780-9364-b5d8323ec50d" providerId="ADAL" clId="{B1DEC7C1-F3B5-4439-A997-04211256670D}" dt="2023-11-28T23:43:19.096" v="1084" actId="2711"/>
-          <ac:spMkLst>
-            <pc:docMk/>
-            <pc:sldMk cId="3913350342" sldId="369"/>
-            <ac:spMk id="15" creationId="{811FBFD4-5B6D-D74E-D7B6-A5FD32799421}"/>
-          </ac:spMkLst>
-        </pc:spChg>
-        <pc:spChg chg="add mod">
-          <ac:chgData name="Federico  Dattila" userId="3fbddd6b-c98a-4780-9364-b5d8323ec50d" providerId="ADAL" clId="{B1DEC7C1-F3B5-4439-A997-04211256670D}" dt="2023-11-28T23:43:19.096" v="1084" actId="2711"/>
-          <ac:spMkLst>
-            <pc:docMk/>
-            <pc:sldMk cId="3913350342" sldId="369"/>
-            <ac:spMk id="16" creationId="{3014EC14-6837-2AB8-6151-52190A7AC60B}"/>
-          </ac:spMkLst>
-        </pc:spChg>
-        <pc:spChg chg="add mod">
-          <ac:chgData name="Federico  Dattila" userId="3fbddd6b-c98a-4780-9364-b5d8323ec50d" providerId="ADAL" clId="{B1DEC7C1-F3B5-4439-A997-04211256670D}" dt="2023-11-28T23:43:19.096" v="1084" actId="2711"/>
-          <ac:spMkLst>
-            <pc:docMk/>
-            <pc:sldMk cId="3913350342" sldId="369"/>
-            <ac:spMk id="17" creationId="{BD8C1E89-6E22-CC3C-CBBE-BDD0CA73FC59}"/>
-          </ac:spMkLst>
-        </pc:spChg>
-        <pc:spChg chg="add mod">
-          <ac:chgData name="Federico  Dattila" userId="3fbddd6b-c98a-4780-9364-b5d8323ec50d" providerId="ADAL" clId="{B1DEC7C1-F3B5-4439-A997-04211256670D}" dt="2023-11-28T23:47:46.524" v="1225" actId="1038"/>
-          <ac:spMkLst>
-            <pc:docMk/>
-            <pc:sldMk cId="3913350342" sldId="369"/>
-            <ac:spMk id="18" creationId="{9750B0FA-9F2F-6398-5F51-3E5904DB166E}"/>
-          </ac:spMkLst>
-        </pc:spChg>
-        <pc:spChg chg="add mod">
-          <ac:chgData name="Federico  Dattila" userId="3fbddd6b-c98a-4780-9364-b5d8323ec50d" providerId="ADAL" clId="{B1DEC7C1-F3B5-4439-A997-04211256670D}" dt="2023-11-28T23:47:51.019" v="1249" actId="1038"/>
-          <ac:spMkLst>
-            <pc:docMk/>
-            <pc:sldMk cId="3913350342" sldId="369"/>
-            <ac:spMk id="19" creationId="{C59518ED-2884-6AFA-9735-EAB680A8885E}"/>
-          </ac:spMkLst>
-        </pc:spChg>
-        <pc:picChg chg="add mod">
-          <ac:chgData name="Federico  Dattila" userId="3fbddd6b-c98a-4780-9364-b5d8323ec50d" providerId="ADAL" clId="{B1DEC7C1-F3B5-4439-A997-04211256670D}" dt="2023-11-28T23:34:47.871" v="502" actId="14100"/>
-          <ac:picMkLst>
-            <pc:docMk/>
-            <pc:sldMk cId="3913350342" sldId="369"/>
-            <ac:picMk id="2" creationId="{2912A5A4-4B49-5C55-1F0C-E228DE74D218}"/>
-          </ac:picMkLst>
-        </pc:picChg>
-        <pc:picChg chg="add mod">
-          <ac:chgData name="Federico  Dattila" userId="3fbddd6b-c98a-4780-9364-b5d8323ec50d" providerId="ADAL" clId="{B1DEC7C1-F3B5-4439-A997-04211256670D}" dt="2023-11-28T23:34:54.434" v="523" actId="1037"/>
-          <ac:picMkLst>
-            <pc:docMk/>
-            <pc:sldMk cId="3913350342" sldId="369"/>
-            <ac:picMk id="3" creationId="{466BD96F-5DC6-6129-494B-3942496ED5B1}"/>
-          </ac:picMkLst>
-        </pc:picChg>
-        <pc:picChg chg="add mod">
-          <ac:chgData name="Federico  Dattila" userId="3fbddd6b-c98a-4780-9364-b5d8323ec50d" providerId="ADAL" clId="{B1DEC7C1-F3B5-4439-A997-04211256670D}" dt="2023-11-28T23:37:00.734" v="681" actId="14100"/>
-          <ac:picMkLst>
-            <pc:docMk/>
-            <pc:sldMk cId="3913350342" sldId="369"/>
-            <ac:picMk id="6" creationId="{1C596ECA-A020-83F3-3D3F-D40799DFF332}"/>
-          </ac:picMkLst>
-        </pc:picChg>
-        <pc:picChg chg="add mod">
-          <ac:chgData name="Federico  Dattila" userId="3fbddd6b-c98a-4780-9364-b5d8323ec50d" providerId="ADAL" clId="{B1DEC7C1-F3B5-4439-A997-04211256670D}" dt="2023-11-28T23:36:56.361" v="679" actId="14100"/>
-          <ac:picMkLst>
-            <pc:docMk/>
-            <pc:sldMk cId="3913350342" sldId="369"/>
-            <ac:picMk id="7" creationId="{C96951E8-8182-EF61-7A51-02FF6B0F718B}"/>
-          </ac:picMkLst>
-        </pc:picChg>
-        <pc:picChg chg="add mod">
-          <ac:chgData name="Federico  Dattila" userId="3fbddd6b-c98a-4780-9364-b5d8323ec50d" providerId="ADAL" clId="{B1DEC7C1-F3B5-4439-A997-04211256670D}" dt="2023-11-28T23:36:58.269" v="680" actId="14100"/>
-          <ac:picMkLst>
-            <pc:docMk/>
-            <pc:sldMk cId="3913350342" sldId="369"/>
-            <ac:picMk id="8" creationId="{B72B1C91-947D-B0F3-4086-1A6FA99FD3C0}"/>
-          </ac:picMkLst>
-        </pc:picChg>
-        <pc:picChg chg="add mod">
-          <ac:chgData name="Federico  Dattila" userId="3fbddd6b-c98a-4780-9364-b5d8323ec50d" providerId="ADAL" clId="{B1DEC7C1-F3B5-4439-A997-04211256670D}" dt="2023-11-28T23:34:41.955" v="500" actId="571"/>
-          <ac:picMkLst>
-            <pc:docMk/>
-            <pc:sldMk cId="3913350342" sldId="369"/>
-            <ac:picMk id="20" creationId="{1F0868B9-D088-972C-D66F-EEB31AE3D998}"/>
-          </ac:picMkLst>
-        </pc:picChg>
-        <pc:picChg chg="add mod">
-          <ac:chgData name="Federico  Dattila" userId="3fbddd6b-c98a-4780-9364-b5d8323ec50d" providerId="ADAL" clId="{B1DEC7C1-F3B5-4439-A997-04211256670D}" dt="2023-11-28T23:34:41.955" v="500" actId="571"/>
-          <ac:picMkLst>
-            <pc:docMk/>
-            <pc:sldMk cId="3913350342" sldId="369"/>
-            <ac:picMk id="21" creationId="{71DF2A1E-A9CC-72E6-F046-9BB2BE6C3A4D}"/>
-          </ac:picMkLst>
-        </pc:picChg>
-      </pc:sldChg>
-      <pc:sldChg chg="addSp delSp modSp add mod">
-        <pc:chgData name="Federico  Dattila" userId="3fbddd6b-c98a-4780-9364-b5d8323ec50d" providerId="ADAL" clId="{B1DEC7C1-F3B5-4439-A997-04211256670D}" dt="2023-11-28T23:53:36.132" v="1365"/>
-        <pc:sldMkLst>
-          <pc:docMk/>
-          <pc:sldMk cId="1384361792" sldId="370"/>
-        </pc:sldMkLst>
-        <pc:spChg chg="del">
-          <ac:chgData name="Federico  Dattila" userId="3fbddd6b-c98a-4780-9364-b5d8323ec50d" providerId="ADAL" clId="{B1DEC7C1-F3B5-4439-A997-04211256670D}" dt="2023-11-28T23:51:05.188" v="1325" actId="478"/>
-          <ac:spMkLst>
-            <pc:docMk/>
-            <pc:sldMk cId="1384361792" sldId="370"/>
-            <ac:spMk id="10" creationId="{D5EC3236-1AF1-036D-BDA9-7C4299D10EC9}"/>
-          </ac:spMkLst>
-        </pc:spChg>
-        <pc:spChg chg="del">
-          <ac:chgData name="Federico  Dattila" userId="3fbddd6b-c98a-4780-9364-b5d8323ec50d" providerId="ADAL" clId="{B1DEC7C1-F3B5-4439-A997-04211256670D}" dt="2023-11-28T23:51:05.188" v="1325" actId="478"/>
-          <ac:spMkLst>
-            <pc:docMk/>
-            <pc:sldMk cId="1384361792" sldId="370"/>
-            <ac:spMk id="11" creationId="{D9FED98C-5C73-B2F3-8929-ECED233DA1C7}"/>
-          </ac:spMkLst>
-        </pc:spChg>
-        <pc:spChg chg="del">
-          <ac:chgData name="Federico  Dattila" userId="3fbddd6b-c98a-4780-9364-b5d8323ec50d" providerId="ADAL" clId="{B1DEC7C1-F3B5-4439-A997-04211256670D}" dt="2023-11-28T23:51:05.188" v="1325" actId="478"/>
-          <ac:spMkLst>
-            <pc:docMk/>
-            <pc:sldMk cId="1384361792" sldId="370"/>
-            <ac:spMk id="12" creationId="{147CF1BF-5594-A0D5-D4DD-EE1D6B1F01C1}"/>
-          </ac:spMkLst>
-        </pc:spChg>
-        <pc:spChg chg="del">
-          <ac:chgData name="Federico  Dattila" userId="3fbddd6b-c98a-4780-9364-b5d8323ec50d" providerId="ADAL" clId="{B1DEC7C1-F3B5-4439-A997-04211256670D}" dt="2023-11-28T23:51:05.188" v="1325" actId="478"/>
-          <ac:spMkLst>
-            <pc:docMk/>
-            <pc:sldMk cId="1384361792" sldId="370"/>
-            <ac:spMk id="13" creationId="{ADAB539E-18A2-D39D-175F-94B192F63C4E}"/>
-          </ac:spMkLst>
-        </pc:spChg>
-        <pc:spChg chg="del">
-          <ac:chgData name="Federico  Dattila" userId="3fbddd6b-c98a-4780-9364-b5d8323ec50d" providerId="ADAL" clId="{B1DEC7C1-F3B5-4439-A997-04211256670D}" dt="2023-11-28T23:51:05.188" v="1325" actId="478"/>
-          <ac:spMkLst>
-            <pc:docMk/>
-            <pc:sldMk cId="1384361792" sldId="370"/>
-            <ac:spMk id="14" creationId="{8652BF97-302F-BD33-D092-00C827BF2E07}"/>
-          </ac:spMkLst>
-        </pc:spChg>
-        <pc:spChg chg="del">
-          <ac:chgData name="Federico  Dattila" userId="3fbddd6b-c98a-4780-9364-b5d8323ec50d" providerId="ADAL" clId="{B1DEC7C1-F3B5-4439-A997-04211256670D}" dt="2023-11-28T23:51:05.188" v="1325" actId="478"/>
-          <ac:spMkLst>
-            <pc:docMk/>
-            <pc:sldMk cId="1384361792" sldId="370"/>
-            <ac:spMk id="15" creationId="{0503460B-B7D4-54F9-5398-C1F432375695}"/>
-          </ac:spMkLst>
-        </pc:spChg>
-        <pc:spChg chg="mod">
-          <ac:chgData name="Federico  Dattila" userId="3fbddd6b-c98a-4780-9364-b5d8323ec50d" providerId="ADAL" clId="{B1DEC7C1-F3B5-4439-A997-04211256670D}" dt="2023-11-28T23:51:01.335" v="1324" actId="20577"/>
-          <ac:spMkLst>
-            <pc:docMk/>
-            <pc:sldMk cId="1384361792" sldId="370"/>
-            <ac:spMk id="16" creationId="{C3C4B75F-E07B-74CD-675D-AC022CF9901F}"/>
-          </ac:spMkLst>
-        </pc:spChg>
-        <pc:spChg chg="del">
-          <ac:chgData name="Federico  Dattila" userId="3fbddd6b-c98a-4780-9364-b5d8323ec50d" providerId="ADAL" clId="{B1DEC7C1-F3B5-4439-A997-04211256670D}" dt="2023-11-28T23:51:05.188" v="1325" actId="478"/>
-          <ac:spMkLst>
-            <pc:docMk/>
-            <pc:sldMk cId="1384361792" sldId="370"/>
-            <ac:spMk id="17" creationId="{B9FD2EDD-743A-1573-F4B0-663FC1A032FA}"/>
-          </ac:spMkLst>
-        </pc:spChg>
-        <pc:spChg chg="del">
-          <ac:chgData name="Federico  Dattila" userId="3fbddd6b-c98a-4780-9364-b5d8323ec50d" providerId="ADAL" clId="{B1DEC7C1-F3B5-4439-A997-04211256670D}" dt="2023-11-28T23:51:05.188" v="1325" actId="478"/>
-          <ac:spMkLst>
-            <pc:docMk/>
-            <pc:sldMk cId="1384361792" sldId="370"/>
-            <ac:spMk id="18" creationId="{DCEBB8ED-4A62-33AD-CE4F-020D3D1F09CA}"/>
-          </ac:spMkLst>
-        </pc:spChg>
-        <pc:spChg chg="del">
-          <ac:chgData name="Federico  Dattila" userId="3fbddd6b-c98a-4780-9364-b5d8323ec50d" providerId="ADAL" clId="{B1DEC7C1-F3B5-4439-A997-04211256670D}" dt="2023-11-28T23:51:05.188" v="1325" actId="478"/>
-          <ac:spMkLst>
-            <pc:docMk/>
-            <pc:sldMk cId="1384361792" sldId="370"/>
-            <ac:spMk id="19" creationId="{5D02EFE2-D94D-57A1-2D58-FBE61AC771DB}"/>
-          </ac:spMkLst>
-        </pc:spChg>
-        <pc:spChg chg="del">
-          <ac:chgData name="Federico  Dattila" userId="3fbddd6b-c98a-4780-9364-b5d8323ec50d" providerId="ADAL" clId="{B1DEC7C1-F3B5-4439-A997-04211256670D}" dt="2023-11-28T23:51:05.188" v="1325" actId="478"/>
-          <ac:spMkLst>
-            <pc:docMk/>
-            <pc:sldMk cId="1384361792" sldId="370"/>
-            <ac:spMk id="20" creationId="{99BC8C31-F5A9-D15F-D6B3-A1794837BA84}"/>
-          </ac:spMkLst>
-        </pc:spChg>
-        <pc:spChg chg="del">
-          <ac:chgData name="Federico  Dattila" userId="3fbddd6b-c98a-4780-9364-b5d8323ec50d" providerId="ADAL" clId="{B1DEC7C1-F3B5-4439-A997-04211256670D}" dt="2023-11-28T23:51:05.188" v="1325" actId="478"/>
-          <ac:spMkLst>
-            <pc:docMk/>
-            <pc:sldMk cId="1384361792" sldId="370"/>
-            <ac:spMk id="21" creationId="{ECB99356-2394-CF31-9FA1-8E54F397F096}"/>
-          </ac:spMkLst>
-        </pc:spChg>
-        <pc:spChg chg="del">
-          <ac:chgData name="Federico  Dattila" userId="3fbddd6b-c98a-4780-9364-b5d8323ec50d" providerId="ADAL" clId="{B1DEC7C1-F3B5-4439-A997-04211256670D}" dt="2023-11-28T23:51:05.188" v="1325" actId="478"/>
-          <ac:spMkLst>
-            <pc:docMk/>
-            <pc:sldMk cId="1384361792" sldId="370"/>
-            <ac:spMk id="22" creationId="{2B18EA2B-1B43-ABCB-F038-F8A8A54C344E}"/>
-          </ac:spMkLst>
-        </pc:spChg>
-        <pc:spChg chg="del">
-          <ac:chgData name="Federico  Dattila" userId="3fbddd6b-c98a-4780-9364-b5d8323ec50d" providerId="ADAL" clId="{B1DEC7C1-F3B5-4439-A997-04211256670D}" dt="2023-11-28T23:51:05.188" v="1325" actId="478"/>
-          <ac:spMkLst>
-            <pc:docMk/>
-            <pc:sldMk cId="1384361792" sldId="370"/>
-            <ac:spMk id="23" creationId="{DFA65DC4-60A1-A2DF-A958-3CBFFA96C274}"/>
-          </ac:spMkLst>
-        </pc:spChg>
-        <pc:spChg chg="del">
-          <ac:chgData name="Federico  Dattila" userId="3fbddd6b-c98a-4780-9364-b5d8323ec50d" providerId="ADAL" clId="{B1DEC7C1-F3B5-4439-A997-04211256670D}" dt="2023-11-28T23:51:05.188" v="1325" actId="478"/>
-          <ac:spMkLst>
-            <pc:docMk/>
-            <pc:sldMk cId="1384361792" sldId="370"/>
-            <ac:spMk id="24" creationId="{B8B0096C-1B3D-981E-B18F-146BC56DF28F}"/>
-          </ac:spMkLst>
-        </pc:spChg>
-        <pc:spChg chg="del">
-          <ac:chgData name="Federico  Dattila" userId="3fbddd6b-c98a-4780-9364-b5d8323ec50d" providerId="ADAL" clId="{B1DEC7C1-F3B5-4439-A997-04211256670D}" dt="2023-11-28T23:51:05.188" v="1325" actId="478"/>
-          <ac:spMkLst>
-            <pc:docMk/>
-            <pc:sldMk cId="1384361792" sldId="370"/>
-            <ac:spMk id="25" creationId="{236512C3-3403-5BAF-F5D6-7F12248C70D2}"/>
-          </ac:spMkLst>
-        </pc:spChg>
-        <pc:spChg chg="del">
-          <ac:chgData name="Federico  Dattila" userId="3fbddd6b-c98a-4780-9364-b5d8323ec50d" providerId="ADAL" clId="{B1DEC7C1-F3B5-4439-A997-04211256670D}" dt="2023-11-28T23:51:05.188" v="1325" actId="478"/>
-          <ac:spMkLst>
-            <pc:docMk/>
-            <pc:sldMk cId="1384361792" sldId="370"/>
-            <ac:spMk id="26" creationId="{3C23B4B6-8416-74D3-9A45-5447C96F2546}"/>
-          </ac:spMkLst>
-        </pc:spChg>
-        <pc:spChg chg="del">
-          <ac:chgData name="Federico  Dattila" userId="3fbddd6b-c98a-4780-9364-b5d8323ec50d" providerId="ADAL" clId="{B1DEC7C1-F3B5-4439-A997-04211256670D}" dt="2023-11-28T23:51:05.188" v="1325" actId="478"/>
-          <ac:spMkLst>
-            <pc:docMk/>
-            <pc:sldMk cId="1384361792" sldId="370"/>
-            <ac:spMk id="36" creationId="{7DE7F212-20B5-D3FD-54E6-C0D8D9C5E899}"/>
-          </ac:spMkLst>
-        </pc:spChg>
-        <pc:graphicFrameChg chg="add mod modGraphic">
-          <ac:chgData name="Federico  Dattila" userId="3fbddd6b-c98a-4780-9364-b5d8323ec50d" providerId="ADAL" clId="{B1DEC7C1-F3B5-4439-A997-04211256670D}" dt="2023-11-28T23:53:36.132" v="1365"/>
-          <ac:graphicFrameMkLst>
-            <pc:docMk/>
-            <pc:sldMk cId="1384361792" sldId="370"/>
-            <ac:graphicFrameMk id="2" creationId="{C5281FFE-F816-92CF-23F2-D59E0CB2469E}"/>
-          </ac:graphicFrameMkLst>
-        </pc:graphicFrameChg>
-        <pc:picChg chg="del">
-          <ac:chgData name="Federico  Dattila" userId="3fbddd6b-c98a-4780-9364-b5d8323ec50d" providerId="ADAL" clId="{B1DEC7C1-F3B5-4439-A997-04211256670D}" dt="2023-11-28T23:51:05.188" v="1325" actId="478"/>
-          <ac:picMkLst>
-            <pc:docMk/>
-            <pc:sldMk cId="1384361792" sldId="370"/>
-            <ac:picMk id="29" creationId="{178FEC8D-3866-DFFF-78E4-B88B974EEDF2}"/>
-          </ac:picMkLst>
-        </pc:picChg>
-        <pc:picChg chg="del">
-          <ac:chgData name="Federico  Dattila" userId="3fbddd6b-c98a-4780-9364-b5d8323ec50d" providerId="ADAL" clId="{B1DEC7C1-F3B5-4439-A997-04211256670D}" dt="2023-11-28T23:51:05.188" v="1325" actId="478"/>
-          <ac:picMkLst>
-            <pc:docMk/>
-            <pc:sldMk cId="1384361792" sldId="370"/>
-            <ac:picMk id="30" creationId="{4CD68EE3-A1A9-0D5F-BB24-38C3DCE6D3AD}"/>
-          </ac:picMkLst>
-        </pc:picChg>
-        <pc:picChg chg="del">
-          <ac:chgData name="Federico  Dattila" userId="3fbddd6b-c98a-4780-9364-b5d8323ec50d" providerId="ADAL" clId="{B1DEC7C1-F3B5-4439-A997-04211256670D}" dt="2023-11-28T23:51:05.188" v="1325" actId="478"/>
-          <ac:picMkLst>
-            <pc:docMk/>
-            <pc:sldMk cId="1384361792" sldId="370"/>
-            <ac:picMk id="32" creationId="{91333314-3C79-F194-E705-86D432061888}"/>
-          </ac:picMkLst>
-        </pc:picChg>
-        <pc:picChg chg="del">
-          <ac:chgData name="Federico  Dattila" userId="3fbddd6b-c98a-4780-9364-b5d8323ec50d" providerId="ADAL" clId="{B1DEC7C1-F3B5-4439-A997-04211256670D}" dt="2023-11-28T23:51:05.188" v="1325" actId="478"/>
-          <ac:picMkLst>
-            <pc:docMk/>
-            <pc:sldMk cId="1384361792" sldId="370"/>
-            <ac:picMk id="33" creationId="{6F0E31FE-D25D-36C9-7175-3BD9F8C6A225}"/>
-          </ac:picMkLst>
-        </pc:picChg>
-        <pc:picChg chg="del">
-          <ac:chgData name="Federico  Dattila" userId="3fbddd6b-c98a-4780-9364-b5d8323ec50d" providerId="ADAL" clId="{B1DEC7C1-F3B5-4439-A997-04211256670D}" dt="2023-11-28T23:51:05.188" v="1325" actId="478"/>
-          <ac:picMkLst>
-            <pc:docMk/>
-            <pc:sldMk cId="1384361792" sldId="370"/>
-            <ac:picMk id="34" creationId="{661E04F8-7B21-55BD-F17F-A8F2B4C11994}"/>
-          </ac:picMkLst>
-        </pc:picChg>
-        <pc:picChg chg="del">
-          <ac:chgData name="Federico  Dattila" userId="3fbddd6b-c98a-4780-9364-b5d8323ec50d" providerId="ADAL" clId="{B1DEC7C1-F3B5-4439-A997-04211256670D}" dt="2023-11-28T23:51:05.188" v="1325" actId="478"/>
-          <ac:picMkLst>
-            <pc:docMk/>
-            <pc:sldMk cId="1384361792" sldId="370"/>
-            <ac:picMk id="35" creationId="{58831A57-68C4-DE96-F9AC-CE2D24C912A9}"/>
-          </ac:picMkLst>
-        </pc:picChg>
-      </pc:sldChg>
-      <pc:sldChg chg="addSp delSp modSp add mod">
-        <pc:chgData name="Federico  Dattila" userId="3fbddd6b-c98a-4780-9364-b5d8323ec50d" providerId="ADAL" clId="{B1DEC7C1-F3B5-4439-A997-04211256670D}" dt="2023-11-29T00:06:08.499" v="1866" actId="1037"/>
+        <pc:chgData name="Federico  Dattila" userId="3fbddd6b-c98a-4780-9364-b5d8323ec50d" providerId="ADAL" clId="{74B85A1C-3F89-447F-BB10-160DA5B5EB87}" dt="2025-12-11T12:47:56.527" v="406" actId="404"/>
         <pc:sldMkLst>
           <pc:docMk/>
           <pc:sldMk cId="2971824230" sldId="371"/>
         </pc:sldMkLst>
         <pc:spChg chg="add mod">
-          <ac:chgData name="Federico  Dattila" userId="3fbddd6b-c98a-4780-9364-b5d8323ec50d" providerId="ADAL" clId="{B1DEC7C1-F3B5-4439-A997-04211256670D}" dt="2023-11-29T00:06:08.499" v="1866" actId="1037"/>
+          <ac:chgData name="Federico  Dattila" userId="3fbddd6b-c98a-4780-9364-b5d8323ec50d" providerId="ADAL" clId="{74B85A1C-3F89-447F-BB10-160DA5B5EB87}" dt="2025-12-11T12:45:53.962" v="178" actId="404"/>
+          <ac:spMkLst>
+            <pc:docMk/>
+            <pc:sldMk cId="2971824230" sldId="371"/>
+            <ac:spMk id="2" creationId="{0FA94861-4904-F5D0-8806-F81F0211B2D1}"/>
+          </ac:spMkLst>
+        </pc:spChg>
+        <pc:spChg chg="add del mod">
+          <ac:chgData name="Federico  Dattila" userId="3fbddd6b-c98a-4780-9364-b5d8323ec50d" providerId="ADAL" clId="{74B85A1C-3F89-447F-BB10-160DA5B5EB87}" dt="2025-12-11T12:45:51.322" v="177" actId="404"/>
           <ac:spMkLst>
             <pc:docMk/>
             <pc:sldMk cId="2971824230" sldId="371"/>
             <ac:spMk id="4" creationId="{72AA22AB-82FA-F1DB-CCED-6AF403243977}"/>
           </ac:spMkLst>
         </pc:spChg>
-        <pc:spChg chg="add mod">
-          <ac:chgData name="Federico  Dattila" userId="3fbddd6b-c98a-4780-9364-b5d8323ec50d" providerId="ADAL" clId="{B1DEC7C1-F3B5-4439-A997-04211256670D}" dt="2023-11-29T00:06:08.499" v="1866" actId="1037"/>
+        <pc:spChg chg="del">
+          <ac:chgData name="Federico  Dattila" userId="3fbddd6b-c98a-4780-9364-b5d8323ec50d" providerId="ADAL" clId="{74B85A1C-3F89-447F-BB10-160DA5B5EB87}" dt="2025-12-11T12:44:45.298" v="72" actId="21"/>
           <ac:spMkLst>
             <pc:docMk/>
             <pc:sldMk cId="2971824230" sldId="371"/>
             <ac:spMk id="5" creationId="{0FA94861-4904-F5D0-8806-F81F0211B2D1}"/>
           </ac:spMkLst>
         </pc:spChg>
-        <pc:spChg chg="add mod">
-          <ac:chgData name="Federico  Dattila" userId="3fbddd6b-c98a-4780-9364-b5d8323ec50d" providerId="ADAL" clId="{B1DEC7C1-F3B5-4439-A997-04211256670D}" dt="2023-11-29T00:06:08.499" v="1866" actId="1037"/>
+        <pc:spChg chg="del mod">
+          <ac:chgData name="Federico  Dattila" userId="3fbddd6b-c98a-4780-9364-b5d8323ec50d" providerId="ADAL" clId="{74B85A1C-3F89-447F-BB10-160DA5B5EB87}" dt="2025-12-11T12:45:27.535" v="113" actId="21"/>
           <ac:spMkLst>
             <pc:docMk/>
             <pc:sldMk cId="2971824230" sldId="371"/>
             <ac:spMk id="6" creationId="{27466D3C-8B07-EF8B-1535-C6362F8BF8E3}"/>
           </ac:spMkLst>
         </pc:spChg>
-        <pc:spChg chg="add mod">
-          <ac:chgData name="Federico  Dattila" userId="3fbddd6b-c98a-4780-9364-b5d8323ec50d" providerId="ADAL" clId="{B1DEC7C1-F3B5-4439-A997-04211256670D}" dt="2023-11-29T00:06:08.499" v="1866" actId="1037"/>
+        <pc:spChg chg="del mod">
+          <ac:chgData name="Federico  Dattila" userId="3fbddd6b-c98a-4780-9364-b5d8323ec50d" providerId="ADAL" clId="{74B85A1C-3F89-447F-BB10-160DA5B5EB87}" dt="2025-12-11T12:46:04.622" v="180" actId="21"/>
           <ac:spMkLst>
             <pc:docMk/>
             <pc:sldMk cId="2971824230" sldId="371"/>
             <ac:spMk id="7" creationId="{95180BA9-3454-574E-4241-B7D27D7608C6}"/>
           </ac:spMkLst>
         </pc:spChg>
-        <pc:spChg chg="add mod">
-          <ac:chgData name="Federico  Dattila" userId="3fbddd6b-c98a-4780-9364-b5d8323ec50d" providerId="ADAL" clId="{B1DEC7C1-F3B5-4439-A997-04211256670D}" dt="2023-11-29T00:06:08.499" v="1866" actId="1037"/>
+        <pc:spChg chg="del mod">
+          <ac:chgData name="Federico  Dattila" userId="3fbddd6b-c98a-4780-9364-b5d8323ec50d" providerId="ADAL" clId="{74B85A1C-3F89-447F-BB10-160DA5B5EB87}" dt="2025-12-11T12:46:54.327" v="247" actId="21"/>
           <ac:spMkLst>
             <pc:docMk/>
             <pc:sldMk cId="2971824230" sldId="371"/>
             <ac:spMk id="8" creationId="{EC522CDF-FF91-1630-0CA1-2C3E078982FA}"/>
           </ac:spMkLst>
         </pc:spChg>
-        <pc:spChg chg="del">
-          <ac:chgData name="Federico  Dattila" userId="3fbddd6b-c98a-4780-9364-b5d8323ec50d" providerId="ADAL" clId="{B1DEC7C1-F3B5-4439-A997-04211256670D}" dt="2023-11-28T23:59:02.391" v="1460" actId="478"/>
+        <pc:spChg chg="add mod">
+          <ac:chgData name="Federico  Dattila" userId="3fbddd6b-c98a-4780-9364-b5d8323ec50d" providerId="ADAL" clId="{74B85A1C-3F89-447F-BB10-160DA5B5EB87}" dt="2025-12-11T12:45:57.170" v="179" actId="404"/>
           <ac:spMkLst>
             <pc:docMk/>
             <pc:sldMk cId="2971824230" sldId="371"/>
-            <ac:spMk id="10" creationId="{D5EC3236-1AF1-036D-BDA9-7C4299D10EC9}"/>
+            <ac:spMk id="9" creationId="{27466D3C-8B07-EF8B-1535-C6362F8BF8E3}"/>
           </ac:spMkLst>
         </pc:spChg>
-        <pc:spChg chg="del">
-          <ac:chgData name="Federico  Dattila" userId="3fbddd6b-c98a-4780-9364-b5d8323ec50d" providerId="ADAL" clId="{B1DEC7C1-F3B5-4439-A997-04211256670D}" dt="2023-11-28T23:59:02.391" v="1460" actId="478"/>
+        <pc:spChg chg="add mod">
+          <ac:chgData name="Federico  Dattila" userId="3fbddd6b-c98a-4780-9364-b5d8323ec50d" providerId="ADAL" clId="{74B85A1C-3F89-447F-BB10-160DA5B5EB87}" dt="2025-12-11T12:46:49.434" v="246" actId="20577"/>
           <ac:spMkLst>
             <pc:docMk/>
             <pc:sldMk cId="2971824230" sldId="371"/>
-            <ac:spMk id="11" creationId="{D9FED98C-5C73-B2F3-8929-ECED233DA1C7}"/>
+            <ac:spMk id="10" creationId="{95180BA9-3454-574E-4241-B7D27D7608C6}"/>
           </ac:spMkLst>
         </pc:spChg>
-        <pc:spChg chg="del">
-          <ac:chgData name="Federico  Dattila" userId="3fbddd6b-c98a-4780-9364-b5d8323ec50d" providerId="ADAL" clId="{B1DEC7C1-F3B5-4439-A997-04211256670D}" dt="2023-11-28T23:59:02.391" v="1460" actId="478"/>
+        <pc:spChg chg="add del mod">
+          <ac:chgData name="Federico  Dattila" userId="3fbddd6b-c98a-4780-9364-b5d8323ec50d" providerId="ADAL" clId="{74B85A1C-3F89-447F-BB10-160DA5B5EB87}" dt="2025-12-11T12:47:03.473" v="249" actId="21"/>
           <ac:spMkLst>
             <pc:docMk/>
             <pc:sldMk cId="2971824230" sldId="371"/>
-            <ac:spMk id="12" creationId="{147CF1BF-5594-A0D5-D4DD-EE1D6B1F01C1}"/>
+            <ac:spMk id="11" creationId="{EC522CDF-FF91-1630-0CA1-2C3E078982FA}"/>
           </ac:spMkLst>
         </pc:spChg>
-        <pc:spChg chg="del">
-          <ac:chgData name="Federico  Dattila" userId="3fbddd6b-c98a-4780-9364-b5d8323ec50d" providerId="ADAL" clId="{B1DEC7C1-F3B5-4439-A997-04211256670D}" dt="2023-11-28T23:59:02.391" v="1460" actId="478"/>
+        <pc:spChg chg="add del mod">
+          <ac:chgData name="Federico  Dattila" userId="3fbddd6b-c98a-4780-9364-b5d8323ec50d" providerId="ADAL" clId="{74B85A1C-3F89-447F-BB10-160DA5B5EB87}" dt="2025-12-11T12:47:26.282" v="337" actId="21"/>
           <ac:spMkLst>
             <pc:docMk/>
             <pc:sldMk cId="2971824230" sldId="371"/>
-            <ac:spMk id="13" creationId="{ADAB539E-18A2-D39D-175F-94B192F63C4E}"/>
+            <ac:spMk id="12" creationId="{EC522CDF-FF91-1630-0CA1-2C3E078982FA}"/>
           </ac:spMkLst>
         </pc:spChg>
-        <pc:spChg chg="del">
-          <ac:chgData name="Federico  Dattila" userId="3fbddd6b-c98a-4780-9364-b5d8323ec50d" providerId="ADAL" clId="{B1DEC7C1-F3B5-4439-A997-04211256670D}" dt="2023-11-28T23:59:02.391" v="1460" actId="478"/>
+        <pc:spChg chg="add del mod">
+          <ac:chgData name="Federico  Dattila" userId="3fbddd6b-c98a-4780-9364-b5d8323ec50d" providerId="ADAL" clId="{74B85A1C-3F89-447F-BB10-160DA5B5EB87}" dt="2025-12-11T12:47:42.625" v="375" actId="21"/>
           <ac:spMkLst>
             <pc:docMk/>
             <pc:sldMk cId="2971824230" sldId="371"/>
-            <ac:spMk id="14" creationId="{8652BF97-302F-BD33-D092-00C827BF2E07}"/>
+            <ac:spMk id="13" creationId="{EC522CDF-FF91-1630-0CA1-2C3E078982FA}"/>
           </ac:spMkLst>
         </pc:spChg>
-        <pc:spChg chg="del">
-          <ac:chgData name="Federico  Dattila" userId="3fbddd6b-c98a-4780-9364-b5d8323ec50d" providerId="ADAL" clId="{B1DEC7C1-F3B5-4439-A997-04211256670D}" dt="2023-11-28T23:59:02.391" v="1460" actId="478"/>
+        <pc:spChg chg="add mod">
+          <ac:chgData name="Federico  Dattila" userId="3fbddd6b-c98a-4780-9364-b5d8323ec50d" providerId="ADAL" clId="{74B85A1C-3F89-447F-BB10-160DA5B5EB87}" dt="2025-12-11T12:47:56.527" v="406" actId="404"/>
           <ac:spMkLst>
             <pc:docMk/>
             <pc:sldMk cId="2971824230" sldId="371"/>
-            <ac:spMk id="15" creationId="{0503460B-B7D4-54F9-5398-C1F432375695}"/>
+            <ac:spMk id="14" creationId="{EC522CDF-FF91-1630-0CA1-2C3E078982FA}"/>
           </ac:spMkLst>
         </pc:spChg>
-        <pc:spChg chg="mod">
-          <ac:chgData name="Federico  Dattila" userId="3fbddd6b-c98a-4780-9364-b5d8323ec50d" providerId="ADAL" clId="{B1DEC7C1-F3B5-4439-A997-04211256670D}" dt="2023-11-28T23:58:59.527" v="1459" actId="20577"/>
-          <ac:spMkLst>
-            <pc:docMk/>
-            <pc:sldMk cId="2971824230" sldId="371"/>
-            <ac:spMk id="16" creationId="{C3C4B75F-E07B-74CD-675D-AC022CF9901F}"/>
-          </ac:spMkLst>
-        </pc:spChg>
-        <pc:spChg chg="del">
-          <ac:chgData name="Federico  Dattila" userId="3fbddd6b-c98a-4780-9364-b5d8323ec50d" providerId="ADAL" clId="{B1DEC7C1-F3B5-4439-A997-04211256670D}" dt="2023-11-28T23:59:02.391" v="1460" actId="478"/>
-          <ac:spMkLst>
-            <pc:docMk/>
-            <pc:sldMk cId="2971824230" sldId="371"/>
-            <ac:spMk id="17" creationId="{B9FD2EDD-743A-1573-F4B0-663FC1A032FA}"/>
-          </ac:spMkLst>
-        </pc:spChg>
-        <pc:spChg chg="del">
-          <ac:chgData name="Federico  Dattila" userId="3fbddd6b-c98a-4780-9364-b5d8323ec50d" providerId="ADAL" clId="{B1DEC7C1-F3B5-4439-A997-04211256670D}" dt="2023-11-28T23:59:02.391" v="1460" actId="478"/>
-          <ac:spMkLst>
-            <pc:docMk/>
-            <pc:sldMk cId="2971824230" sldId="371"/>
-            <ac:spMk id="18" creationId="{DCEBB8ED-4A62-33AD-CE4F-020D3D1F09CA}"/>
-          </ac:spMkLst>
-        </pc:spChg>
-        <pc:spChg chg="del">
-          <ac:chgData name="Federico  Dattila" userId="3fbddd6b-c98a-4780-9364-b5d8323ec50d" providerId="ADAL" clId="{B1DEC7C1-F3B5-4439-A997-04211256670D}" dt="2023-11-28T23:59:02.391" v="1460" actId="478"/>
-          <ac:spMkLst>
-            <pc:docMk/>
-            <pc:sldMk cId="2971824230" sldId="371"/>
-            <ac:spMk id="19" creationId="{5D02EFE2-D94D-57A1-2D58-FBE61AC771DB}"/>
-          </ac:spMkLst>
-        </pc:spChg>
-        <pc:spChg chg="del">
-          <ac:chgData name="Federico  Dattila" userId="3fbddd6b-c98a-4780-9364-b5d8323ec50d" providerId="ADAL" clId="{B1DEC7C1-F3B5-4439-A997-04211256670D}" dt="2023-11-28T23:59:02.391" v="1460" actId="478"/>
-          <ac:spMkLst>
-            <pc:docMk/>
-            <pc:sldMk cId="2971824230" sldId="371"/>
-            <ac:spMk id="20" creationId="{99BC8C31-F5A9-D15F-D6B3-A1794837BA84}"/>
-          </ac:spMkLst>
-        </pc:spChg>
-        <pc:spChg chg="del">
-          <ac:chgData name="Federico  Dattila" userId="3fbddd6b-c98a-4780-9364-b5d8323ec50d" providerId="ADAL" clId="{B1DEC7C1-F3B5-4439-A997-04211256670D}" dt="2023-11-28T23:59:02.391" v="1460" actId="478"/>
-          <ac:spMkLst>
-            <pc:docMk/>
-            <pc:sldMk cId="2971824230" sldId="371"/>
-            <ac:spMk id="21" creationId="{ECB99356-2394-CF31-9FA1-8E54F397F096}"/>
-          </ac:spMkLst>
-        </pc:spChg>
-        <pc:spChg chg="del">
-          <ac:chgData name="Federico  Dattila" userId="3fbddd6b-c98a-4780-9364-b5d8323ec50d" providerId="ADAL" clId="{B1DEC7C1-F3B5-4439-A997-04211256670D}" dt="2023-11-28T23:59:02.391" v="1460" actId="478"/>
-          <ac:spMkLst>
-            <pc:docMk/>
-            <pc:sldMk cId="2971824230" sldId="371"/>
-            <ac:spMk id="22" creationId="{2B18EA2B-1B43-ABCB-F038-F8A8A54C344E}"/>
-          </ac:spMkLst>
-        </pc:spChg>
-        <pc:spChg chg="del">
-          <ac:chgData name="Federico  Dattila" userId="3fbddd6b-c98a-4780-9364-b5d8323ec50d" providerId="ADAL" clId="{B1DEC7C1-F3B5-4439-A997-04211256670D}" dt="2023-11-28T23:59:02.391" v="1460" actId="478"/>
-          <ac:spMkLst>
-            <pc:docMk/>
-            <pc:sldMk cId="2971824230" sldId="371"/>
-            <ac:spMk id="23" creationId="{DFA65DC4-60A1-A2DF-A958-3CBFFA96C274}"/>
-          </ac:spMkLst>
-        </pc:spChg>
-        <pc:spChg chg="del">
-          <ac:chgData name="Federico  Dattila" userId="3fbddd6b-c98a-4780-9364-b5d8323ec50d" providerId="ADAL" clId="{B1DEC7C1-F3B5-4439-A997-04211256670D}" dt="2023-11-28T23:59:02.391" v="1460" actId="478"/>
-          <ac:spMkLst>
-            <pc:docMk/>
-            <pc:sldMk cId="2971824230" sldId="371"/>
-            <ac:spMk id="24" creationId="{B8B0096C-1B3D-981E-B18F-146BC56DF28F}"/>
-          </ac:spMkLst>
-        </pc:spChg>
-        <pc:spChg chg="del">
-          <ac:chgData name="Federico  Dattila" userId="3fbddd6b-c98a-4780-9364-b5d8323ec50d" providerId="ADAL" clId="{B1DEC7C1-F3B5-4439-A997-04211256670D}" dt="2023-11-28T23:59:02.391" v="1460" actId="478"/>
-          <ac:spMkLst>
-            <pc:docMk/>
-            <pc:sldMk cId="2971824230" sldId="371"/>
-            <ac:spMk id="25" creationId="{236512C3-3403-5BAF-F5D6-7F12248C70D2}"/>
-          </ac:spMkLst>
-        </pc:spChg>
-        <pc:spChg chg="del">
-          <ac:chgData name="Federico  Dattila" userId="3fbddd6b-c98a-4780-9364-b5d8323ec50d" providerId="ADAL" clId="{B1DEC7C1-F3B5-4439-A997-04211256670D}" dt="2023-11-28T23:59:02.391" v="1460" actId="478"/>
-          <ac:spMkLst>
-            <pc:docMk/>
-            <pc:sldMk cId="2971824230" sldId="371"/>
-            <ac:spMk id="26" creationId="{3C23B4B6-8416-74D3-9A45-5447C96F2546}"/>
-          </ac:spMkLst>
-        </pc:spChg>
-        <pc:spChg chg="del">
-          <ac:chgData name="Federico  Dattila" userId="3fbddd6b-c98a-4780-9364-b5d8323ec50d" providerId="ADAL" clId="{B1DEC7C1-F3B5-4439-A997-04211256670D}" dt="2023-11-28T23:59:02.391" v="1460" actId="478"/>
-          <ac:spMkLst>
-            <pc:docMk/>
-            <pc:sldMk cId="2971824230" sldId="371"/>
-            <ac:spMk id="36" creationId="{7DE7F212-20B5-D3FD-54E6-C0D8D9C5E899}"/>
-          </ac:spMkLst>
-        </pc:spChg>
-        <pc:picChg chg="add mod modCrop">
-          <ac:chgData name="Federico  Dattila" userId="3fbddd6b-c98a-4780-9364-b5d8323ec50d" providerId="ADAL" clId="{B1DEC7C1-F3B5-4439-A997-04211256670D}" dt="2023-11-29T00:06:08.499" v="1866" actId="1037"/>
+        <pc:picChg chg="mod modCrop">
+          <ac:chgData name="Federico  Dattila" userId="3fbddd6b-c98a-4780-9364-b5d8323ec50d" providerId="ADAL" clId="{74B85A1C-3F89-447F-BB10-160DA5B5EB87}" dt="2025-12-11T12:46:14.679" v="181" actId="732"/>
           <ac:picMkLst>
             <pc:docMk/>
             <pc:sldMk cId="2971824230" sldId="371"/>
             <ac:picMk id="3" creationId="{600154C6-44D4-7C1A-539C-0D774176D0F3}"/>
           </ac:picMkLst>
         </pc:picChg>
-        <pc:picChg chg="add mod">
-          <ac:chgData name="Federico  Dattila" userId="3fbddd6b-c98a-4780-9364-b5d8323ec50d" providerId="ADAL" clId="{B1DEC7C1-F3B5-4439-A997-04211256670D}" dt="2023-11-29T00:06:08.499" v="1866" actId="1037"/>
-          <ac:picMkLst>
-            <pc:docMk/>
-            <pc:sldMk cId="2971824230" sldId="371"/>
-            <ac:picMk id="27" creationId="{3379E02C-8DA5-F145-9F5A-B72434BEC1BB}"/>
-          </ac:picMkLst>
-        </pc:picChg>
-        <pc:picChg chg="del">
-          <ac:chgData name="Federico  Dattila" userId="3fbddd6b-c98a-4780-9364-b5d8323ec50d" providerId="ADAL" clId="{B1DEC7C1-F3B5-4439-A997-04211256670D}" dt="2023-11-28T23:59:02.391" v="1460" actId="478"/>
-          <ac:picMkLst>
-            <pc:docMk/>
-            <pc:sldMk cId="2971824230" sldId="371"/>
-            <ac:picMk id="29" creationId="{178FEC8D-3866-DFFF-78E4-B88B974EEDF2}"/>
-          </ac:picMkLst>
-        </pc:picChg>
-        <pc:picChg chg="del">
-          <ac:chgData name="Federico  Dattila" userId="3fbddd6b-c98a-4780-9364-b5d8323ec50d" providerId="ADAL" clId="{B1DEC7C1-F3B5-4439-A997-04211256670D}" dt="2023-11-28T23:59:02.391" v="1460" actId="478"/>
-          <ac:picMkLst>
-            <pc:docMk/>
-            <pc:sldMk cId="2971824230" sldId="371"/>
-            <ac:picMk id="30" creationId="{4CD68EE3-A1A9-0D5F-BB24-38C3DCE6D3AD}"/>
-          </ac:picMkLst>
-        </pc:picChg>
-        <pc:picChg chg="add mod">
-          <ac:chgData name="Federico  Dattila" userId="3fbddd6b-c98a-4780-9364-b5d8323ec50d" providerId="ADAL" clId="{B1DEC7C1-F3B5-4439-A997-04211256670D}" dt="2023-11-29T00:06:08.499" v="1866" actId="1037"/>
-          <ac:picMkLst>
-            <pc:docMk/>
-            <pc:sldMk cId="2971824230" sldId="371"/>
-            <ac:picMk id="31" creationId="{960AE324-596F-602E-37FD-3222B76E7484}"/>
-          </ac:picMkLst>
-        </pc:picChg>
-        <pc:picChg chg="del">
-          <ac:chgData name="Federico  Dattila" userId="3fbddd6b-c98a-4780-9364-b5d8323ec50d" providerId="ADAL" clId="{B1DEC7C1-F3B5-4439-A997-04211256670D}" dt="2023-11-28T23:59:02.391" v="1460" actId="478"/>
-          <ac:picMkLst>
-            <pc:docMk/>
-            <pc:sldMk cId="2971824230" sldId="371"/>
-            <ac:picMk id="32" creationId="{91333314-3C79-F194-E705-86D432061888}"/>
-          </ac:picMkLst>
-        </pc:picChg>
-        <pc:picChg chg="del">
-          <ac:chgData name="Federico  Dattila" userId="3fbddd6b-c98a-4780-9364-b5d8323ec50d" providerId="ADAL" clId="{B1DEC7C1-F3B5-4439-A997-04211256670D}" dt="2023-11-28T23:59:02.391" v="1460" actId="478"/>
-          <ac:picMkLst>
-            <pc:docMk/>
-            <pc:sldMk cId="2971824230" sldId="371"/>
-            <ac:picMk id="33" creationId="{6F0E31FE-D25D-36C9-7175-3BD9F8C6A225}"/>
-          </ac:picMkLst>
-        </pc:picChg>
-        <pc:picChg chg="del">
-          <ac:chgData name="Federico  Dattila" userId="3fbddd6b-c98a-4780-9364-b5d8323ec50d" providerId="ADAL" clId="{B1DEC7C1-F3B5-4439-A997-04211256670D}" dt="2023-11-28T23:59:02.391" v="1460" actId="478"/>
-          <ac:picMkLst>
-            <pc:docMk/>
-            <pc:sldMk cId="2971824230" sldId="371"/>
-            <ac:picMk id="34" creationId="{661E04F8-7B21-55BD-F17F-A8F2B4C11994}"/>
-          </ac:picMkLst>
-        </pc:picChg>
-        <pc:picChg chg="del">
-          <ac:chgData name="Federico  Dattila" userId="3fbddd6b-c98a-4780-9364-b5d8323ec50d" providerId="ADAL" clId="{B1DEC7C1-F3B5-4439-A997-04211256670D}" dt="2023-11-28T23:59:02.391" v="1460" actId="478"/>
-          <ac:picMkLst>
-            <pc:docMk/>
-            <pc:sldMk cId="2971824230" sldId="371"/>
-            <ac:picMk id="35" creationId="{58831A57-68C4-DE96-F9AC-CE2D24C912A9}"/>
-          </ac:picMkLst>
-        </pc:picChg>
       </pc:sldChg>
-    </pc:docChg>
-  </pc:docChgLst>
-  <pc:docChgLst>
-    <pc:chgData name="Dattila  Federico" userId="3fbddd6b-c98a-4780-9364-b5d8323ec50d" providerId="ADAL" clId="{18EE679E-41E9-4931-9DD6-7F62B1A6261A}"/>
-    <pc:docChg chg="undo custSel addSld delSld modSld sldOrd delMainMaster">
-      <pc:chgData name="Dattila  Federico" userId="3fbddd6b-c98a-4780-9364-b5d8323ec50d" providerId="ADAL" clId="{18EE679E-41E9-4931-9DD6-7F62B1A6261A}" dt="2022-11-13T11:03:31.728" v="2627"/>
-      <pc:docMkLst>
-        <pc:docMk/>
-      </pc:docMkLst>
-      <pc:sldChg chg="addSp delSp modSp mod">
-        <pc:chgData name="Dattila  Federico" userId="3fbddd6b-c98a-4780-9364-b5d8323ec50d" providerId="ADAL" clId="{18EE679E-41E9-4931-9DD6-7F62B1A6261A}" dt="2022-11-11T09:38:17.107" v="1500" actId="1037"/>
-        <pc:sldMkLst>
-          <pc:docMk/>
-          <pc:sldMk cId="0" sldId="256"/>
-        </pc:sldMkLst>
-        <pc:spChg chg="del">
-          <ac:chgData name="Dattila  Federico" userId="3fbddd6b-c98a-4780-9364-b5d8323ec50d" providerId="ADAL" clId="{18EE679E-41E9-4931-9DD6-7F62B1A6261A}" dt="2022-11-11T08:56:11.930" v="104" actId="478"/>
-          <ac:spMkLst>
-            <pc:docMk/>
-            <pc:sldMk cId="0" sldId="256"/>
-            <ac:spMk id="2" creationId="{128FDFC0-DC80-4C00-9792-C7EF8844E38D}"/>
-          </ac:spMkLst>
-        </pc:spChg>
-        <pc:spChg chg="mod">
-          <ac:chgData name="Dattila  Federico" userId="3fbddd6b-c98a-4780-9364-b5d8323ec50d" providerId="ADAL" clId="{18EE679E-41E9-4931-9DD6-7F62B1A6261A}" dt="2022-11-11T09:07:40.508" v="663" actId="1036"/>
-          <ac:spMkLst>
-            <pc:docMk/>
-            <pc:sldMk cId="0" sldId="256"/>
-            <ac:spMk id="7" creationId="{09495CBD-24A4-452D-97B2-D96D38B4BC8A}"/>
-          </ac:spMkLst>
-        </pc:spChg>
-        <pc:spChg chg="mod">
-          <ac:chgData name="Dattila  Federico" userId="3fbddd6b-c98a-4780-9364-b5d8323ec50d" providerId="ADAL" clId="{18EE679E-41E9-4931-9DD6-7F62B1A6261A}" dt="2022-11-11T09:07:48.003" v="679" actId="1035"/>
-          <ac:spMkLst>
-            <pc:docMk/>
-            <pc:sldMk cId="0" sldId="256"/>
-            <ac:spMk id="9" creationId="{0E91CB7C-6CAE-460B-8B21-F46E73BF512A}"/>
-          </ac:spMkLst>
-        </pc:spChg>
-        <pc:spChg chg="mod">
-          <ac:chgData name="Dattila  Federico" userId="3fbddd6b-c98a-4780-9364-b5d8323ec50d" providerId="ADAL" clId="{18EE679E-41E9-4931-9DD6-7F62B1A6261A}" dt="2022-11-11T09:07:06.409" v="608" actId="1076"/>
-          <ac:spMkLst>
-            <pc:docMk/>
-            <pc:sldMk cId="0" sldId="256"/>
-            <ac:spMk id="11" creationId="{D8C5D695-6B19-4B2A-9BA8-9F08914CFBD8}"/>
-          </ac:spMkLst>
-        </pc:spChg>
-        <pc:spChg chg="add mod">
-          <ac:chgData name="Dattila  Federico" userId="3fbddd6b-c98a-4780-9364-b5d8323ec50d" providerId="ADAL" clId="{18EE679E-41E9-4931-9DD6-7F62B1A6261A}" dt="2022-11-11T09:07:48.003" v="679" actId="1035"/>
-          <ac:spMkLst>
-            <pc:docMk/>
-            <pc:sldMk cId="0" sldId="256"/>
-            <ac:spMk id="15" creationId="{F0F9B711-3D18-F05F-84AA-236A571E2CAA}"/>
-          </ac:spMkLst>
-        </pc:spChg>
-        <pc:spChg chg="mod">
-          <ac:chgData name="Dattila  Federico" userId="3fbddd6b-c98a-4780-9364-b5d8323ec50d" providerId="ADAL" clId="{18EE679E-41E9-4931-9DD6-7F62B1A6261A}" dt="2022-11-11T09:07:29.361" v="617" actId="403"/>
-          <ac:spMkLst>
-            <pc:docMk/>
-            <pc:sldMk cId="0" sldId="256"/>
-            <ac:spMk id="86" creationId="{00000000-0000-0000-0000-000000000000}"/>
-          </ac:spMkLst>
-        </pc:spChg>
-        <pc:picChg chg="add mod">
-          <ac:chgData name="Dattila  Federico" userId="3fbddd6b-c98a-4780-9364-b5d8323ec50d" providerId="ADAL" clId="{18EE679E-41E9-4931-9DD6-7F62B1A6261A}" dt="2022-11-11T09:01:35.001" v="375" actId="14100"/>
-          <ac:picMkLst>
-            <pc:docMk/>
-            <pc:sldMk cId="0" sldId="256"/>
-            <ac:picMk id="3" creationId="{55BF6060-05E4-5B8D-4DA9-23F76D4EC043}"/>
-          </ac:picMkLst>
-        </pc:picChg>
-        <pc:picChg chg="add mod">
-          <ac:chgData name="Dattila  Federico" userId="3fbddd6b-c98a-4780-9364-b5d8323ec50d" providerId="ADAL" clId="{18EE679E-41E9-4931-9DD6-7F62B1A6261A}" dt="2022-11-11T09:37:45.154" v="1440" actId="1076"/>
-          <ac:picMkLst>
-            <pc:docMk/>
-            <pc:sldMk cId="0" sldId="256"/>
-            <ac:picMk id="4" creationId="{8B713EA7-6212-704E-713E-E42D09B0E04B}"/>
-          </ac:picMkLst>
-        </pc:picChg>
-        <pc:picChg chg="add mod">
-          <ac:chgData name="Dattila  Federico" userId="3fbddd6b-c98a-4780-9364-b5d8323ec50d" providerId="ADAL" clId="{18EE679E-41E9-4931-9DD6-7F62B1A6261A}" dt="2022-11-11T09:37:57.875" v="1458" actId="1036"/>
-          <ac:picMkLst>
-            <pc:docMk/>
-            <pc:sldMk cId="0" sldId="256"/>
-            <ac:picMk id="5" creationId="{11033C81-6BCD-F82F-816B-907921B59BCC}"/>
-          </ac:picMkLst>
-        </pc:picChg>
-        <pc:picChg chg="add del mod">
-          <ac:chgData name="Dattila  Federico" userId="3fbddd6b-c98a-4780-9364-b5d8323ec50d" providerId="ADAL" clId="{18EE679E-41E9-4931-9DD6-7F62B1A6261A}" dt="2022-11-11T09:02:38.534" v="384" actId="478"/>
-          <ac:picMkLst>
-            <pc:docMk/>
-            <pc:sldMk cId="0" sldId="256"/>
-            <ac:picMk id="8" creationId="{1E5E1CB0-9BDD-12DC-43BE-2B3E68FA3B62}"/>
-          </ac:picMkLst>
-        </pc:picChg>
-        <pc:picChg chg="del">
-          <ac:chgData name="Dattila  Federico" userId="3fbddd6b-c98a-4780-9364-b5d8323ec50d" providerId="ADAL" clId="{18EE679E-41E9-4931-9DD6-7F62B1A6261A}" dt="2022-11-11T08:55:19.836" v="4" actId="478"/>
-          <ac:picMkLst>
-            <pc:docMk/>
-            <pc:sldMk cId="0" sldId="256"/>
-            <ac:picMk id="10" creationId="{6C127027-04AE-4671-900C-18D46A810C85}"/>
-          </ac:picMkLst>
-        </pc:picChg>
-        <pc:picChg chg="add mod">
-          <ac:chgData name="Dattila  Federico" userId="3fbddd6b-c98a-4780-9364-b5d8323ec50d" providerId="ADAL" clId="{18EE679E-41E9-4931-9DD6-7F62B1A6261A}" dt="2022-11-11T09:38:01.704" v="1473" actId="1037"/>
-          <ac:picMkLst>
-            <pc:docMk/>
-            <pc:sldMk cId="0" sldId="256"/>
-            <ac:picMk id="13" creationId="{F777CB90-DFF1-033B-E16B-010AA6667ED1}"/>
-          </ac:picMkLst>
-        </pc:picChg>
-        <pc:picChg chg="add mod modCrop">
-          <ac:chgData name="Dattila  Federico" userId="3fbddd6b-c98a-4780-9364-b5d8323ec50d" providerId="ADAL" clId="{18EE679E-41E9-4931-9DD6-7F62B1A6261A}" dt="2022-11-11T09:38:17.107" v="1500" actId="1037"/>
-          <ac:picMkLst>
-            <pc:docMk/>
-            <pc:sldMk cId="0" sldId="256"/>
-            <ac:picMk id="16" creationId="{7C402FF9-8E72-8FD8-82FB-54469E465977}"/>
-          </ac:picMkLst>
-        </pc:picChg>
-        <pc:picChg chg="mod">
-          <ac:chgData name="Dattila  Federico" userId="3fbddd6b-c98a-4780-9364-b5d8323ec50d" providerId="ADAL" clId="{18EE679E-41E9-4931-9DD6-7F62B1A6261A}" dt="2022-11-11T09:06:49.249" v="604" actId="14100"/>
-          <ac:picMkLst>
-            <pc:docMk/>
-            <pc:sldMk cId="0" sldId="256"/>
-            <ac:picMk id="85" creationId="{00000000-0000-0000-0000-000000000000}"/>
-          </ac:picMkLst>
-        </pc:picChg>
-        <pc:picChg chg="mod">
-          <ac:chgData name="Dattila  Federico" userId="3fbddd6b-c98a-4780-9364-b5d8323ec50d" providerId="ADAL" clId="{18EE679E-41E9-4931-9DD6-7F62B1A6261A}" dt="2022-11-11T09:07:34.900" v="647" actId="1038"/>
-          <ac:picMkLst>
-            <pc:docMk/>
-            <pc:sldMk cId="0" sldId="256"/>
-            <ac:picMk id="1026" creationId="{FD6E59A3-9B78-47CB-8AC2-675990EF3D4D}"/>
-          </ac:picMkLst>
-        </pc:picChg>
-      </pc:sldChg>
-      <pc:sldChg chg="del">
-        <pc:chgData name="Dattila  Federico" userId="3fbddd6b-c98a-4780-9364-b5d8323ec50d" providerId="ADAL" clId="{18EE679E-41E9-4931-9DD6-7F62B1A6261A}" dt="2022-11-11T09:19:06.414" v="843" actId="47"/>
-        <pc:sldMkLst>
-          <pc:docMk/>
-          <pc:sldMk cId="1720028454" sldId="257"/>
-        </pc:sldMkLst>
-      </pc:sldChg>
-      <pc:sldChg chg="del">
-        <pc:chgData name="Dattila  Federico" userId="3fbddd6b-c98a-4780-9364-b5d8323ec50d" providerId="ADAL" clId="{18EE679E-41E9-4931-9DD6-7F62B1A6261A}" dt="2022-11-11T09:19:06.414" v="843" actId="47"/>
-        <pc:sldMkLst>
-          <pc:docMk/>
-          <pc:sldMk cId="2852472121" sldId="259"/>
-        </pc:sldMkLst>
-      </pc:sldChg>
-      <pc:sldChg chg="del">
-        <pc:chgData name="Dattila  Federico" userId="3fbddd6b-c98a-4780-9364-b5d8323ec50d" providerId="ADAL" clId="{18EE679E-41E9-4931-9DD6-7F62B1A6261A}" dt="2022-11-11T09:19:06.414" v="843" actId="47"/>
-        <pc:sldMkLst>
-          <pc:docMk/>
-          <pc:sldMk cId="149164165" sldId="260"/>
-        </pc:sldMkLst>
-      </pc:sldChg>
-      <pc:sldChg chg="del">
-        <pc:chgData name="Dattila  Federico" userId="3fbddd6b-c98a-4780-9364-b5d8323ec50d" providerId="ADAL" clId="{18EE679E-41E9-4931-9DD6-7F62B1A6261A}" dt="2022-11-11T09:19:06.414" v="843" actId="47"/>
-        <pc:sldMkLst>
-          <pc:docMk/>
-          <pc:sldMk cId="1303151939" sldId="261"/>
-        </pc:sldMkLst>
-      </pc:sldChg>
-      <pc:sldChg chg="del">
-        <pc:chgData name="Dattila  Federico" userId="3fbddd6b-c98a-4780-9364-b5d8323ec50d" providerId="ADAL" clId="{18EE679E-41E9-4931-9DD6-7F62B1A6261A}" dt="2022-11-11T09:19:06.414" v="843" actId="47"/>
-        <pc:sldMkLst>
-          <pc:docMk/>
-          <pc:sldMk cId="719122731" sldId="262"/>
-        </pc:sldMkLst>
-      </pc:sldChg>
-      <pc:sldChg chg="del">
-        <pc:chgData name="Dattila  Federico" userId="3fbddd6b-c98a-4780-9364-b5d8323ec50d" providerId="ADAL" clId="{18EE679E-41E9-4931-9DD6-7F62B1A6261A}" dt="2022-11-11T09:19:06.414" v="843" actId="47"/>
-        <pc:sldMkLst>
-          <pc:docMk/>
-          <pc:sldMk cId="2087296146" sldId="263"/>
-        </pc:sldMkLst>
-      </pc:sldChg>
-      <pc:sldChg chg="del">
-        <pc:chgData name="Dattila  Federico" userId="3fbddd6b-c98a-4780-9364-b5d8323ec50d" providerId="ADAL" clId="{18EE679E-41E9-4931-9DD6-7F62B1A6261A}" dt="2022-11-11T09:19:06.414" v="843" actId="47"/>
-        <pc:sldMkLst>
-          <pc:docMk/>
-          <pc:sldMk cId="760065229" sldId="264"/>
-        </pc:sldMkLst>
-      </pc:sldChg>
-      <pc:sldChg chg="del">
-        <pc:chgData name="Dattila  Federico" userId="3fbddd6b-c98a-4780-9364-b5d8323ec50d" providerId="ADAL" clId="{18EE679E-41E9-4931-9DD6-7F62B1A6261A}" dt="2022-11-11T09:19:06.414" v="843" actId="47"/>
-        <pc:sldMkLst>
-          <pc:docMk/>
-          <pc:sldMk cId="1574336124" sldId="265"/>
-        </pc:sldMkLst>
-      </pc:sldChg>
-      <pc:sldChg chg="del">
-        <pc:chgData name="Dattila  Federico" userId="3fbddd6b-c98a-4780-9364-b5d8323ec50d" providerId="ADAL" clId="{18EE679E-41E9-4931-9DD6-7F62B1A6261A}" dt="2022-11-11T09:19:06.414" v="843" actId="47"/>
-        <pc:sldMkLst>
-          <pc:docMk/>
-          <pc:sldMk cId="801364710" sldId="266"/>
-        </pc:sldMkLst>
-      </pc:sldChg>
-      <pc:sldChg chg="del">
-        <pc:chgData name="Dattila  Federico" userId="3fbddd6b-c98a-4780-9364-b5d8323ec50d" providerId="ADAL" clId="{18EE679E-41E9-4931-9DD6-7F62B1A6261A}" dt="2022-11-11T09:19:06.414" v="843" actId="47"/>
-        <pc:sldMkLst>
-          <pc:docMk/>
-          <pc:sldMk cId="2770024964" sldId="267"/>
-        </pc:sldMkLst>
-      </pc:sldChg>
-      <pc:sldChg chg="del">
-        <pc:chgData name="Dattila  Federico" userId="3fbddd6b-c98a-4780-9364-b5d8323ec50d" providerId="ADAL" clId="{18EE679E-41E9-4931-9DD6-7F62B1A6261A}" dt="2022-11-11T09:19:06.414" v="843" actId="47"/>
-        <pc:sldMkLst>
-          <pc:docMk/>
-          <pc:sldMk cId="0" sldId="268"/>
-        </pc:sldMkLst>
-      </pc:sldChg>
-      <pc:sldChg chg="del">
-        <pc:chgData name="Dattila  Federico" userId="3fbddd6b-c98a-4780-9364-b5d8323ec50d" providerId="ADAL" clId="{18EE679E-41E9-4931-9DD6-7F62B1A6261A}" dt="2022-11-11T09:19:06.414" v="843" actId="47"/>
-        <pc:sldMkLst>
-          <pc:docMk/>
-          <pc:sldMk cId="2038449035" sldId="269"/>
-        </pc:sldMkLst>
-      </pc:sldChg>
-      <pc:sldChg chg="del">
-        <pc:chgData name="Dattila  Federico" userId="3fbddd6b-c98a-4780-9364-b5d8323ec50d" providerId="ADAL" clId="{18EE679E-41E9-4931-9DD6-7F62B1A6261A}" dt="2022-11-11T09:19:06.414" v="843" actId="47"/>
-        <pc:sldMkLst>
-          <pc:docMk/>
-          <pc:sldMk cId="1470283120" sldId="270"/>
-        </pc:sldMkLst>
-      </pc:sldChg>
-      <pc:sldChg chg="addSp delSp modSp mod ord delAnim modAnim">
-        <pc:chgData name="Dattila  Federico" userId="3fbddd6b-c98a-4780-9364-b5d8323ec50d" providerId="ADAL" clId="{18EE679E-41E9-4931-9DD6-7F62B1A6261A}" dt="2022-11-11T09:36:58.111" v="1421" actId="1076"/>
-        <pc:sldMkLst>
-          <pc:docMk/>
-          <pc:sldMk cId="0" sldId="279"/>
-        </pc:sldMkLst>
-        <pc:spChg chg="add mod">
-          <ac:chgData name="Dattila  Federico" userId="3fbddd6b-c98a-4780-9364-b5d8323ec50d" providerId="ADAL" clId="{18EE679E-41E9-4931-9DD6-7F62B1A6261A}" dt="2022-11-11T09:27:04.782" v="1224" actId="1038"/>
-          <ac:spMkLst>
-            <pc:docMk/>
-            <pc:sldMk cId="0" sldId="279"/>
-            <ac:spMk id="13" creationId="{C122FCE3-6E6E-8241-2F57-8887F9A618B2}"/>
-          </ac:spMkLst>
-        </pc:spChg>
-        <pc:spChg chg="add mod">
-          <ac:chgData name="Dattila  Federico" userId="3fbddd6b-c98a-4780-9364-b5d8323ec50d" providerId="ADAL" clId="{18EE679E-41E9-4931-9DD6-7F62B1A6261A}" dt="2022-11-11T09:27:12.315" v="1235" actId="20577"/>
-          <ac:spMkLst>
-            <pc:docMk/>
-            <pc:sldMk cId="0" sldId="279"/>
-            <ac:spMk id="14" creationId="{CB0D0576-9D46-28C9-8D61-10B1DE4206D6}"/>
-          </ac:spMkLst>
-        </pc:spChg>
-        <pc:spChg chg="mod">
-          <ac:chgData name="Dattila  Federico" userId="3fbddd6b-c98a-4780-9364-b5d8323ec50d" providerId="ADAL" clId="{18EE679E-41E9-4931-9DD6-7F62B1A6261A}" dt="2022-11-11T09:21:24.518" v="985" actId="20577"/>
-          <ac:spMkLst>
-            <pc:docMk/>
-            <pc:sldMk cId="0" sldId="279"/>
-            <ac:spMk id="20" creationId="{77713033-C2E3-432B-B0A0-DC7F2F5341A1}"/>
-          </ac:spMkLst>
-        </pc:spChg>
-        <pc:spChg chg="mod">
-          <ac:chgData name="Dattila  Federico" userId="3fbddd6b-c98a-4780-9364-b5d8323ec50d" providerId="ADAL" clId="{18EE679E-41E9-4931-9DD6-7F62B1A6261A}" dt="2022-11-11T09:14:13.450" v="783" actId="1036"/>
-          <ac:spMkLst>
-            <pc:docMk/>
-            <pc:sldMk cId="0" sldId="279"/>
-            <ac:spMk id="21" creationId="{BE403EC1-1E79-4C90-B1CD-503CAA384AA8}"/>
-          </ac:spMkLst>
-        </pc:spChg>
-        <pc:spChg chg="del">
-          <ac:chgData name="Dattila  Federico" userId="3fbddd6b-c98a-4780-9364-b5d8323ec50d" providerId="ADAL" clId="{18EE679E-41E9-4931-9DD6-7F62B1A6261A}" dt="2022-11-11T09:13:03.593" v="719" actId="478"/>
-          <ac:spMkLst>
-            <pc:docMk/>
-            <pc:sldMk cId="0" sldId="279"/>
-            <ac:spMk id="23" creationId="{FB364D79-FF42-462A-9AB3-DBA259F01E05}"/>
-          </ac:spMkLst>
-        </pc:spChg>
-        <pc:spChg chg="mod">
-          <ac:chgData name="Dattila  Federico" userId="3fbddd6b-c98a-4780-9364-b5d8323ec50d" providerId="ADAL" clId="{18EE679E-41E9-4931-9DD6-7F62B1A6261A}" dt="2022-11-11T09:26:46.791" v="1193" actId="1076"/>
-          <ac:spMkLst>
-            <pc:docMk/>
-            <pc:sldMk cId="0" sldId="279"/>
-            <ac:spMk id="24" creationId="{2CB8F31B-3294-4D59-B4E5-DFEB37F0ACA5}"/>
-          </ac:spMkLst>
-        </pc:spChg>
-        <pc:spChg chg="mod">
-          <ac:chgData name="Dattila  Federico" userId="3fbddd6b-c98a-4780-9364-b5d8323ec50d" providerId="ADAL" clId="{18EE679E-41E9-4931-9DD6-7F62B1A6261A}" dt="2022-11-11T09:18:23.162" v="811" actId="14100"/>
-          <ac:spMkLst>
-            <pc:docMk/>
-            <pc:sldMk cId="0" sldId="279"/>
-            <ac:spMk id="25" creationId="{87463CF9-4096-49A9-9FAE-E188D30190EE}"/>
-          </ac:spMkLst>
-        </pc:spChg>
-        <pc:spChg chg="mod">
-          <ac:chgData name="Dattila  Federico" userId="3fbddd6b-c98a-4780-9364-b5d8323ec50d" providerId="ADAL" clId="{18EE679E-41E9-4931-9DD6-7F62B1A6261A}" dt="2022-11-11T09:18:27.640" v="812" actId="14100"/>
-          <ac:spMkLst>
-            <pc:docMk/>
-            <pc:sldMk cId="0" sldId="279"/>
-            <ac:spMk id="26" creationId="{A57940FE-49CD-40C9-A8CE-6B971C04022B}"/>
-          </ac:spMkLst>
-        </pc:spChg>
-        <pc:spChg chg="mod">
-          <ac:chgData name="Dattila  Federico" userId="3fbddd6b-c98a-4780-9364-b5d8323ec50d" providerId="ADAL" clId="{18EE679E-41E9-4931-9DD6-7F62B1A6261A}" dt="2022-11-11T09:26:35.985" v="1185" actId="1076"/>
-          <ac:spMkLst>
-            <pc:docMk/>
-            <pc:sldMk cId="0" sldId="279"/>
-            <ac:spMk id="27" creationId="{32B62FEC-795D-4D21-9157-237379BF25C2}"/>
-          </ac:spMkLst>
-        </pc:spChg>
-        <pc:spChg chg="mod">
-          <ac:chgData name="Dattila  Federico" userId="3fbddd6b-c98a-4780-9364-b5d8323ec50d" providerId="ADAL" clId="{18EE679E-41E9-4931-9DD6-7F62B1A6261A}" dt="2022-11-11T09:21:11.026" v="970" actId="2711"/>
-          <ac:spMkLst>
-            <pc:docMk/>
-            <pc:sldMk cId="0" sldId="279"/>
-            <ac:spMk id="37" creationId="{BAEC0785-3CBA-464B-A094-239C880B51E7}"/>
-          </ac:spMkLst>
-        </pc:spChg>
-        <pc:spChg chg="del">
-          <ac:chgData name="Dattila  Federico" userId="3fbddd6b-c98a-4780-9364-b5d8323ec50d" providerId="ADAL" clId="{18EE679E-41E9-4931-9DD6-7F62B1A6261A}" dt="2022-11-11T09:18:30.483" v="813" actId="478"/>
-          <ac:spMkLst>
-            <pc:docMk/>
-            <pc:sldMk cId="0" sldId="279"/>
-            <ac:spMk id="38" creationId="{147E843A-95A1-4F7B-AB53-B74B33F3F471}"/>
-          </ac:spMkLst>
-        </pc:spChg>
-        <pc:picChg chg="add mod">
-          <ac:chgData name="Dattila  Federico" userId="3fbddd6b-c98a-4780-9364-b5d8323ec50d" providerId="ADAL" clId="{18EE679E-41E9-4931-9DD6-7F62B1A6261A}" dt="2022-11-11T09:14:13.450" v="783" actId="1036"/>
-          <ac:picMkLst>
-            <pc:docMk/>
-            <pc:sldMk cId="0" sldId="279"/>
-            <ac:picMk id="2" creationId="{8A4CC532-8FC8-F756-973C-AA3ACD790818}"/>
-          </ac:picMkLst>
-        </pc:picChg>
-        <pc:picChg chg="add mod">
-          <ac:chgData name="Dattila  Federico" userId="3fbddd6b-c98a-4780-9364-b5d8323ec50d" providerId="ADAL" clId="{18EE679E-41E9-4931-9DD6-7F62B1A6261A}" dt="2022-11-11T09:14:13.450" v="783" actId="1036"/>
-          <ac:picMkLst>
-            <pc:docMk/>
-            <pc:sldMk cId="0" sldId="279"/>
-            <ac:picMk id="3" creationId="{B921A496-BF1F-24CC-C050-1E2FEE1BC164}"/>
-          </ac:picMkLst>
-        </pc:picChg>
-        <pc:picChg chg="add mod">
-          <ac:chgData name="Dattila  Federico" userId="3fbddd6b-c98a-4780-9364-b5d8323ec50d" providerId="ADAL" clId="{18EE679E-41E9-4931-9DD6-7F62B1A6261A}" dt="2022-11-11T09:26:43.837" v="1191" actId="1076"/>
-          <ac:picMkLst>
-            <pc:docMk/>
-            <pc:sldMk cId="0" sldId="279"/>
-            <ac:picMk id="4" creationId="{FDEBB82D-6BDD-B2C1-900F-4E994DF36F36}"/>
-          </ac:picMkLst>
-        </pc:picChg>
-        <pc:picChg chg="add mod">
-          <ac:chgData name="Dattila  Federico" userId="3fbddd6b-c98a-4780-9364-b5d8323ec50d" providerId="ADAL" clId="{18EE679E-41E9-4931-9DD6-7F62B1A6261A}" dt="2022-11-11T09:26:44.948" v="1192" actId="1076"/>
-          <ac:picMkLst>
-            <pc:docMk/>
-            <pc:sldMk cId="0" sldId="279"/>
-            <ac:picMk id="6" creationId="{BA235A64-6BE4-2A2A-A3C8-4F52FDD67B58}"/>
-          </ac:picMkLst>
-        </pc:picChg>
-        <pc:picChg chg="add mod">
-          <ac:chgData name="Dattila  Federico" userId="3fbddd6b-c98a-4780-9364-b5d8323ec50d" providerId="ADAL" clId="{18EE679E-41E9-4931-9DD6-7F62B1A6261A}" dt="2022-11-11T09:30:32.511" v="1288" actId="1076"/>
-          <ac:picMkLst>
-            <pc:docMk/>
-            <pc:sldMk cId="0" sldId="279"/>
-            <ac:picMk id="8" creationId="{71ED4586-1026-D5D0-4179-F6E2B1CCA5BC}"/>
-          </ac:picMkLst>
-        </pc:picChg>
-        <pc:picChg chg="add del mod">
-          <ac:chgData name="Dattila  Federico" userId="3fbddd6b-c98a-4780-9364-b5d8323ec50d" providerId="ADAL" clId="{18EE679E-41E9-4931-9DD6-7F62B1A6261A}" dt="2022-11-11T09:25:31.511" v="1143"/>
-          <ac:picMkLst>
-            <pc:docMk/>
-            <pc:sldMk cId="0" sldId="279"/>
-            <ac:picMk id="9" creationId="{A391D91A-ED93-5C29-0C9C-DF871D63894C}"/>
-          </ac:picMkLst>
-        </pc:picChg>
-        <pc:picChg chg="add mod">
-          <ac:chgData name="Dattila  Federico" userId="3fbddd6b-c98a-4780-9364-b5d8323ec50d" providerId="ADAL" clId="{18EE679E-41E9-4931-9DD6-7F62B1A6261A}" dt="2022-11-11T09:27:16.107" v="1252" actId="1037"/>
-          <ac:picMkLst>
-            <pc:docMk/>
-            <pc:sldMk cId="0" sldId="279"/>
-            <ac:picMk id="10" creationId="{FAD121FD-F085-F7B9-FB2D-C77959F560FF}"/>
-          </ac:picMkLst>
-        </pc:picChg>
-        <pc:picChg chg="add mod">
-          <ac:chgData name="Dattila  Federico" userId="3fbddd6b-c98a-4780-9364-b5d8323ec50d" providerId="ADAL" clId="{18EE679E-41E9-4931-9DD6-7F62B1A6261A}" dt="2022-11-11T09:26:04.712" v="1157" actId="14100"/>
-          <ac:picMkLst>
-            <pc:docMk/>
-            <pc:sldMk cId="0" sldId="279"/>
-            <ac:picMk id="11" creationId="{856886AF-FA1C-1E0A-9944-E3D479FCC84A}"/>
-          </ac:picMkLst>
-        </pc:picChg>
-        <pc:picChg chg="add del mod">
-          <ac:chgData name="Dattila  Federico" userId="3fbddd6b-c98a-4780-9364-b5d8323ec50d" providerId="ADAL" clId="{18EE679E-41E9-4931-9DD6-7F62B1A6261A}" dt="2022-11-11T09:25:58.131" v="1153" actId="478"/>
-          <ac:picMkLst>
-            <pc:docMk/>
-            <pc:sldMk cId="0" sldId="279"/>
-            <ac:picMk id="12" creationId="{44E13550-9AEC-1BFE-BAD4-6DF3C32F3705}"/>
-          </ac:picMkLst>
-        </pc:picChg>
-        <pc:picChg chg="add mod">
-          <ac:chgData name="Dattila  Federico" userId="3fbddd6b-c98a-4780-9364-b5d8323ec50d" providerId="ADAL" clId="{18EE679E-41E9-4931-9DD6-7F62B1A6261A}" dt="2022-11-11T09:32:11.049" v="1341" actId="1076"/>
-          <ac:picMkLst>
-            <pc:docMk/>
-            <pc:sldMk cId="0" sldId="279"/>
-            <ac:picMk id="16" creationId="{682D46A2-1EE3-0589-79DC-921B95FC8F39}"/>
-          </ac:picMkLst>
-        </pc:picChg>
-        <pc:picChg chg="add mod">
-          <ac:chgData name="Dattila  Federico" userId="3fbddd6b-c98a-4780-9364-b5d8323ec50d" providerId="ADAL" clId="{18EE679E-41E9-4931-9DD6-7F62B1A6261A}" dt="2022-11-11T09:30:35.788" v="1289" actId="1076"/>
-          <ac:picMkLst>
-            <pc:docMk/>
-            <pc:sldMk cId="0" sldId="279"/>
-            <ac:picMk id="18" creationId="{C97AB270-FD21-1954-4C23-6550241172D7}"/>
-          </ac:picMkLst>
-        </pc:picChg>
-        <pc:picChg chg="add del">
-          <ac:chgData name="Dattila  Federico" userId="3fbddd6b-c98a-4780-9364-b5d8323ec50d" providerId="ADAL" clId="{18EE679E-41E9-4931-9DD6-7F62B1A6261A}" dt="2022-11-11T09:25:31.971" v="1144" actId="478"/>
-          <ac:picMkLst>
-            <pc:docMk/>
-            <pc:sldMk cId="0" sldId="279"/>
-            <ac:picMk id="19" creationId="{36CC1351-2CBE-4030-92F6-66288AF17065}"/>
-          </ac:picMkLst>
-        </pc:picChg>
-        <pc:picChg chg="del">
-          <ac:chgData name="Dattila  Federico" userId="3fbddd6b-c98a-4780-9364-b5d8323ec50d" providerId="ADAL" clId="{18EE679E-41E9-4931-9DD6-7F62B1A6261A}" dt="2022-11-11T09:13:03.067" v="718" actId="478"/>
-          <ac:picMkLst>
-            <pc:docMk/>
-            <pc:sldMk cId="0" sldId="279"/>
-            <ac:picMk id="28" creationId="{53CE47A8-2049-4C36-BD0D-2B67ADDE0ADF}"/>
-          </ac:picMkLst>
-        </pc:picChg>
-        <pc:picChg chg="del">
-          <ac:chgData name="Dattila  Federico" userId="3fbddd6b-c98a-4780-9364-b5d8323ec50d" providerId="ADAL" clId="{18EE679E-41E9-4931-9DD6-7F62B1A6261A}" dt="2022-11-11T09:18:16.660" v="810" actId="478"/>
-          <ac:picMkLst>
-            <pc:docMk/>
-            <pc:sldMk cId="0" sldId="279"/>
-            <ac:picMk id="29" creationId="{74928BB5-6C9F-4505-B66D-23A38F1A3908}"/>
-          </ac:picMkLst>
-        </pc:picChg>
-        <pc:picChg chg="del">
-          <ac:chgData name="Dattila  Federico" userId="3fbddd6b-c98a-4780-9364-b5d8323ec50d" providerId="ADAL" clId="{18EE679E-41E9-4931-9DD6-7F62B1A6261A}" dt="2022-11-11T09:18:16.660" v="810" actId="478"/>
-          <ac:picMkLst>
-            <pc:docMk/>
-            <pc:sldMk cId="0" sldId="279"/>
-            <ac:picMk id="30" creationId="{35EA21E2-28CD-4426-8A15-C4F9671FD835}"/>
-          </ac:picMkLst>
-        </pc:picChg>
-        <pc:picChg chg="del">
-          <ac:chgData name="Dattila  Federico" userId="3fbddd6b-c98a-4780-9364-b5d8323ec50d" providerId="ADAL" clId="{18EE679E-41E9-4931-9DD6-7F62B1A6261A}" dt="2022-11-11T09:13:04.075" v="720" actId="478"/>
-          <ac:picMkLst>
-            <pc:docMk/>
-            <pc:sldMk cId="0" sldId="279"/>
-            <ac:picMk id="31" creationId="{9F9524B0-2BBF-421E-B3CF-424BFCB69EE5}"/>
-          </ac:picMkLst>
-        </pc:picChg>
-        <pc:picChg chg="del">
-          <ac:chgData name="Dattila  Federico" userId="3fbddd6b-c98a-4780-9364-b5d8323ec50d" providerId="ADAL" clId="{18EE679E-41E9-4931-9DD6-7F62B1A6261A}" dt="2022-11-11T09:25:44.358" v="1145" actId="478"/>
-          <ac:picMkLst>
-            <pc:docMk/>
-            <pc:sldMk cId="0" sldId="279"/>
-            <ac:picMk id="32" creationId="{22AF33FC-3F96-4D7D-9290-BD6A5759E782}"/>
-          </ac:picMkLst>
-        </pc:picChg>
-        <pc:picChg chg="del">
-          <ac:chgData name="Dattila  Federico" userId="3fbddd6b-c98a-4780-9364-b5d8323ec50d" providerId="ADAL" clId="{18EE679E-41E9-4931-9DD6-7F62B1A6261A}" dt="2022-11-11T09:25:44.358" v="1145" actId="478"/>
-          <ac:picMkLst>
-            <pc:docMk/>
-            <pc:sldMk cId="0" sldId="279"/>
-            <ac:picMk id="33" creationId="{E882D976-806C-4242-93B7-ACD4D662602C}"/>
-          </ac:picMkLst>
-        </pc:picChg>
-        <pc:picChg chg="del">
-          <ac:chgData name="Dattila  Federico" userId="3fbddd6b-c98a-4780-9364-b5d8323ec50d" providerId="ADAL" clId="{18EE679E-41E9-4931-9DD6-7F62B1A6261A}" dt="2022-11-11T09:25:44.358" v="1145" actId="478"/>
-          <ac:picMkLst>
-            <pc:docMk/>
-            <pc:sldMk cId="0" sldId="279"/>
-            <ac:picMk id="34" creationId="{4657BE61-3D18-4436-88A6-6763E8B57E75}"/>
-          </ac:picMkLst>
-        </pc:picChg>
-        <pc:picChg chg="add mod">
-          <ac:chgData name="Dattila  Federico" userId="3fbddd6b-c98a-4780-9364-b5d8323ec50d" providerId="ADAL" clId="{18EE679E-41E9-4931-9DD6-7F62B1A6261A}" dt="2022-11-11T09:34:11.343" v="1372" actId="1076"/>
-          <ac:picMkLst>
-            <pc:docMk/>
-            <pc:sldMk cId="0" sldId="279"/>
-            <ac:picMk id="35" creationId="{9FA25F69-CCDE-DEF2-6847-9619E09E1154}"/>
-          </ac:picMkLst>
-        </pc:picChg>
-        <pc:picChg chg="add del mod">
-          <ac:chgData name="Dattila  Federico" userId="3fbddd6b-c98a-4780-9364-b5d8323ec50d" providerId="ADAL" clId="{18EE679E-41E9-4931-9DD6-7F62B1A6261A}" dt="2022-11-11T09:32:29.353" v="1344" actId="478"/>
-          <ac:picMkLst>
-            <pc:docMk/>
-            <pc:sldMk cId="0" sldId="279"/>
-            <ac:picMk id="39" creationId="{54C62ACD-3FD6-A932-5089-90E1BE377587}"/>
-          </ac:picMkLst>
-        </pc:picChg>
-        <pc:picChg chg="add mod">
-          <ac:chgData name="Dattila  Federico" userId="3fbddd6b-c98a-4780-9364-b5d8323ec50d" providerId="ADAL" clId="{18EE679E-41E9-4931-9DD6-7F62B1A6261A}" dt="2022-11-11T09:33:20.017" v="1359" actId="1076"/>
-          <ac:picMkLst>
-            <pc:docMk/>
-            <pc:sldMk cId="0" sldId="279"/>
-            <ac:picMk id="41" creationId="{7BF039C5-A3DD-BCA5-3EE5-07188ED48E9B}"/>
-          </ac:picMkLst>
-        </pc:picChg>
-        <pc:picChg chg="add mod">
-          <ac:chgData name="Dattila  Federico" userId="3fbddd6b-c98a-4780-9364-b5d8323ec50d" providerId="ADAL" clId="{18EE679E-41E9-4931-9DD6-7F62B1A6261A}" dt="2022-11-11T09:34:16.237" v="1375" actId="1076"/>
-          <ac:picMkLst>
-            <pc:docMk/>
-            <pc:sldMk cId="0" sldId="279"/>
-            <ac:picMk id="43" creationId="{984F3B54-9EB2-5896-9D59-FF9E88C268B2}"/>
-          </ac:picMkLst>
-        </pc:picChg>
-        <pc:picChg chg="add mod">
-          <ac:chgData name="Dattila  Federico" userId="3fbddd6b-c98a-4780-9364-b5d8323ec50d" providerId="ADAL" clId="{18EE679E-41E9-4931-9DD6-7F62B1A6261A}" dt="2022-11-11T09:35:22.886" v="1409" actId="1036"/>
-          <ac:picMkLst>
-            <pc:docMk/>
-            <pc:sldMk cId="0" sldId="279"/>
-            <ac:picMk id="44" creationId="{B98338CC-90C6-B027-9E6E-3035F5E05DFA}"/>
-          </ac:picMkLst>
-        </pc:picChg>
-        <pc:picChg chg="add del mod">
-          <ac:chgData name="Dattila  Federico" userId="3fbddd6b-c98a-4780-9364-b5d8323ec50d" providerId="ADAL" clId="{18EE679E-41E9-4931-9DD6-7F62B1A6261A}" dt="2022-11-11T09:36:27.865" v="1415" actId="478"/>
-          <ac:picMkLst>
-            <pc:docMk/>
-            <pc:sldMk cId="0" sldId="279"/>
-            <ac:picMk id="46" creationId="{45927045-FCDE-68E2-516E-6F746F5AAB56}"/>
-          </ac:picMkLst>
-        </pc:picChg>
-        <pc:picChg chg="add mod">
-          <ac:chgData name="Dattila  Federico" userId="3fbddd6b-c98a-4780-9364-b5d8323ec50d" providerId="ADAL" clId="{18EE679E-41E9-4931-9DD6-7F62B1A6261A}" dt="2022-11-11T09:36:58.111" v="1421" actId="1076"/>
-          <ac:picMkLst>
-            <pc:docMk/>
-            <pc:sldMk cId="0" sldId="279"/>
-            <ac:picMk id="48" creationId="{E05B9D72-4202-57C9-A3D6-A048208C86FC}"/>
-          </ac:picMkLst>
-        </pc:picChg>
-      </pc:sldChg>
-      <pc:sldChg chg="addSp delSp modSp mod delAnim">
-        <pc:chgData name="Dattila  Federico" userId="3fbddd6b-c98a-4780-9364-b5d8323ec50d" providerId="ADAL" clId="{18EE679E-41E9-4931-9DD6-7F62B1A6261A}" dt="2022-11-11T09:41:42.753" v="1578" actId="1076"/>
-        <pc:sldMkLst>
-          <pc:docMk/>
-          <pc:sldMk cId="0" sldId="280"/>
-        </pc:sldMkLst>
-        <pc:spChg chg="mod">
-          <ac:chgData name="Dattila  Federico" userId="3fbddd6b-c98a-4780-9364-b5d8323ec50d" providerId="ADAL" clId="{18EE679E-41E9-4931-9DD6-7F62B1A6261A}" dt="2022-11-11T09:23:47.254" v="1120" actId="404"/>
-          <ac:spMkLst>
-            <pc:docMk/>
-            <pc:sldMk cId="0" sldId="280"/>
-            <ac:spMk id="8" creationId="{A2BB80A0-FE21-4E12-9084-1460B42F8F92}"/>
-          </ac:spMkLst>
-        </pc:spChg>
-        <pc:spChg chg="mod">
-          <ac:chgData name="Dattila  Federico" userId="3fbddd6b-c98a-4780-9364-b5d8323ec50d" providerId="ADAL" clId="{18EE679E-41E9-4931-9DD6-7F62B1A6261A}" dt="2022-11-11T09:23:47.254" v="1120" actId="404"/>
-          <ac:spMkLst>
-            <pc:docMk/>
-            <pc:sldMk cId="0" sldId="280"/>
-            <ac:spMk id="10" creationId="{ADFB41E0-558E-403F-A6FE-0424E82EC38B}"/>
-          </ac:spMkLst>
-        </pc:spChg>
-        <pc:spChg chg="mod">
-          <ac:chgData name="Dattila  Federico" userId="3fbddd6b-c98a-4780-9364-b5d8323ec50d" providerId="ADAL" clId="{18EE679E-41E9-4931-9DD6-7F62B1A6261A}" dt="2022-11-11T09:23:47.254" v="1120" actId="404"/>
-          <ac:spMkLst>
-            <pc:docMk/>
-            <pc:sldMk cId="0" sldId="280"/>
-            <ac:spMk id="11" creationId="{3714F0F8-537B-4301-B79E-C7C3F19F62E5}"/>
-          </ac:spMkLst>
-        </pc:spChg>
-        <pc:spChg chg="mod">
-          <ac:chgData name="Dattila  Federico" userId="3fbddd6b-c98a-4780-9364-b5d8323ec50d" providerId="ADAL" clId="{18EE679E-41E9-4931-9DD6-7F62B1A6261A}" dt="2022-11-11T09:23:47.254" v="1120" actId="404"/>
-          <ac:spMkLst>
-            <pc:docMk/>
-            <pc:sldMk cId="0" sldId="280"/>
-            <ac:spMk id="13" creationId="{C393488C-29EA-47B6-8ED9-0D7347C84556}"/>
-          </ac:spMkLst>
-        </pc:spChg>
-        <pc:spChg chg="mod">
-          <ac:chgData name="Dattila  Federico" userId="3fbddd6b-c98a-4780-9364-b5d8323ec50d" providerId="ADAL" clId="{18EE679E-41E9-4931-9DD6-7F62B1A6261A}" dt="2022-11-11T09:23:47.254" v="1120" actId="404"/>
-          <ac:spMkLst>
-            <pc:docMk/>
-            <pc:sldMk cId="0" sldId="280"/>
-            <ac:spMk id="24" creationId="{DFDE0C6B-932B-44DB-BFDB-C26BEC822A12}"/>
-          </ac:spMkLst>
-        </pc:spChg>
-        <pc:spChg chg="mod">
-          <ac:chgData name="Dattila  Federico" userId="3fbddd6b-c98a-4780-9364-b5d8323ec50d" providerId="ADAL" clId="{18EE679E-41E9-4931-9DD6-7F62B1A6261A}" dt="2022-11-11T09:23:47.254" v="1120" actId="404"/>
-          <ac:spMkLst>
-            <pc:docMk/>
-            <pc:sldMk cId="0" sldId="280"/>
-            <ac:spMk id="25" creationId="{1D85041F-9C9C-4F05-8B3C-24E9DEEEC4B0}"/>
-          </ac:spMkLst>
-        </pc:spChg>
-        <pc:spChg chg="mod">
-          <ac:chgData name="Dattila  Federico" userId="3fbddd6b-c98a-4780-9364-b5d8323ec50d" providerId="ADAL" clId="{18EE679E-41E9-4931-9DD6-7F62B1A6261A}" dt="2022-11-11T09:23:47.254" v="1120" actId="404"/>
-          <ac:spMkLst>
-            <pc:docMk/>
-            <pc:sldMk cId="0" sldId="280"/>
-            <ac:spMk id="26" creationId="{3269FBCE-8F3F-462C-95B1-EABDBC3C0A23}"/>
-          </ac:spMkLst>
-        </pc:spChg>
-        <pc:spChg chg="add mod">
-          <ac:chgData name="Dattila  Federico" userId="3fbddd6b-c98a-4780-9364-b5d8323ec50d" providerId="ADAL" clId="{18EE679E-41E9-4931-9DD6-7F62B1A6261A}" dt="2022-11-11T09:41:12.924" v="1555" actId="1036"/>
-          <ac:spMkLst>
-            <pc:docMk/>
-            <pc:sldMk cId="0" sldId="280"/>
-            <ac:spMk id="30" creationId="{2639AB2E-24E3-BCAE-B8CE-B5ACE212AC91}"/>
-          </ac:spMkLst>
-        </pc:spChg>
-        <pc:spChg chg="add mod">
-          <ac:chgData name="Dattila  Federico" userId="3fbddd6b-c98a-4780-9364-b5d8323ec50d" providerId="ADAL" clId="{18EE679E-41E9-4931-9DD6-7F62B1A6261A}" dt="2022-11-11T09:41:42.753" v="1578" actId="1076"/>
-          <ac:spMkLst>
-            <pc:docMk/>
-            <pc:sldMk cId="0" sldId="280"/>
-            <ac:spMk id="32" creationId="{58F375AF-2B29-79A8-0235-54D339375B15}"/>
-          </ac:spMkLst>
-        </pc:spChg>
-        <pc:spChg chg="mod">
-          <ac:chgData name="Dattila  Federico" userId="3fbddd6b-c98a-4780-9364-b5d8323ec50d" providerId="ADAL" clId="{18EE679E-41E9-4931-9DD6-7F62B1A6261A}" dt="2022-11-11T09:22:18.790" v="1033" actId="2711"/>
-          <ac:spMkLst>
-            <pc:docMk/>
-            <pc:sldMk cId="0" sldId="280"/>
-            <ac:spMk id="229" creationId="{00000000-0000-0000-0000-000000000000}"/>
-          </ac:spMkLst>
-        </pc:spChg>
-        <pc:grpChg chg="del">
-          <ac:chgData name="Dattila  Federico" userId="3fbddd6b-c98a-4780-9364-b5d8323ec50d" providerId="ADAL" clId="{18EE679E-41E9-4931-9DD6-7F62B1A6261A}" dt="2022-11-11T09:22:01.905" v="1011" actId="478"/>
-          <ac:grpSpMkLst>
-            <pc:docMk/>
-            <pc:sldMk cId="0" sldId="280"/>
-            <ac:grpSpMk id="20" creationId="{BA4C522C-260F-4342-A151-C6E78C2813D8}"/>
-          </ac:grpSpMkLst>
-        </pc:grpChg>
-        <pc:picChg chg="add mod">
-          <ac:chgData name="Dattila  Federico" userId="3fbddd6b-c98a-4780-9364-b5d8323ec50d" providerId="ADAL" clId="{18EE679E-41E9-4931-9DD6-7F62B1A6261A}" dt="2022-11-11T09:38:51.179" v="1514" actId="1076"/>
-          <ac:picMkLst>
-            <pc:docMk/>
-            <pc:sldMk cId="0" sldId="280"/>
-            <ac:picMk id="2" creationId="{9014C70A-4600-2F72-AB39-F448644C732F}"/>
-          </ac:picMkLst>
-        </pc:picChg>
-        <pc:picChg chg="add mod">
-          <ac:chgData name="Dattila  Federico" userId="3fbddd6b-c98a-4780-9364-b5d8323ec50d" providerId="ADAL" clId="{18EE679E-41E9-4931-9DD6-7F62B1A6261A}" dt="2022-11-11T09:39:22.865" v="1521" actId="14100"/>
-          <ac:picMkLst>
-            <pc:docMk/>
-            <pc:sldMk cId="0" sldId="280"/>
-            <ac:picMk id="3" creationId="{C06F9B01-1D97-C8CA-A3B6-772693AACA0D}"/>
-          </ac:picMkLst>
-        </pc:picChg>
-        <pc:picChg chg="add del mod">
-          <ac:chgData name="Dattila  Federico" userId="3fbddd6b-c98a-4780-9364-b5d8323ec50d" providerId="ADAL" clId="{18EE679E-41E9-4931-9DD6-7F62B1A6261A}" dt="2022-11-11T09:39:25.858" v="1523" actId="478"/>
-          <ac:picMkLst>
-            <pc:docMk/>
-            <pc:sldMk cId="0" sldId="280"/>
-            <ac:picMk id="4" creationId="{1BC5AF23-392B-AB57-CD65-8F1A429A1A97}"/>
-          </ac:picMkLst>
-        </pc:picChg>
-        <pc:picChg chg="add mod">
-          <ac:chgData name="Dattila  Federico" userId="3fbddd6b-c98a-4780-9364-b5d8323ec50d" providerId="ADAL" clId="{18EE679E-41E9-4931-9DD6-7F62B1A6261A}" dt="2022-11-11T09:39:19.896" v="1520" actId="14100"/>
-          <ac:picMkLst>
-            <pc:docMk/>
-            <pc:sldMk cId="0" sldId="280"/>
-            <ac:picMk id="6" creationId="{2C44A72B-568B-2FB4-7B13-DDA0DE60F04F}"/>
-          </ac:picMkLst>
-        </pc:picChg>
-        <pc:picChg chg="add del mod">
-          <ac:chgData name="Dattila  Federico" userId="3fbddd6b-c98a-4780-9364-b5d8323ec50d" providerId="ADAL" clId="{18EE679E-41E9-4931-9DD6-7F62B1A6261A}" dt="2022-11-11T09:39:25.171" v="1522" actId="478"/>
-          <ac:picMkLst>
-            <pc:docMk/>
-            <pc:sldMk cId="0" sldId="280"/>
-            <ac:picMk id="7" creationId="{B93A20DA-1ECE-2CFA-6E2F-DC1FF0D5D238}"/>
-          </ac:picMkLst>
-        </pc:picChg>
-        <pc:picChg chg="del">
-          <ac:chgData name="Dattila  Federico" userId="3fbddd6b-c98a-4780-9364-b5d8323ec50d" providerId="ADAL" clId="{18EE679E-41E9-4931-9DD6-7F62B1A6261A}" dt="2022-11-11T09:38:27.404" v="1501" actId="478"/>
-          <ac:picMkLst>
-            <pc:docMk/>
-            <pc:sldMk cId="0" sldId="280"/>
-            <ac:picMk id="12" creationId="{3C1D74F5-3AF7-4A99-9EB9-560B0C80C796}"/>
-          </ac:picMkLst>
-        </pc:picChg>
-        <pc:picChg chg="del">
-          <ac:chgData name="Dattila  Federico" userId="3fbddd6b-c98a-4780-9364-b5d8323ec50d" providerId="ADAL" clId="{18EE679E-41E9-4931-9DD6-7F62B1A6261A}" dt="2022-11-11T09:38:27.404" v="1501" actId="478"/>
-          <ac:picMkLst>
-            <pc:docMk/>
-            <pc:sldMk cId="0" sldId="280"/>
-            <ac:picMk id="14" creationId="{0DB47DB6-AE51-419F-810E-B445F2B5D66C}"/>
-          </ac:picMkLst>
-        </pc:picChg>
-        <pc:picChg chg="del">
-          <ac:chgData name="Dattila  Federico" userId="3fbddd6b-c98a-4780-9364-b5d8323ec50d" providerId="ADAL" clId="{18EE679E-41E9-4931-9DD6-7F62B1A6261A}" dt="2022-11-11T09:38:27.404" v="1501" actId="478"/>
-          <ac:picMkLst>
-            <pc:docMk/>
-            <pc:sldMk cId="0" sldId="280"/>
-            <ac:picMk id="15" creationId="{C3F5C8AC-1524-457D-9BB0-2951F1C875DC}"/>
-          </ac:picMkLst>
-        </pc:picChg>
-        <pc:picChg chg="add del mod">
-          <ac:chgData name="Dattila  Federico" userId="3fbddd6b-c98a-4780-9364-b5d8323ec50d" providerId="ADAL" clId="{18EE679E-41E9-4931-9DD6-7F62B1A6261A}" dt="2022-11-11T09:39:26.331" v="1524" actId="478"/>
-          <ac:picMkLst>
-            <pc:docMk/>
-            <pc:sldMk cId="0" sldId="280"/>
-            <ac:picMk id="16" creationId="{EC0DDBF3-DA10-94A4-A11F-FB5117B19973}"/>
-          </ac:picMkLst>
-        </pc:picChg>
-        <pc:picChg chg="add mod">
-          <ac:chgData name="Dattila  Federico" userId="3fbddd6b-c98a-4780-9364-b5d8323ec50d" providerId="ADAL" clId="{18EE679E-41E9-4931-9DD6-7F62B1A6261A}" dt="2022-11-11T09:39:40.739" v="1536" actId="1035"/>
-          <ac:picMkLst>
-            <pc:docMk/>
-            <pc:sldMk cId="0" sldId="280"/>
-            <ac:picMk id="27" creationId="{186EC150-1C25-324E-E9C4-9846732D08ED}"/>
-          </ac:picMkLst>
-        </pc:picChg>
-        <pc:picChg chg="add del mod">
-          <ac:chgData name="Dattila  Federico" userId="3fbddd6b-c98a-4780-9364-b5d8323ec50d" providerId="ADAL" clId="{18EE679E-41E9-4931-9DD6-7F62B1A6261A}" dt="2022-11-11T09:41:15.596" v="1557" actId="21"/>
-          <ac:picMkLst>
-            <pc:docMk/>
-            <pc:sldMk cId="0" sldId="280"/>
-            <ac:picMk id="29" creationId="{247AF4F8-D62B-8806-EE63-C2420F9B78F6}"/>
-          </ac:picMkLst>
-        </pc:picChg>
-        <pc:picChg chg="add mod">
-          <ac:chgData name="Dattila  Federico" userId="3fbddd6b-c98a-4780-9364-b5d8323ec50d" providerId="ADAL" clId="{18EE679E-41E9-4931-9DD6-7F62B1A6261A}" dt="2022-11-11T09:41:23.252" v="1566" actId="1038"/>
-          <ac:picMkLst>
-            <pc:docMk/>
-            <pc:sldMk cId="0" sldId="280"/>
-            <ac:picMk id="31" creationId="{6BDFD70D-E6C5-1448-3154-4B651BA5A118}"/>
-          </ac:picMkLst>
-        </pc:picChg>
-      </pc:sldChg>
-      <pc:sldChg chg="del">
-        <pc:chgData name="Dattila  Federico" userId="3fbddd6b-c98a-4780-9364-b5d8323ec50d" providerId="ADAL" clId="{18EE679E-41E9-4931-9DD6-7F62B1A6261A}" dt="2022-11-11T08:54:27.611" v="0" actId="47"/>
-        <pc:sldMkLst>
-          <pc:docMk/>
-          <pc:sldMk cId="3783124238" sldId="281"/>
-        </pc:sldMkLst>
-      </pc:sldChg>
-      <pc:sldChg chg="del">
-        <pc:chgData name="Dattila  Federico" userId="3fbddd6b-c98a-4780-9364-b5d8323ec50d" providerId="ADAL" clId="{18EE679E-41E9-4931-9DD6-7F62B1A6261A}" dt="2022-11-11T08:54:27.611" v="0" actId="47"/>
-        <pc:sldMkLst>
-          <pc:docMk/>
-          <pc:sldMk cId="3265213504" sldId="282"/>
-        </pc:sldMkLst>
-      </pc:sldChg>
-      <pc:sldChg chg="del">
-        <pc:chgData name="Dattila  Federico" userId="3fbddd6b-c98a-4780-9364-b5d8323ec50d" providerId="ADAL" clId="{18EE679E-41E9-4931-9DD6-7F62B1A6261A}" dt="2022-11-11T08:54:27.611" v="0" actId="47"/>
-        <pc:sldMkLst>
-          <pc:docMk/>
-          <pc:sldMk cId="4097450072" sldId="283"/>
-        </pc:sldMkLst>
-      </pc:sldChg>
-      <pc:sldChg chg="del">
-        <pc:chgData name="Dattila  Federico" userId="3fbddd6b-c98a-4780-9364-b5d8323ec50d" providerId="ADAL" clId="{18EE679E-41E9-4931-9DD6-7F62B1A6261A}" dt="2022-11-11T08:54:27.611" v="0" actId="47"/>
-        <pc:sldMkLst>
-          <pc:docMk/>
-          <pc:sldMk cId="4104098069" sldId="284"/>
-        </pc:sldMkLst>
-      </pc:sldChg>
-      <pc:sldChg chg="del">
-        <pc:chgData name="Dattila  Federico" userId="3fbddd6b-c98a-4780-9364-b5d8323ec50d" providerId="ADAL" clId="{18EE679E-41E9-4931-9DD6-7F62B1A6261A}" dt="2022-11-11T08:54:27.611" v="0" actId="47"/>
-        <pc:sldMkLst>
-          <pc:docMk/>
-          <pc:sldMk cId="4072651931" sldId="287"/>
-        </pc:sldMkLst>
-      </pc:sldChg>
-      <pc:sldChg chg="del">
-        <pc:chgData name="Dattila  Federico" userId="3fbddd6b-c98a-4780-9364-b5d8323ec50d" providerId="ADAL" clId="{18EE679E-41E9-4931-9DD6-7F62B1A6261A}" dt="2022-11-11T08:54:27.611" v="0" actId="47"/>
-        <pc:sldMkLst>
-          <pc:docMk/>
-          <pc:sldMk cId="1086803257" sldId="289"/>
-        </pc:sldMkLst>
-      </pc:sldChg>
-      <pc:sldChg chg="del">
-        <pc:chgData name="Dattila  Federico" userId="3fbddd6b-c98a-4780-9364-b5d8323ec50d" providerId="ADAL" clId="{18EE679E-41E9-4931-9DD6-7F62B1A6261A}" dt="2022-11-11T09:21:53.248" v="986" actId="47"/>
-        <pc:sldMkLst>
-          <pc:docMk/>
-          <pc:sldMk cId="1167448258" sldId="292"/>
-        </pc:sldMkLst>
-      </pc:sldChg>
-      <pc:sldChg chg="del">
-        <pc:chgData name="Dattila  Federico" userId="3fbddd6b-c98a-4780-9364-b5d8323ec50d" providerId="ADAL" clId="{18EE679E-41E9-4931-9DD6-7F62B1A6261A}" dt="2022-11-11T09:21:53.248" v="986" actId="47"/>
-        <pc:sldMkLst>
-          <pc:docMk/>
-          <pc:sldMk cId="1451960353" sldId="293"/>
-        </pc:sldMkLst>
-      </pc:sldChg>
-      <pc:sldChg chg="del">
-        <pc:chgData name="Dattila  Federico" userId="3fbddd6b-c98a-4780-9364-b5d8323ec50d" providerId="ADAL" clId="{18EE679E-41E9-4931-9DD6-7F62B1A6261A}" dt="2022-11-11T09:21:53.248" v="986" actId="47"/>
-        <pc:sldMkLst>
-          <pc:docMk/>
-          <pc:sldMk cId="1608219557" sldId="294"/>
-        </pc:sldMkLst>
-      </pc:sldChg>
-      <pc:sldChg chg="del">
-        <pc:chgData name="Dattila  Federico" userId="3fbddd6b-c98a-4780-9364-b5d8323ec50d" providerId="ADAL" clId="{18EE679E-41E9-4931-9DD6-7F62B1A6261A}" dt="2022-11-11T09:21:53.248" v="986" actId="47"/>
-        <pc:sldMkLst>
-          <pc:docMk/>
-          <pc:sldMk cId="3375057242" sldId="295"/>
-        </pc:sldMkLst>
-      </pc:sldChg>
-      <pc:sldChg chg="del">
-        <pc:chgData name="Dattila  Federico" userId="3fbddd6b-c98a-4780-9364-b5d8323ec50d" providerId="ADAL" clId="{18EE679E-41E9-4931-9DD6-7F62B1A6261A}" dt="2022-11-11T09:21:53.248" v="986" actId="47"/>
-        <pc:sldMkLst>
-          <pc:docMk/>
-          <pc:sldMk cId="3119991986" sldId="296"/>
-        </pc:sldMkLst>
-      </pc:sldChg>
-      <pc:sldChg chg="del">
-        <pc:chgData name="Dattila  Federico" userId="3fbddd6b-c98a-4780-9364-b5d8323ec50d" providerId="ADAL" clId="{18EE679E-41E9-4931-9DD6-7F62B1A6261A}" dt="2022-11-11T08:54:27.611" v="0" actId="47"/>
-        <pc:sldMkLst>
-          <pc:docMk/>
-          <pc:sldMk cId="1780214847" sldId="297"/>
-        </pc:sldMkLst>
-      </pc:sldChg>
-      <pc:sldChg chg="modSp mod">
-        <pc:chgData name="Dattila  Federico" userId="3fbddd6b-c98a-4780-9364-b5d8323ec50d" providerId="ADAL" clId="{18EE679E-41E9-4931-9DD6-7F62B1A6261A}" dt="2022-11-11T09:23:54.793" v="1121" actId="2711"/>
-        <pc:sldMkLst>
-          <pc:docMk/>
-          <pc:sldMk cId="0" sldId="298"/>
-        </pc:sldMkLst>
-        <pc:spChg chg="mod">
-          <ac:chgData name="Dattila  Federico" userId="3fbddd6b-c98a-4780-9364-b5d8323ec50d" providerId="ADAL" clId="{18EE679E-41E9-4931-9DD6-7F62B1A6261A}" dt="2022-11-11T09:23:54.793" v="1121" actId="2711"/>
-          <ac:spMkLst>
-            <pc:docMk/>
-            <pc:sldMk cId="0" sldId="298"/>
-            <ac:spMk id="9" creationId="{79C25129-00FF-40A5-A911-44BCB4388F7E}"/>
-          </ac:spMkLst>
-        </pc:spChg>
-      </pc:sldChg>
-      <pc:sldChg chg="modSp mod">
-        <pc:chgData name="Dattila  Federico" userId="3fbddd6b-c98a-4780-9364-b5d8323ec50d" providerId="ADAL" clId="{18EE679E-41E9-4931-9DD6-7F62B1A6261A}" dt="2022-11-11T09:20:49.284" v="967" actId="2711"/>
-        <pc:sldMkLst>
-          <pc:docMk/>
-          <pc:sldMk cId="0" sldId="299"/>
-        </pc:sldMkLst>
-        <pc:spChg chg="mod">
-          <ac:chgData name="Dattila  Federico" userId="3fbddd6b-c98a-4780-9364-b5d8323ec50d" providerId="ADAL" clId="{18EE679E-41E9-4931-9DD6-7F62B1A6261A}" dt="2022-11-11T09:20:49.284" v="967" actId="2711"/>
-          <ac:spMkLst>
-            <pc:docMk/>
-            <pc:sldMk cId="0" sldId="299"/>
-            <ac:spMk id="14" creationId="{3F5C20E8-3965-4370-80E2-50A0C1A8D084}"/>
-          </ac:spMkLst>
-        </pc:spChg>
-      </pc:sldChg>
-      <pc:sldChg chg="del">
-        <pc:chgData name="Dattila  Federico" userId="3fbddd6b-c98a-4780-9364-b5d8323ec50d" providerId="ADAL" clId="{18EE679E-41E9-4931-9DD6-7F62B1A6261A}" dt="2022-11-11T08:54:27.611" v="0" actId="47"/>
-        <pc:sldMkLst>
-          <pc:docMk/>
-          <pc:sldMk cId="692038972" sldId="300"/>
-        </pc:sldMkLst>
-      </pc:sldChg>
-      <pc:sldChg chg="del">
-        <pc:chgData name="Dattila  Federico" userId="3fbddd6b-c98a-4780-9364-b5d8323ec50d" providerId="ADAL" clId="{18EE679E-41E9-4931-9DD6-7F62B1A6261A}" dt="2022-11-11T09:19:06.414" v="843" actId="47"/>
-        <pc:sldMkLst>
-          <pc:docMk/>
-          <pc:sldMk cId="0" sldId="301"/>
-        </pc:sldMkLst>
-      </pc:sldChg>
-      <pc:sldChg chg="del">
-        <pc:chgData name="Dattila  Federico" userId="3fbddd6b-c98a-4780-9364-b5d8323ec50d" providerId="ADAL" clId="{18EE679E-41E9-4931-9DD6-7F62B1A6261A}" dt="2022-11-11T08:54:27.611" v="0" actId="47"/>
-        <pc:sldMkLst>
-          <pc:docMk/>
-          <pc:sldMk cId="1285445637" sldId="302"/>
-        </pc:sldMkLst>
-      </pc:sldChg>
-      <pc:sldChg chg="del">
-        <pc:chgData name="Dattila  Federico" userId="3fbddd6b-c98a-4780-9364-b5d8323ec50d" providerId="ADAL" clId="{18EE679E-41E9-4931-9DD6-7F62B1A6261A}" dt="2022-11-11T08:54:38.261" v="3" actId="47"/>
-        <pc:sldMkLst>
-          <pc:docMk/>
-          <pc:sldMk cId="1844760682" sldId="303"/>
-        </pc:sldMkLst>
-      </pc:sldChg>
-      <pc:sldChg chg="del">
-        <pc:chgData name="Dattila  Federico" userId="3fbddd6b-c98a-4780-9364-b5d8323ec50d" providerId="ADAL" clId="{18EE679E-41E9-4931-9DD6-7F62B1A6261A}" dt="2022-11-11T08:54:27.611" v="0" actId="47"/>
-        <pc:sldMkLst>
-          <pc:docMk/>
-          <pc:sldMk cId="1025206574" sldId="304"/>
-        </pc:sldMkLst>
-      </pc:sldChg>
-      <pc:sldChg chg="del">
-        <pc:chgData name="Dattila  Federico" userId="3fbddd6b-c98a-4780-9364-b5d8323ec50d" providerId="ADAL" clId="{18EE679E-41E9-4931-9DD6-7F62B1A6261A}" dt="2022-11-11T08:54:38.261" v="3" actId="47"/>
-        <pc:sldMkLst>
-          <pc:docMk/>
-          <pc:sldMk cId="1289898536" sldId="305"/>
-        </pc:sldMkLst>
-      </pc:sldChg>
-      <pc:sldChg chg="del">
-        <pc:chgData name="Dattila  Federico" userId="3fbddd6b-c98a-4780-9364-b5d8323ec50d" providerId="ADAL" clId="{18EE679E-41E9-4931-9DD6-7F62B1A6261A}" dt="2022-11-11T08:54:27.611" v="0" actId="47"/>
-        <pc:sldMkLst>
-          <pc:docMk/>
-          <pc:sldMk cId="593639724" sldId="306"/>
-        </pc:sldMkLst>
-      </pc:sldChg>
-      <pc:sldChg chg="del">
-        <pc:chgData name="Dattila  Federico" userId="3fbddd6b-c98a-4780-9364-b5d8323ec50d" providerId="ADAL" clId="{18EE679E-41E9-4931-9DD6-7F62B1A6261A}" dt="2022-11-11T08:54:27.611" v="0" actId="47"/>
-        <pc:sldMkLst>
-          <pc:docMk/>
-          <pc:sldMk cId="3561633507" sldId="307"/>
-        </pc:sldMkLst>
-      </pc:sldChg>
-      <pc:sldChg chg="del">
-        <pc:chgData name="Dattila  Federico" userId="3fbddd6b-c98a-4780-9364-b5d8323ec50d" providerId="ADAL" clId="{18EE679E-41E9-4931-9DD6-7F62B1A6261A}" dt="2022-11-11T08:54:27.611" v="0" actId="47"/>
-        <pc:sldMkLst>
-          <pc:docMk/>
-          <pc:sldMk cId="1894622572" sldId="308"/>
-        </pc:sldMkLst>
-      </pc:sldChg>
-      <pc:sldChg chg="del">
-        <pc:chgData name="Dattila  Federico" userId="3fbddd6b-c98a-4780-9364-b5d8323ec50d" providerId="ADAL" clId="{18EE679E-41E9-4931-9DD6-7F62B1A6261A}" dt="2022-11-11T08:54:27.611" v="0" actId="47"/>
-        <pc:sldMkLst>
-          <pc:docMk/>
-          <pc:sldMk cId="2642039371" sldId="309"/>
-        </pc:sldMkLst>
-      </pc:sldChg>
-      <pc:sldChg chg="del">
-        <pc:chgData name="Dattila  Federico" userId="3fbddd6b-c98a-4780-9364-b5d8323ec50d" providerId="ADAL" clId="{18EE679E-41E9-4931-9DD6-7F62B1A6261A}" dt="2022-11-11T08:54:27.611" v="0" actId="47"/>
-        <pc:sldMkLst>
-          <pc:docMk/>
-          <pc:sldMk cId="2830619208" sldId="310"/>
-        </pc:sldMkLst>
-      </pc:sldChg>
-      <pc:sldChg chg="modSp mod">
-        <pc:chgData name="Dattila  Federico" userId="3fbddd6b-c98a-4780-9364-b5d8323ec50d" providerId="ADAL" clId="{18EE679E-41E9-4931-9DD6-7F62B1A6261A}" dt="2022-11-13T09:08:44.623" v="2546" actId="20577"/>
-        <pc:sldMkLst>
-          <pc:docMk/>
-          <pc:sldMk cId="2917766515" sldId="317"/>
-        </pc:sldMkLst>
-        <pc:spChg chg="mod">
-          <ac:chgData name="Dattila  Federico" userId="3fbddd6b-c98a-4780-9364-b5d8323ec50d" providerId="ADAL" clId="{18EE679E-41E9-4931-9DD6-7F62B1A6261A}" dt="2022-11-11T09:24:10.602" v="1134" actId="1037"/>
-          <ac:spMkLst>
-            <pc:docMk/>
-            <pc:sldMk cId="2917766515" sldId="317"/>
-            <ac:spMk id="2" creationId="{4BC7D281-B25B-4224-8C5B-33CBE0610ED8}"/>
-          </ac:spMkLst>
-        </pc:spChg>
-        <pc:spChg chg="mod">
-          <ac:chgData name="Dattila  Federico" userId="3fbddd6b-c98a-4780-9364-b5d8323ec50d" providerId="ADAL" clId="{18EE679E-41E9-4931-9DD6-7F62B1A6261A}" dt="2022-11-11T09:19:54.939" v="900" actId="2711"/>
-          <ac:spMkLst>
-            <pc:docMk/>
-            <pc:sldMk cId="2917766515" sldId="317"/>
-            <ac:spMk id="6" creationId="{4AB29B91-2DF1-413B-B72B-A0B271CEAD96}"/>
-          </ac:spMkLst>
-        </pc:spChg>
-        <pc:spChg chg="mod">
-          <ac:chgData name="Dattila  Federico" userId="3fbddd6b-c98a-4780-9364-b5d8323ec50d" providerId="ADAL" clId="{18EE679E-41E9-4931-9DD6-7F62B1A6261A}" dt="2022-11-13T09:08:44.623" v="2546" actId="20577"/>
-          <ac:spMkLst>
-            <pc:docMk/>
-            <pc:sldMk cId="2917766515" sldId="317"/>
-            <ac:spMk id="7" creationId="{4D878854-348A-4EB4-BB4F-09D40247B095}"/>
-          </ac:spMkLst>
-        </pc:spChg>
-      </pc:sldChg>
-      <pc:sldChg chg="modSp mod modAnim">
-        <pc:chgData name="Dattila  Federico" userId="3fbddd6b-c98a-4780-9364-b5d8323ec50d" providerId="ADAL" clId="{18EE679E-41E9-4931-9DD6-7F62B1A6261A}" dt="2022-11-11T09:23:36.418" v="1118" actId="404"/>
-        <pc:sldMkLst>
-          <pc:docMk/>
-          <pc:sldMk cId="587251823" sldId="321"/>
-        </pc:sldMkLst>
-        <pc:spChg chg="mod">
-          <ac:chgData name="Dattila  Federico" userId="3fbddd6b-c98a-4780-9364-b5d8323ec50d" providerId="ADAL" clId="{18EE679E-41E9-4931-9DD6-7F62B1A6261A}" dt="2022-11-11T09:23:36.418" v="1118" actId="404"/>
-          <ac:spMkLst>
-            <pc:docMk/>
-            <pc:sldMk cId="587251823" sldId="321"/>
-            <ac:spMk id="6" creationId="{0EECAB96-737D-4979-8126-90824C9969E5}"/>
-          </ac:spMkLst>
-        </pc:spChg>
-        <pc:spChg chg="mod">
-          <ac:chgData name="Dattila  Federico" userId="3fbddd6b-c98a-4780-9364-b5d8323ec50d" providerId="ADAL" clId="{18EE679E-41E9-4931-9DD6-7F62B1A6261A}" dt="2022-11-11T09:23:32.778" v="1117" actId="404"/>
-          <ac:spMkLst>
-            <pc:docMk/>
-            <pc:sldMk cId="587251823" sldId="321"/>
-            <ac:spMk id="7" creationId="{C427D355-58FF-4A6D-8A58-6EF79F33C02D}"/>
-          </ac:spMkLst>
-        </pc:spChg>
-        <pc:spChg chg="mod">
-          <ac:chgData name="Dattila  Federico" userId="3fbddd6b-c98a-4780-9364-b5d8323ec50d" providerId="ADAL" clId="{18EE679E-41E9-4931-9DD6-7F62B1A6261A}" dt="2022-11-11T09:23:27.753" v="1116" actId="2711"/>
-          <ac:spMkLst>
-            <pc:docMk/>
-            <pc:sldMk cId="587251823" sldId="321"/>
-            <ac:spMk id="8" creationId="{029EBBF4-F14D-4138-9D67-98541FD34DCE}"/>
-          </ac:spMkLst>
-        </pc:spChg>
-        <pc:spChg chg="mod">
-          <ac:chgData name="Dattila  Federico" userId="3fbddd6b-c98a-4780-9364-b5d8323ec50d" providerId="ADAL" clId="{18EE679E-41E9-4931-9DD6-7F62B1A6261A}" dt="2022-11-11T09:23:27.753" v="1116" actId="2711"/>
-          <ac:spMkLst>
-            <pc:docMk/>
-            <pc:sldMk cId="587251823" sldId="321"/>
-            <ac:spMk id="9" creationId="{456BFD1D-EB70-40E5-A5F4-310330C17660}"/>
-          </ac:spMkLst>
-        </pc:spChg>
-        <pc:spChg chg="mod">
-          <ac:chgData name="Dattila  Federico" userId="3fbddd6b-c98a-4780-9364-b5d8323ec50d" providerId="ADAL" clId="{18EE679E-41E9-4931-9DD6-7F62B1A6261A}" dt="2022-11-11T09:23:27.753" v="1116" actId="2711"/>
-          <ac:spMkLst>
-            <pc:docMk/>
-            <pc:sldMk cId="587251823" sldId="321"/>
-            <ac:spMk id="11" creationId="{8BEA08B3-3C5A-4742-BDBA-47687FF417D8}"/>
-          </ac:spMkLst>
-        </pc:spChg>
-        <pc:spChg chg="mod">
-          <ac:chgData name="Dattila  Federico" userId="3fbddd6b-c98a-4780-9364-b5d8323ec50d" providerId="ADAL" clId="{18EE679E-41E9-4931-9DD6-7F62B1A6261A}" dt="2022-11-11T09:23:27.753" v="1116" actId="2711"/>
-          <ac:spMkLst>
-            <pc:docMk/>
-            <pc:sldMk cId="587251823" sldId="321"/>
-            <ac:spMk id="12" creationId="{43C7BAAE-B3CF-4595-9598-8D9D852DBADA}"/>
-          </ac:spMkLst>
-        </pc:spChg>
-        <pc:spChg chg="mod">
-          <ac:chgData name="Dattila  Federico" userId="3fbddd6b-c98a-4780-9364-b5d8323ec50d" providerId="ADAL" clId="{18EE679E-41E9-4931-9DD6-7F62B1A6261A}" dt="2022-11-11T09:23:27.753" v="1116" actId="2711"/>
-          <ac:spMkLst>
-            <pc:docMk/>
-            <pc:sldMk cId="587251823" sldId="321"/>
-            <ac:spMk id="13" creationId="{8A7C2B15-1F79-4D76-B841-357461D0E43B}"/>
-          </ac:spMkLst>
-        </pc:spChg>
-        <pc:spChg chg="mod">
-          <ac:chgData name="Dattila  Federico" userId="3fbddd6b-c98a-4780-9364-b5d8323ec50d" providerId="ADAL" clId="{18EE679E-41E9-4931-9DD6-7F62B1A6261A}" dt="2022-11-11T09:22:32.145" v="1037" actId="207"/>
-          <ac:spMkLst>
-            <pc:docMk/>
-            <pc:sldMk cId="587251823" sldId="321"/>
-            <ac:spMk id="14" creationId="{AC2A94F2-2859-41BE-877F-682D0AE3A9CF}"/>
-          </ac:spMkLst>
-        </pc:spChg>
-      </pc:sldChg>
-      <pc:sldChg chg="del">
-        <pc:chgData name="Dattila  Federico" userId="3fbddd6b-c98a-4780-9364-b5d8323ec50d" providerId="ADAL" clId="{18EE679E-41E9-4931-9DD6-7F62B1A6261A}" dt="2022-11-11T08:54:38.261" v="3" actId="47"/>
-        <pc:sldMkLst>
-          <pc:docMk/>
-          <pc:sldMk cId="169951774" sldId="322"/>
-        </pc:sldMkLst>
-      </pc:sldChg>
-      <pc:sldChg chg="del">
-        <pc:chgData name="Dattila  Federico" userId="3fbddd6b-c98a-4780-9364-b5d8323ec50d" providerId="ADAL" clId="{18EE679E-41E9-4931-9DD6-7F62B1A6261A}" dt="2022-11-11T08:54:27.611" v="0" actId="47"/>
-        <pc:sldMkLst>
-          <pc:docMk/>
-          <pc:sldMk cId="4107675775" sldId="326"/>
-        </pc:sldMkLst>
-      </pc:sldChg>
-      <pc:sldChg chg="del">
-        <pc:chgData name="Dattila  Federico" userId="3fbddd6b-c98a-4780-9364-b5d8323ec50d" providerId="ADAL" clId="{18EE679E-41E9-4931-9DD6-7F62B1A6261A}" dt="2022-11-11T08:54:27.611" v="0" actId="47"/>
-        <pc:sldMkLst>
-          <pc:docMk/>
-          <pc:sldMk cId="662920670" sldId="327"/>
-        </pc:sldMkLst>
-      </pc:sldChg>
-      <pc:sldChg chg="del">
-        <pc:chgData name="Dattila  Federico" userId="3fbddd6b-c98a-4780-9364-b5d8323ec50d" providerId="ADAL" clId="{18EE679E-41E9-4931-9DD6-7F62B1A6261A}" dt="2022-11-11T08:54:27.611" v="0" actId="47"/>
-        <pc:sldMkLst>
-          <pc:docMk/>
-          <pc:sldMk cId="1471917221" sldId="328"/>
-        </pc:sldMkLst>
-      </pc:sldChg>
-      <pc:sldChg chg="del">
-        <pc:chgData name="Dattila  Federico" userId="3fbddd6b-c98a-4780-9364-b5d8323ec50d" providerId="ADAL" clId="{18EE679E-41E9-4931-9DD6-7F62B1A6261A}" dt="2022-11-11T08:54:27.611" v="0" actId="47"/>
-        <pc:sldMkLst>
-          <pc:docMk/>
-          <pc:sldMk cId="1684283537" sldId="329"/>
-        </pc:sldMkLst>
-      </pc:sldChg>
-      <pc:sldChg chg="del">
-        <pc:chgData name="Dattila  Federico" userId="3fbddd6b-c98a-4780-9364-b5d8323ec50d" providerId="ADAL" clId="{18EE679E-41E9-4931-9DD6-7F62B1A6261A}" dt="2022-11-11T08:54:27.611" v="0" actId="47"/>
-        <pc:sldMkLst>
-          <pc:docMk/>
-          <pc:sldMk cId="1560821151" sldId="330"/>
-        </pc:sldMkLst>
-      </pc:sldChg>
-      <pc:sldChg chg="del">
-        <pc:chgData name="Dattila  Federico" userId="3fbddd6b-c98a-4780-9364-b5d8323ec50d" providerId="ADAL" clId="{18EE679E-41E9-4931-9DD6-7F62B1A6261A}" dt="2022-11-11T08:54:27.611" v="0" actId="47"/>
-        <pc:sldMkLst>
-          <pc:docMk/>
-          <pc:sldMk cId="2706251987" sldId="331"/>
-        </pc:sldMkLst>
-      </pc:sldChg>
-      <pc:sldChg chg="del">
-        <pc:chgData name="Dattila  Federico" userId="3fbddd6b-c98a-4780-9364-b5d8323ec50d" providerId="ADAL" clId="{18EE679E-41E9-4931-9DD6-7F62B1A6261A}" dt="2022-11-11T08:54:27.611" v="0" actId="47"/>
-        <pc:sldMkLst>
-          <pc:docMk/>
-          <pc:sldMk cId="3616049239" sldId="332"/>
-        </pc:sldMkLst>
-      </pc:sldChg>
-      <pc:sldChg chg="del">
-        <pc:chgData name="Dattila  Federico" userId="3fbddd6b-c98a-4780-9364-b5d8323ec50d" providerId="ADAL" clId="{18EE679E-41E9-4931-9DD6-7F62B1A6261A}" dt="2022-11-11T08:54:27.611" v="0" actId="47"/>
-        <pc:sldMkLst>
-          <pc:docMk/>
-          <pc:sldMk cId="3440417238" sldId="333"/>
-        </pc:sldMkLst>
-      </pc:sldChg>
-      <pc:sldChg chg="del">
-        <pc:chgData name="Dattila  Federico" userId="3fbddd6b-c98a-4780-9364-b5d8323ec50d" providerId="ADAL" clId="{18EE679E-41E9-4931-9DD6-7F62B1A6261A}" dt="2022-11-11T08:54:27.611" v="0" actId="47"/>
-        <pc:sldMkLst>
-          <pc:docMk/>
-          <pc:sldMk cId="2372063015" sldId="334"/>
-        </pc:sldMkLst>
-      </pc:sldChg>
-      <pc:sldChg chg="del">
-        <pc:chgData name="Dattila  Federico" userId="3fbddd6b-c98a-4780-9364-b5d8323ec50d" providerId="ADAL" clId="{18EE679E-41E9-4931-9DD6-7F62B1A6261A}" dt="2022-11-11T08:54:27.611" v="0" actId="47"/>
-        <pc:sldMkLst>
-          <pc:docMk/>
-          <pc:sldMk cId="4002168915" sldId="335"/>
-        </pc:sldMkLst>
-      </pc:sldChg>
-      <pc:sldChg chg="del">
-        <pc:chgData name="Dattila  Federico" userId="3fbddd6b-c98a-4780-9364-b5d8323ec50d" providerId="ADAL" clId="{18EE679E-41E9-4931-9DD6-7F62B1A6261A}" dt="2022-11-11T08:54:27.611" v="0" actId="47"/>
-        <pc:sldMkLst>
-          <pc:docMk/>
-          <pc:sldMk cId="3922719342" sldId="336"/>
-        </pc:sldMkLst>
-      </pc:sldChg>
-      <pc:sldChg chg="del">
-        <pc:chgData name="Dattila  Federico" userId="3fbddd6b-c98a-4780-9364-b5d8323ec50d" providerId="ADAL" clId="{18EE679E-41E9-4931-9DD6-7F62B1A6261A}" dt="2022-11-11T08:54:27.611" v="0" actId="47"/>
-        <pc:sldMkLst>
-          <pc:docMk/>
-          <pc:sldMk cId="1987299846" sldId="337"/>
-        </pc:sldMkLst>
-      </pc:sldChg>
-      <pc:sldChg chg="del">
-        <pc:chgData name="Dattila  Federico" userId="3fbddd6b-c98a-4780-9364-b5d8323ec50d" providerId="ADAL" clId="{18EE679E-41E9-4931-9DD6-7F62B1A6261A}" dt="2022-11-11T08:54:27.611" v="0" actId="47"/>
-        <pc:sldMkLst>
-          <pc:docMk/>
-          <pc:sldMk cId="495391885" sldId="338"/>
-        </pc:sldMkLst>
-      </pc:sldChg>
-      <pc:sldChg chg="del">
-        <pc:chgData name="Dattila  Federico" userId="3fbddd6b-c98a-4780-9364-b5d8323ec50d" providerId="ADAL" clId="{18EE679E-41E9-4931-9DD6-7F62B1A6261A}" dt="2022-11-11T09:19:06.414" v="843" actId="47"/>
-        <pc:sldMkLst>
-          <pc:docMk/>
-          <pc:sldMk cId="0" sldId="339"/>
-        </pc:sldMkLst>
-      </pc:sldChg>
-      <pc:sldChg chg="del">
-        <pc:chgData name="Dattila  Federico" userId="3fbddd6b-c98a-4780-9364-b5d8323ec50d" providerId="ADAL" clId="{18EE679E-41E9-4931-9DD6-7F62B1A6261A}" dt="2022-11-11T09:19:06.414" v="843" actId="47"/>
-        <pc:sldMkLst>
-          <pc:docMk/>
-          <pc:sldMk cId="0" sldId="340"/>
-        </pc:sldMkLst>
-      </pc:sldChg>
-      <pc:sldChg chg="del">
-        <pc:chgData name="Dattila  Federico" userId="3fbddd6b-c98a-4780-9364-b5d8323ec50d" providerId="ADAL" clId="{18EE679E-41E9-4931-9DD6-7F62B1A6261A}" dt="2022-11-11T09:19:06.414" v="843" actId="47"/>
-        <pc:sldMkLst>
-          <pc:docMk/>
-          <pc:sldMk cId="0" sldId="341"/>
-        </pc:sldMkLst>
-      </pc:sldChg>
-      <pc:sldChg chg="del">
-        <pc:chgData name="Dattila  Federico" userId="3fbddd6b-c98a-4780-9364-b5d8323ec50d" providerId="ADAL" clId="{18EE679E-41E9-4931-9DD6-7F62B1A6261A}" dt="2022-11-11T09:19:06.414" v="843" actId="47"/>
-        <pc:sldMkLst>
-          <pc:docMk/>
-          <pc:sldMk cId="0" sldId="342"/>
-        </pc:sldMkLst>
-      </pc:sldChg>
-      <pc:sldChg chg="del">
-        <pc:chgData name="Dattila  Federico" userId="3fbddd6b-c98a-4780-9364-b5d8323ec50d" providerId="ADAL" clId="{18EE679E-41E9-4931-9DD6-7F62B1A6261A}" dt="2022-11-11T09:19:06.414" v="843" actId="47"/>
-        <pc:sldMkLst>
-          <pc:docMk/>
-          <pc:sldMk cId="0" sldId="343"/>
-        </pc:sldMkLst>
-      </pc:sldChg>
-      <pc:sldChg chg="del">
-        <pc:chgData name="Dattila  Federico" userId="3fbddd6b-c98a-4780-9364-b5d8323ec50d" providerId="ADAL" clId="{18EE679E-41E9-4931-9DD6-7F62B1A6261A}" dt="2022-11-11T09:19:06.414" v="843" actId="47"/>
-        <pc:sldMkLst>
-          <pc:docMk/>
-          <pc:sldMk cId="0" sldId="344"/>
-        </pc:sldMkLst>
-      </pc:sldChg>
-      <pc:sldChg chg="del">
-        <pc:chgData name="Dattila  Federico" userId="3fbddd6b-c98a-4780-9364-b5d8323ec50d" providerId="ADAL" clId="{18EE679E-41E9-4931-9DD6-7F62B1A6261A}" dt="2022-11-11T09:19:06.414" v="843" actId="47"/>
-        <pc:sldMkLst>
-          <pc:docMk/>
-          <pc:sldMk cId="0" sldId="345"/>
-        </pc:sldMkLst>
-      </pc:sldChg>
-      <pc:sldChg chg="del">
-        <pc:chgData name="Dattila  Federico" userId="3fbddd6b-c98a-4780-9364-b5d8323ec50d" providerId="ADAL" clId="{18EE679E-41E9-4931-9DD6-7F62B1A6261A}" dt="2022-11-11T09:19:06.414" v="843" actId="47"/>
-        <pc:sldMkLst>
-          <pc:docMk/>
-          <pc:sldMk cId="0" sldId="346"/>
-        </pc:sldMkLst>
-      </pc:sldChg>
-      <pc:sldChg chg="del">
-        <pc:chgData name="Dattila  Federico" userId="3fbddd6b-c98a-4780-9364-b5d8323ec50d" providerId="ADAL" clId="{18EE679E-41E9-4931-9DD6-7F62B1A6261A}" dt="2022-11-11T09:19:06.414" v="843" actId="47"/>
-        <pc:sldMkLst>
-          <pc:docMk/>
-          <pc:sldMk cId="950332960" sldId="347"/>
-        </pc:sldMkLst>
-      </pc:sldChg>
-      <pc:sldChg chg="del">
-        <pc:chgData name="Dattila  Federico" userId="3fbddd6b-c98a-4780-9364-b5d8323ec50d" providerId="ADAL" clId="{18EE679E-41E9-4931-9DD6-7F62B1A6261A}" dt="2022-11-11T09:19:06.414" v="843" actId="47"/>
-        <pc:sldMkLst>
-          <pc:docMk/>
-          <pc:sldMk cId="1617367759" sldId="348"/>
-        </pc:sldMkLst>
-      </pc:sldChg>
-      <pc:sldChg chg="del">
-        <pc:chgData name="Dattila  Federico" userId="3fbddd6b-c98a-4780-9364-b5d8323ec50d" providerId="ADAL" clId="{18EE679E-41E9-4931-9DD6-7F62B1A6261A}" dt="2022-11-11T09:19:06.414" v="843" actId="47"/>
-        <pc:sldMkLst>
-          <pc:docMk/>
-          <pc:sldMk cId="2660913979" sldId="349"/>
-        </pc:sldMkLst>
-      </pc:sldChg>
-      <pc:sldChg chg="del">
-        <pc:chgData name="Dattila  Federico" userId="3fbddd6b-c98a-4780-9364-b5d8323ec50d" providerId="ADAL" clId="{18EE679E-41E9-4931-9DD6-7F62B1A6261A}" dt="2022-11-11T09:19:06.414" v="843" actId="47"/>
-        <pc:sldMkLst>
-          <pc:docMk/>
-          <pc:sldMk cId="1789808120" sldId="350"/>
-        </pc:sldMkLst>
-      </pc:sldChg>
-      <pc:sldChg chg="del">
-        <pc:chgData name="Dattila  Federico" userId="3fbddd6b-c98a-4780-9364-b5d8323ec50d" providerId="ADAL" clId="{18EE679E-41E9-4931-9DD6-7F62B1A6261A}" dt="2022-11-11T09:19:06.414" v="843" actId="47"/>
-        <pc:sldMkLst>
-          <pc:docMk/>
-          <pc:sldMk cId="257401131" sldId="351"/>
-        </pc:sldMkLst>
-      </pc:sldChg>
-      <pc:sldChg chg="del">
-        <pc:chgData name="Dattila  Federico" userId="3fbddd6b-c98a-4780-9364-b5d8323ec50d" providerId="ADAL" clId="{18EE679E-41E9-4931-9DD6-7F62B1A6261A}" dt="2022-11-11T09:19:06.414" v="843" actId="47"/>
-        <pc:sldMkLst>
-          <pc:docMk/>
-          <pc:sldMk cId="300843091" sldId="352"/>
-        </pc:sldMkLst>
-      </pc:sldChg>
-      <pc:sldChg chg="del">
-        <pc:chgData name="Dattila  Federico" userId="3fbddd6b-c98a-4780-9364-b5d8323ec50d" providerId="ADAL" clId="{18EE679E-41E9-4931-9DD6-7F62B1A6261A}" dt="2022-11-11T09:19:06.414" v="843" actId="47"/>
-        <pc:sldMkLst>
-          <pc:docMk/>
-          <pc:sldMk cId="2470890062" sldId="353"/>
-        </pc:sldMkLst>
-      </pc:sldChg>
-      <pc:sldChg chg="del">
-        <pc:chgData name="Dattila  Federico" userId="3fbddd6b-c98a-4780-9364-b5d8323ec50d" providerId="ADAL" clId="{18EE679E-41E9-4931-9DD6-7F62B1A6261A}" dt="2022-11-11T09:19:06.414" v="843" actId="47"/>
-        <pc:sldMkLst>
-          <pc:docMk/>
-          <pc:sldMk cId="416447925" sldId="354"/>
-        </pc:sldMkLst>
-      </pc:sldChg>
-      <pc:sldChg chg="del">
-        <pc:chgData name="Dattila  Federico" userId="3fbddd6b-c98a-4780-9364-b5d8323ec50d" providerId="ADAL" clId="{18EE679E-41E9-4931-9DD6-7F62B1A6261A}" dt="2022-11-11T09:19:06.414" v="843" actId="47"/>
-        <pc:sldMkLst>
-          <pc:docMk/>
-          <pc:sldMk cId="2620660277" sldId="355"/>
-        </pc:sldMkLst>
-      </pc:sldChg>
-      <pc:sldChg chg="del">
-        <pc:chgData name="Dattila  Federico" userId="3fbddd6b-c98a-4780-9364-b5d8323ec50d" providerId="ADAL" clId="{18EE679E-41E9-4931-9DD6-7F62B1A6261A}" dt="2022-11-11T08:54:38.261" v="3" actId="47"/>
-        <pc:sldMkLst>
-          <pc:docMk/>
-          <pc:sldMk cId="0" sldId="361"/>
-        </pc:sldMkLst>
-      </pc:sldChg>
-      <pc:sldChg chg="modSp mod">
-        <pc:chgData name="Dattila  Federico" userId="3fbddd6b-c98a-4780-9364-b5d8323ec50d" providerId="ADAL" clId="{18EE679E-41E9-4931-9DD6-7F62B1A6261A}" dt="2022-11-11T09:21:00.021" v="968" actId="2711"/>
-        <pc:sldMkLst>
-          <pc:docMk/>
-          <pc:sldMk cId="2666003908" sldId="362"/>
-        </pc:sldMkLst>
-        <pc:spChg chg="mod">
-          <ac:chgData name="Dattila  Federico" userId="3fbddd6b-c98a-4780-9364-b5d8323ec50d" providerId="ADAL" clId="{18EE679E-41E9-4931-9DD6-7F62B1A6261A}" dt="2022-11-11T09:08:02.383" v="683" actId="404"/>
-          <ac:spMkLst>
-            <pc:docMk/>
-            <pc:sldMk cId="2666003908" sldId="362"/>
-            <ac:spMk id="123" creationId="{00000000-0000-0000-0000-000000000000}"/>
-          </ac:spMkLst>
-        </pc:spChg>
-        <pc:spChg chg="mod">
-          <ac:chgData name="Dattila  Federico" userId="3fbddd6b-c98a-4780-9364-b5d8323ec50d" providerId="ADAL" clId="{18EE679E-41E9-4931-9DD6-7F62B1A6261A}" dt="2022-11-11T09:21:00.021" v="968" actId="2711"/>
-          <ac:spMkLst>
-            <pc:docMk/>
-            <pc:sldMk cId="2666003908" sldId="362"/>
-            <ac:spMk id="124" creationId="{00000000-0000-0000-0000-000000000000}"/>
-          </ac:spMkLst>
-        </pc:spChg>
-      </pc:sldChg>
-      <pc:sldChg chg="modSp mod modAnim">
-        <pc:chgData name="Dattila  Federico" userId="3fbddd6b-c98a-4780-9364-b5d8323ec50d" providerId="ADAL" clId="{18EE679E-41E9-4931-9DD6-7F62B1A6261A}" dt="2022-11-13T09:08:11.685" v="2545"/>
-        <pc:sldMkLst>
-          <pc:docMk/>
-          <pc:sldMk cId="3491877896" sldId="363"/>
-        </pc:sldMkLst>
-        <pc:spChg chg="mod">
-          <ac:chgData name="Dattila  Federico" userId="3fbddd6b-c98a-4780-9364-b5d8323ec50d" providerId="ADAL" clId="{18EE679E-41E9-4931-9DD6-7F62B1A6261A}" dt="2022-11-11T09:21:05.537" v="969" actId="2711"/>
-          <ac:spMkLst>
-            <pc:docMk/>
-            <pc:sldMk cId="3491877896" sldId="363"/>
-            <ac:spMk id="126" creationId="{00000000-0000-0000-0000-000000000000}"/>
-          </ac:spMkLst>
-        </pc:spChg>
-      </pc:sldChg>
-      <pc:sldChg chg="del">
-        <pc:chgData name="Dattila  Federico" userId="3fbddd6b-c98a-4780-9364-b5d8323ec50d" providerId="ADAL" clId="{18EE679E-41E9-4931-9DD6-7F62B1A6261A}" dt="2022-11-11T09:19:06.414" v="843" actId="47"/>
-        <pc:sldMkLst>
-          <pc:docMk/>
-          <pc:sldMk cId="233494984" sldId="364"/>
-        </pc:sldMkLst>
-      </pc:sldChg>
-      <pc:sldChg chg="addSp delSp modSp new mod">
-        <pc:chgData name="Dattila  Federico" userId="3fbddd6b-c98a-4780-9364-b5d8323ec50d" providerId="ADAL" clId="{18EE679E-41E9-4931-9DD6-7F62B1A6261A}" dt="2022-11-11T09:46:56.843" v="1714" actId="1076"/>
-        <pc:sldMkLst>
-          <pc:docMk/>
-          <pc:sldMk cId="1678568122" sldId="364"/>
-        </pc:sldMkLst>
-        <pc:spChg chg="del">
-          <ac:chgData name="Dattila  Federico" userId="3fbddd6b-c98a-4780-9364-b5d8323ec50d" providerId="ADAL" clId="{18EE679E-41E9-4931-9DD6-7F62B1A6261A}" dt="2022-11-11T09:41:49.792" v="1580" actId="478"/>
-          <ac:spMkLst>
-            <pc:docMk/>
-            <pc:sldMk cId="1678568122" sldId="364"/>
-            <ac:spMk id="2" creationId="{7EEDA7A5-98F7-209A-6B08-4A355F97F535}"/>
-          </ac:spMkLst>
-        </pc:spChg>
-        <pc:spChg chg="del">
-          <ac:chgData name="Dattila  Federico" userId="3fbddd6b-c98a-4780-9364-b5d8323ec50d" providerId="ADAL" clId="{18EE679E-41E9-4931-9DD6-7F62B1A6261A}" dt="2022-11-11T09:41:50.842" v="1581" actId="478"/>
-          <ac:spMkLst>
-            <pc:docMk/>
-            <pc:sldMk cId="1678568122" sldId="364"/>
-            <ac:spMk id="3" creationId="{27CEF0D0-CB77-87E2-625A-5360A21338E3}"/>
-          </ac:spMkLst>
-        </pc:spChg>
-        <pc:spChg chg="add del mod">
-          <ac:chgData name="Dattila  Federico" userId="3fbddd6b-c98a-4780-9364-b5d8323ec50d" providerId="ADAL" clId="{18EE679E-41E9-4931-9DD6-7F62B1A6261A}" dt="2022-11-11T09:45:18.581" v="1702" actId="478"/>
-          <ac:spMkLst>
-            <pc:docMk/>
-            <pc:sldMk cId="1678568122" sldId="364"/>
-            <ac:spMk id="9" creationId="{4D521D36-4288-DDD5-47ED-D7679EB64DF6}"/>
-          </ac:spMkLst>
-        </pc:spChg>
-        <pc:picChg chg="add mod modCrop">
-          <ac:chgData name="Dattila  Federico" userId="3fbddd6b-c98a-4780-9364-b5d8323ec50d" providerId="ADAL" clId="{18EE679E-41E9-4931-9DD6-7F62B1A6261A}" dt="2022-11-11T09:43:08.300" v="1593" actId="732"/>
-          <ac:picMkLst>
-            <pc:docMk/>
-            <pc:sldMk cId="1678568122" sldId="364"/>
-            <ac:picMk id="5" creationId="{89BF8FE1-1A74-B151-313C-D0D88B5C85BD}"/>
-          </ac:picMkLst>
-        </pc:picChg>
-        <pc:picChg chg="add mod">
-          <ac:chgData name="Dattila  Federico" userId="3fbddd6b-c98a-4780-9364-b5d8323ec50d" providerId="ADAL" clId="{18EE679E-41E9-4931-9DD6-7F62B1A6261A}" dt="2022-11-11T09:46:39.913" v="1707" actId="1038"/>
-          <ac:picMkLst>
-            <pc:docMk/>
-            <pc:sldMk cId="1678568122" sldId="364"/>
-            <ac:picMk id="6" creationId="{D72D90E4-ED07-DA34-EF63-93318C5E375A}"/>
-          </ac:picMkLst>
-        </pc:picChg>
-        <pc:picChg chg="add mod">
-          <ac:chgData name="Dattila  Federico" userId="3fbddd6b-c98a-4780-9364-b5d8323ec50d" providerId="ADAL" clId="{18EE679E-41E9-4931-9DD6-7F62B1A6261A}" dt="2022-11-11T09:44:43.883" v="1619" actId="1035"/>
-          <ac:picMkLst>
-            <pc:docMk/>
-            <pc:sldMk cId="1678568122" sldId="364"/>
-            <ac:picMk id="8" creationId="{79A554D1-9E3D-2CA1-E2D9-A9D6C35FBE7A}"/>
-          </ac:picMkLst>
-        </pc:picChg>
-        <pc:picChg chg="add mod">
-          <ac:chgData name="Dattila  Federico" userId="3fbddd6b-c98a-4780-9364-b5d8323ec50d" providerId="ADAL" clId="{18EE679E-41E9-4931-9DD6-7F62B1A6261A}" dt="2022-11-11T09:46:56.843" v="1714" actId="1076"/>
-          <ac:picMkLst>
-            <pc:docMk/>
-            <pc:sldMk cId="1678568122" sldId="364"/>
-            <ac:picMk id="10" creationId="{75D5BEC7-039D-6E3A-75C2-04CD9316196A}"/>
-          </ac:picMkLst>
-        </pc:picChg>
-      </pc:sldChg>
-      <pc:sldChg chg="del">
-        <pc:chgData name="Dattila  Federico" userId="3fbddd6b-c98a-4780-9364-b5d8323ec50d" providerId="ADAL" clId="{18EE679E-41E9-4931-9DD6-7F62B1A6261A}" dt="2022-11-11T09:19:06.414" v="843" actId="47"/>
-        <pc:sldMkLst>
-          <pc:docMk/>
-          <pc:sldMk cId="932882912" sldId="365"/>
-        </pc:sldMkLst>
-      </pc:sldChg>
-      <pc:sldChg chg="addSp delSp modSp new mod delAnim modAnim">
-        <pc:chgData name="Dattila  Federico" userId="3fbddd6b-c98a-4780-9364-b5d8323ec50d" providerId="ADAL" clId="{18EE679E-41E9-4931-9DD6-7F62B1A6261A}" dt="2022-11-13T11:03:31.728" v="2627"/>
-        <pc:sldMkLst>
-          <pc:docMk/>
-          <pc:sldMk cId="1178301773" sldId="365"/>
-        </pc:sldMkLst>
-        <pc:spChg chg="del">
-          <ac:chgData name="Dattila  Federico" userId="3fbddd6b-c98a-4780-9364-b5d8323ec50d" providerId="ADAL" clId="{18EE679E-41E9-4931-9DD6-7F62B1A6261A}" dt="2022-11-11T09:47:05.773" v="1716" actId="478"/>
-          <ac:spMkLst>
-            <pc:docMk/>
-            <pc:sldMk cId="1178301773" sldId="365"/>
-            <ac:spMk id="2" creationId="{681D756F-70C9-E7A2-F1A4-1D9B8C081413}"/>
-          </ac:spMkLst>
-        </pc:spChg>
-        <pc:spChg chg="del">
-          <ac:chgData name="Dattila  Federico" userId="3fbddd6b-c98a-4780-9364-b5d8323ec50d" providerId="ADAL" clId="{18EE679E-41E9-4931-9DD6-7F62B1A6261A}" dt="2022-11-11T09:47:06.963" v="1717" actId="478"/>
-          <ac:spMkLst>
-            <pc:docMk/>
-            <pc:sldMk cId="1178301773" sldId="365"/>
-            <ac:spMk id="3" creationId="{3DDBA3AB-9895-6018-D0AB-0F1CF75690CC}"/>
-          </ac:spMkLst>
-        </pc:spChg>
-        <pc:spChg chg="add mod">
-          <ac:chgData name="Dattila  Federico" userId="3fbddd6b-c98a-4780-9364-b5d8323ec50d" providerId="ADAL" clId="{18EE679E-41E9-4931-9DD6-7F62B1A6261A}" dt="2022-11-11T09:51:29.638" v="2036" actId="404"/>
-          <ac:spMkLst>
-            <pc:docMk/>
-            <pc:sldMk cId="1178301773" sldId="365"/>
-            <ac:spMk id="10" creationId="{D5EC3236-1AF1-036D-BDA9-7C4299D10EC9}"/>
-          </ac:spMkLst>
-        </pc:spChg>
-        <pc:spChg chg="add mod">
-          <ac:chgData name="Dattila  Federico" userId="3fbddd6b-c98a-4780-9364-b5d8323ec50d" providerId="ADAL" clId="{18EE679E-41E9-4931-9DD6-7F62B1A6261A}" dt="2022-11-13T09:09:36.588" v="2548" actId="20577"/>
-          <ac:spMkLst>
-            <pc:docMk/>
-            <pc:sldMk cId="1178301773" sldId="365"/>
-            <ac:spMk id="11" creationId="{D9FED98C-5C73-B2F3-8929-ECED233DA1C7}"/>
-          </ac:spMkLst>
-        </pc:spChg>
-        <pc:spChg chg="add mod">
-          <ac:chgData name="Dattila  Federico" userId="3fbddd6b-c98a-4780-9364-b5d8323ec50d" providerId="ADAL" clId="{18EE679E-41E9-4931-9DD6-7F62B1A6261A}" dt="2022-11-11T09:51:29.638" v="2036" actId="404"/>
-          <ac:spMkLst>
-            <pc:docMk/>
-            <pc:sldMk cId="1178301773" sldId="365"/>
-            <ac:spMk id="12" creationId="{147CF1BF-5594-A0D5-D4DD-EE1D6B1F01C1}"/>
-          </ac:spMkLst>
-        </pc:spChg>
-        <pc:spChg chg="add mod">
-          <ac:chgData name="Dattila  Federico" userId="3fbddd6b-c98a-4780-9364-b5d8323ec50d" providerId="ADAL" clId="{18EE679E-41E9-4931-9DD6-7F62B1A6261A}" dt="2022-11-13T09:09:41.110" v="2550" actId="20577"/>
-          <ac:spMkLst>
-            <pc:docMk/>
-            <pc:sldMk cId="1178301773" sldId="365"/>
-            <ac:spMk id="13" creationId="{ADAB539E-18A2-D39D-175F-94B192F63C4E}"/>
-          </ac:spMkLst>
-        </pc:spChg>
-        <pc:spChg chg="add mod">
-          <ac:chgData name="Dattila  Federico" userId="3fbddd6b-c98a-4780-9364-b5d8323ec50d" providerId="ADAL" clId="{18EE679E-41E9-4931-9DD6-7F62B1A6261A}" dt="2022-11-13T09:09:43.521" v="2552" actId="20577"/>
-          <ac:spMkLst>
-            <pc:docMk/>
-            <pc:sldMk cId="1178301773" sldId="365"/>
-            <ac:spMk id="14" creationId="{8652BF97-302F-BD33-D092-00C827BF2E07}"/>
-          </ac:spMkLst>
-        </pc:spChg>
-        <pc:spChg chg="add mod">
-          <ac:chgData name="Dattila  Federico" userId="3fbddd6b-c98a-4780-9364-b5d8323ec50d" providerId="ADAL" clId="{18EE679E-41E9-4931-9DD6-7F62B1A6261A}" dt="2022-11-11T09:54:08.346" v="2162" actId="20577"/>
-          <ac:spMkLst>
-            <pc:docMk/>
-            <pc:sldMk cId="1178301773" sldId="365"/>
-            <ac:spMk id="15" creationId="{0503460B-B7D4-54F9-5398-C1F432375695}"/>
-          </ac:spMkLst>
-        </pc:spChg>
-        <pc:spChg chg="add mod">
-          <ac:chgData name="Dattila  Federico" userId="3fbddd6b-c98a-4780-9364-b5d8323ec50d" providerId="ADAL" clId="{18EE679E-41E9-4931-9DD6-7F62B1A6261A}" dt="2022-11-11T09:48:17.620" v="1735" actId="20577"/>
-          <ac:spMkLst>
-            <pc:docMk/>
-            <pc:sldMk cId="1178301773" sldId="365"/>
-            <ac:spMk id="16" creationId="{C3C4B75F-E07B-74CD-675D-AC022CF9901F}"/>
-          </ac:spMkLst>
-        </pc:spChg>
-        <pc:spChg chg="add mod">
-          <ac:chgData name="Dattila  Federico" userId="3fbddd6b-c98a-4780-9364-b5d8323ec50d" providerId="ADAL" clId="{18EE679E-41E9-4931-9DD6-7F62B1A6261A}" dt="2022-11-11T09:51:29.638" v="2036" actId="404"/>
-          <ac:spMkLst>
-            <pc:docMk/>
-            <pc:sldMk cId="1178301773" sldId="365"/>
-            <ac:spMk id="17" creationId="{B9FD2EDD-743A-1573-F4B0-663FC1A032FA}"/>
-          </ac:spMkLst>
-        </pc:spChg>
-        <pc:spChg chg="add mod">
-          <ac:chgData name="Dattila  Federico" userId="3fbddd6b-c98a-4780-9364-b5d8323ec50d" providerId="ADAL" clId="{18EE679E-41E9-4931-9DD6-7F62B1A6261A}" dt="2022-11-11T09:51:29.638" v="2036" actId="404"/>
-          <ac:spMkLst>
-            <pc:docMk/>
-            <pc:sldMk cId="1178301773" sldId="365"/>
-            <ac:spMk id="18" creationId="{DCEBB8ED-4A62-33AD-CE4F-020D3D1F09CA}"/>
-          </ac:spMkLst>
-        </pc:spChg>
-        <pc:spChg chg="add mod">
-          <ac:chgData name="Dattila  Federico" userId="3fbddd6b-c98a-4780-9364-b5d8323ec50d" providerId="ADAL" clId="{18EE679E-41E9-4931-9DD6-7F62B1A6261A}" dt="2022-11-11T09:51:29.638" v="2036" actId="404"/>
-          <ac:spMkLst>
-            <pc:docMk/>
-            <pc:sldMk cId="1178301773" sldId="365"/>
-            <ac:spMk id="19" creationId="{5D02EFE2-D94D-57A1-2D58-FBE61AC771DB}"/>
-          </ac:spMkLst>
-        </pc:spChg>
-        <pc:spChg chg="add mod">
-          <ac:chgData name="Dattila  Federico" userId="3fbddd6b-c98a-4780-9364-b5d8323ec50d" providerId="ADAL" clId="{18EE679E-41E9-4931-9DD6-7F62B1A6261A}" dt="2022-11-11T09:51:29.638" v="2036" actId="404"/>
-          <ac:spMkLst>
-            <pc:docMk/>
-            <pc:sldMk cId="1178301773" sldId="365"/>
-            <ac:spMk id="20" creationId="{99BC8C31-F5A9-D15F-D6B3-A1794837BA84}"/>
-          </ac:spMkLst>
-        </pc:spChg>
-        <pc:spChg chg="add mod">
-          <ac:chgData name="Dattila  Federico" userId="3fbddd6b-c98a-4780-9364-b5d8323ec50d" providerId="ADAL" clId="{18EE679E-41E9-4931-9DD6-7F62B1A6261A}" dt="2022-11-11T09:51:29.638" v="2036" actId="404"/>
-          <ac:spMkLst>
-            <pc:docMk/>
-            <pc:sldMk cId="1178301773" sldId="365"/>
-            <ac:spMk id="21" creationId="{ECB99356-2394-CF31-9FA1-8E54F397F096}"/>
-          </ac:spMkLst>
-        </pc:spChg>
-        <pc:spChg chg="add mod">
-          <ac:chgData name="Dattila  Federico" userId="3fbddd6b-c98a-4780-9364-b5d8323ec50d" providerId="ADAL" clId="{18EE679E-41E9-4931-9DD6-7F62B1A6261A}" dt="2022-11-13T11:03:31.728" v="2627"/>
-          <ac:spMkLst>
-            <pc:docMk/>
-            <pc:sldMk cId="1178301773" sldId="365"/>
-            <ac:spMk id="22" creationId="{2B18EA2B-1B43-ABCB-F038-F8A8A54C344E}"/>
-          </ac:spMkLst>
-        </pc:spChg>
-        <pc:spChg chg="add mod">
-          <ac:chgData name="Dattila  Federico" userId="3fbddd6b-c98a-4780-9364-b5d8323ec50d" providerId="ADAL" clId="{18EE679E-41E9-4931-9DD6-7F62B1A6261A}" dt="2022-11-11T09:58:25.444" v="2381" actId="20577"/>
-          <ac:spMkLst>
-            <pc:docMk/>
-            <pc:sldMk cId="1178301773" sldId="365"/>
-            <ac:spMk id="23" creationId="{DFA65DC4-60A1-A2DF-A958-3CBFFA96C274}"/>
-          </ac:spMkLst>
-        </pc:spChg>
-        <pc:spChg chg="add mod">
-          <ac:chgData name="Dattila  Federico" userId="3fbddd6b-c98a-4780-9364-b5d8323ec50d" providerId="ADAL" clId="{18EE679E-41E9-4931-9DD6-7F62B1A6261A}" dt="2022-11-11T10:04:50.264" v="2446" actId="20577"/>
-          <ac:spMkLst>
-            <pc:docMk/>
-            <pc:sldMk cId="1178301773" sldId="365"/>
-            <ac:spMk id="24" creationId="{B8B0096C-1B3D-981E-B18F-146BC56DF28F}"/>
-          </ac:spMkLst>
-        </pc:spChg>
-        <pc:spChg chg="add mod">
-          <ac:chgData name="Dattila  Federico" userId="3fbddd6b-c98a-4780-9364-b5d8323ec50d" providerId="ADAL" clId="{18EE679E-41E9-4931-9DD6-7F62B1A6261A}" dt="2022-11-11T09:58:29.788" v="2385" actId="20577"/>
-          <ac:spMkLst>
-            <pc:docMk/>
-            <pc:sldMk cId="1178301773" sldId="365"/>
-            <ac:spMk id="25" creationId="{236512C3-3403-5BAF-F5D6-7F12248C70D2}"/>
-          </ac:spMkLst>
-        </pc:spChg>
-        <pc:spChg chg="add mod">
-          <ac:chgData name="Dattila  Federico" userId="3fbddd6b-c98a-4780-9364-b5d8323ec50d" providerId="ADAL" clId="{18EE679E-41E9-4931-9DD6-7F62B1A6261A}" dt="2022-11-11T09:58:31.737" v="2387" actId="20577"/>
-          <ac:spMkLst>
-            <pc:docMk/>
-            <pc:sldMk cId="1178301773" sldId="365"/>
-            <ac:spMk id="26" creationId="{3C23B4B6-8416-74D3-9A45-5447C96F2546}"/>
-          </ac:spMkLst>
-        </pc:spChg>
-        <pc:spChg chg="add del mod">
-          <ac:chgData name="Dattila  Federico" userId="3fbddd6b-c98a-4780-9364-b5d8323ec50d" providerId="ADAL" clId="{18EE679E-41E9-4931-9DD6-7F62B1A6261A}" dt="2022-11-11T09:51:18.698" v="2034" actId="478"/>
-          <ac:spMkLst>
-            <pc:docMk/>
-            <pc:sldMk cId="1178301773" sldId="365"/>
-            <ac:spMk id="28" creationId="{64CA98DD-EBFE-B580-37DD-CA286BD00DEF}"/>
-          </ac:spMkLst>
-        </pc:spChg>
-        <pc:spChg chg="add mod">
-          <ac:chgData name="Dattila  Federico" userId="3fbddd6b-c98a-4780-9364-b5d8323ec50d" providerId="ADAL" clId="{18EE679E-41E9-4931-9DD6-7F62B1A6261A}" dt="2022-11-11T09:58:20.265" v="2377" actId="1037"/>
-          <ac:spMkLst>
-            <pc:docMk/>
-            <pc:sldMk cId="1178301773" sldId="365"/>
-            <ac:spMk id="36" creationId="{7DE7F212-20B5-D3FD-54E6-C0D8D9C5E899}"/>
-          </ac:spMkLst>
-        </pc:spChg>
-        <pc:picChg chg="add del mod">
-          <ac:chgData name="Dattila  Federico" userId="3fbddd6b-c98a-4780-9364-b5d8323ec50d" providerId="ADAL" clId="{18EE679E-41E9-4931-9DD6-7F62B1A6261A}" dt="2022-11-11T09:47:55.688" v="1719" actId="478"/>
-          <ac:picMkLst>
-            <pc:docMk/>
-            <pc:sldMk cId="1178301773" sldId="365"/>
-            <ac:picMk id="4" creationId="{F6FE7CC1-C81E-6BD7-1178-1163F7C33DB2}"/>
-          </ac:picMkLst>
-        </pc:picChg>
-        <pc:picChg chg="add del mod">
-          <ac:chgData name="Dattila  Federico" userId="3fbddd6b-c98a-4780-9364-b5d8323ec50d" providerId="ADAL" clId="{18EE679E-41E9-4931-9DD6-7F62B1A6261A}" dt="2022-11-11T09:47:58.065" v="1720" actId="478"/>
-          <ac:picMkLst>
-            <pc:docMk/>
-            <pc:sldMk cId="1178301773" sldId="365"/>
-            <ac:picMk id="5" creationId="{2CC5C8E5-419B-D8E1-0C3A-53CB3D61FED4}"/>
-          </ac:picMkLst>
-        </pc:picChg>
-        <pc:picChg chg="add del mod">
-          <ac:chgData name="Dattila  Federico" userId="3fbddd6b-c98a-4780-9364-b5d8323ec50d" providerId="ADAL" clId="{18EE679E-41E9-4931-9DD6-7F62B1A6261A}" dt="2022-11-11T09:54:39.217" v="2174" actId="478"/>
-          <ac:picMkLst>
-            <pc:docMk/>
-            <pc:sldMk cId="1178301773" sldId="365"/>
-            <ac:picMk id="6" creationId="{DE0E8A9E-BCFF-A616-169D-FA858E402B3C}"/>
-          </ac:picMkLst>
-        </pc:picChg>
-        <pc:picChg chg="add del mod">
-          <ac:chgData name="Dattila  Federico" userId="3fbddd6b-c98a-4780-9364-b5d8323ec50d" providerId="ADAL" clId="{18EE679E-41E9-4931-9DD6-7F62B1A6261A}" dt="2022-11-11T09:54:38.792" v="2173" actId="478"/>
-          <ac:picMkLst>
-            <pc:docMk/>
-            <pc:sldMk cId="1178301773" sldId="365"/>
-            <ac:picMk id="7" creationId="{4695D657-56B9-57C3-5AAB-C7C0E0C96698}"/>
-          </ac:picMkLst>
-        </pc:picChg>
-        <pc:picChg chg="add del mod">
-          <ac:chgData name="Dattila  Federico" userId="3fbddd6b-c98a-4780-9364-b5d8323ec50d" providerId="ADAL" clId="{18EE679E-41E9-4931-9DD6-7F62B1A6261A}" dt="2022-11-11T09:52:00.332" v="2043" actId="478"/>
-          <ac:picMkLst>
-            <pc:docMk/>
-            <pc:sldMk cId="1178301773" sldId="365"/>
-            <ac:picMk id="8" creationId="{E9A01FD7-2261-B859-D149-C13E509FF8D6}"/>
-          </ac:picMkLst>
-        </pc:picChg>
-        <pc:picChg chg="add del mod">
-          <ac:chgData name="Dattila  Federico" userId="3fbddd6b-c98a-4780-9364-b5d8323ec50d" providerId="ADAL" clId="{18EE679E-41E9-4931-9DD6-7F62B1A6261A}" dt="2022-11-11T09:52:03.866" v="2045" actId="478"/>
-          <ac:picMkLst>
-            <pc:docMk/>
-            <pc:sldMk cId="1178301773" sldId="365"/>
-            <ac:picMk id="9" creationId="{36E59DBD-20A7-6118-E048-68198B4883E8}"/>
-          </ac:picMkLst>
-        </pc:picChg>
-        <pc:picChg chg="add del mod">
-          <ac:chgData name="Dattila  Federico" userId="3fbddd6b-c98a-4780-9364-b5d8323ec50d" providerId="ADAL" clId="{18EE679E-41E9-4931-9DD6-7F62B1A6261A}" dt="2022-11-11T09:51:16.698" v="2033" actId="478"/>
-          <ac:picMkLst>
-            <pc:docMk/>
-            <pc:sldMk cId="1178301773" sldId="365"/>
-            <ac:picMk id="27" creationId="{1F294788-3721-67CA-A18D-5C6CE3CD5A2B}"/>
-          </ac:picMkLst>
-        </pc:picChg>
-        <pc:picChg chg="add mod">
-          <ac:chgData name="Dattila  Federico" userId="3fbddd6b-c98a-4780-9364-b5d8323ec50d" providerId="ADAL" clId="{18EE679E-41E9-4931-9DD6-7F62B1A6261A}" dt="2022-11-11T09:51:49.642" v="2040" actId="1076"/>
-          <ac:picMkLst>
-            <pc:docMk/>
-            <pc:sldMk cId="1178301773" sldId="365"/>
-            <ac:picMk id="29" creationId="{178FEC8D-3866-DFFF-78E4-B88B974EEDF2}"/>
-          </ac:picMkLst>
-        </pc:picChg>
-        <pc:picChg chg="add mod">
-          <ac:chgData name="Dattila  Federico" userId="3fbddd6b-c98a-4780-9364-b5d8323ec50d" providerId="ADAL" clId="{18EE679E-41E9-4931-9DD6-7F62B1A6261A}" dt="2022-11-11T09:52:02.847" v="2044" actId="1076"/>
-          <ac:picMkLst>
-            <pc:docMk/>
-            <pc:sldMk cId="1178301773" sldId="365"/>
-            <ac:picMk id="30" creationId="{4CD68EE3-A1A9-0D5F-BB24-38C3DCE6D3AD}"/>
-          </ac:picMkLst>
-        </pc:picChg>
-        <pc:picChg chg="add mod">
-          <ac:chgData name="Dattila  Federico" userId="3fbddd6b-c98a-4780-9364-b5d8323ec50d" providerId="ADAL" clId="{18EE679E-41E9-4931-9DD6-7F62B1A6261A}" dt="2022-11-11T09:53:28.502" v="2057" actId="1076"/>
-          <ac:picMkLst>
-            <pc:docMk/>
-            <pc:sldMk cId="1178301773" sldId="365"/>
-            <ac:picMk id="32" creationId="{91333314-3C79-F194-E705-86D432061888}"/>
-          </ac:picMkLst>
-        </pc:picChg>
-        <pc:picChg chg="add mod">
-          <ac:chgData name="Dattila  Federico" userId="3fbddd6b-c98a-4780-9364-b5d8323ec50d" providerId="ADAL" clId="{18EE679E-41E9-4931-9DD6-7F62B1A6261A}" dt="2022-11-11T09:54:36.956" v="2172" actId="1076"/>
-          <ac:picMkLst>
-            <pc:docMk/>
-            <pc:sldMk cId="1178301773" sldId="365"/>
-            <ac:picMk id="33" creationId="{6F0E31FE-D25D-36C9-7175-3BD9F8C6A225}"/>
-          </ac:picMkLst>
-        </pc:picChg>
-        <pc:picChg chg="add mod">
-          <ac:chgData name="Dattila  Federico" userId="3fbddd6b-c98a-4780-9364-b5d8323ec50d" providerId="ADAL" clId="{18EE679E-41E9-4931-9DD6-7F62B1A6261A}" dt="2022-11-11T09:54:48.517" v="2176" actId="1076"/>
-          <ac:picMkLst>
-            <pc:docMk/>
-            <pc:sldMk cId="1178301773" sldId="365"/>
-            <ac:picMk id="34" creationId="{661E04F8-7B21-55BD-F17F-A8F2B4C11994}"/>
-          </ac:picMkLst>
-        </pc:picChg>
-        <pc:picChg chg="add mod">
-          <ac:chgData name="Dattila  Federico" userId="3fbddd6b-c98a-4780-9364-b5d8323ec50d" providerId="ADAL" clId="{18EE679E-41E9-4931-9DD6-7F62B1A6261A}" dt="2022-11-11T09:54:59.284" v="2178" actId="1076"/>
-          <ac:picMkLst>
-            <pc:docMk/>
-            <pc:sldMk cId="1178301773" sldId="365"/>
-            <ac:picMk id="35" creationId="{58831A57-68C4-DE96-F9AC-CE2D24C912A9}"/>
-          </ac:picMkLst>
-        </pc:picChg>
-      </pc:sldChg>
-      <pc:sldChg chg="delSp new del mod">
-        <pc:chgData name="Dattila  Federico" userId="3fbddd6b-c98a-4780-9364-b5d8323ec50d" providerId="ADAL" clId="{18EE679E-41E9-4931-9DD6-7F62B1A6261A}" dt="2022-11-11T09:18:37.285" v="815" actId="47"/>
-        <pc:sldMkLst>
-          <pc:docMk/>
-          <pc:sldMk cId="382276172" sldId="366"/>
-        </pc:sldMkLst>
-        <pc:spChg chg="del">
-          <ac:chgData name="Dattila  Federico" userId="3fbddd6b-c98a-4780-9364-b5d8323ec50d" providerId="ADAL" clId="{18EE679E-41E9-4931-9DD6-7F62B1A6261A}" dt="2022-11-11T09:12:11.060" v="687" actId="478"/>
-          <ac:spMkLst>
-            <pc:docMk/>
-            <pc:sldMk cId="382276172" sldId="366"/>
-            <ac:spMk id="2" creationId="{83C44C64-E112-2D31-6A68-3A9C5A899564}"/>
-          </ac:spMkLst>
-        </pc:spChg>
-        <pc:spChg chg="del">
-          <ac:chgData name="Dattila  Federico" userId="3fbddd6b-c98a-4780-9364-b5d8323ec50d" providerId="ADAL" clId="{18EE679E-41E9-4931-9DD6-7F62B1A6261A}" dt="2022-11-11T09:12:12.051" v="688" actId="478"/>
-          <ac:spMkLst>
-            <pc:docMk/>
-            <pc:sldMk cId="382276172" sldId="366"/>
-            <ac:spMk id="3" creationId="{D4E598F9-A544-6737-BD9F-B3F053AB06C6}"/>
-          </ac:spMkLst>
-        </pc:spChg>
-      </pc:sldChg>
-      <pc:sldChg chg="delSp modSp add mod setBg">
-        <pc:chgData name="Dattila  Federico" userId="3fbddd6b-c98a-4780-9364-b5d8323ec50d" providerId="ADAL" clId="{18EE679E-41E9-4931-9DD6-7F62B1A6261A}" dt="2022-11-11T09:50:59.917" v="2014" actId="20577"/>
-        <pc:sldMkLst>
-          <pc:docMk/>
-          <pc:sldMk cId="3975943769" sldId="366"/>
-        </pc:sldMkLst>
-        <pc:spChg chg="del">
-          <ac:chgData name="Dattila  Federico" userId="3fbddd6b-c98a-4780-9364-b5d8323ec50d" providerId="ADAL" clId="{18EE679E-41E9-4931-9DD6-7F62B1A6261A}" dt="2022-11-11T09:48:29.525" v="1737" actId="478"/>
-          <ac:spMkLst>
-            <pc:docMk/>
-            <pc:sldMk cId="3975943769" sldId="366"/>
-            <ac:spMk id="7" creationId="{09495CBD-24A4-452D-97B2-D96D38B4BC8A}"/>
-          </ac:spMkLst>
-        </pc:spChg>
-        <pc:spChg chg="del">
-          <ac:chgData name="Dattila  Federico" userId="3fbddd6b-c98a-4780-9364-b5d8323ec50d" providerId="ADAL" clId="{18EE679E-41E9-4931-9DD6-7F62B1A6261A}" dt="2022-11-11T09:48:45.116" v="1785" actId="478"/>
-          <ac:spMkLst>
-            <pc:docMk/>
-            <pc:sldMk cId="3975943769" sldId="366"/>
-            <ac:spMk id="9" creationId="{0E91CB7C-6CAE-460B-8B21-F46E73BF512A}"/>
-          </ac:spMkLst>
-        </pc:spChg>
-        <pc:spChg chg="del">
-          <ac:chgData name="Dattila  Federico" userId="3fbddd6b-c98a-4780-9364-b5d8323ec50d" providerId="ADAL" clId="{18EE679E-41E9-4931-9DD6-7F62B1A6261A}" dt="2022-11-11T09:48:31.183" v="1738" actId="478"/>
-          <ac:spMkLst>
-            <pc:docMk/>
-            <pc:sldMk cId="3975943769" sldId="366"/>
-            <ac:spMk id="11" creationId="{D8C5D695-6B19-4B2A-9BA8-9F08914CFBD8}"/>
-          </ac:spMkLst>
-        </pc:spChg>
-        <pc:spChg chg="mod">
-          <ac:chgData name="Dattila  Federico" userId="3fbddd6b-c98a-4780-9364-b5d8323ec50d" providerId="ADAL" clId="{18EE679E-41E9-4931-9DD6-7F62B1A6261A}" dt="2022-11-11T09:50:59.917" v="2014" actId="20577"/>
-          <ac:spMkLst>
-            <pc:docMk/>
-            <pc:sldMk cId="3975943769" sldId="366"/>
-            <ac:spMk id="15" creationId="{F0F9B711-3D18-F05F-84AA-236A571E2CAA}"/>
-          </ac:spMkLst>
-        </pc:spChg>
-        <pc:spChg chg="del">
-          <ac:chgData name="Dattila  Federico" userId="3fbddd6b-c98a-4780-9364-b5d8323ec50d" providerId="ADAL" clId="{18EE679E-41E9-4931-9DD6-7F62B1A6261A}" dt="2022-11-11T09:48:31.183" v="1738" actId="478"/>
-          <ac:spMkLst>
-            <pc:docMk/>
-            <pc:sldMk cId="3975943769" sldId="366"/>
-            <ac:spMk id="86" creationId="{00000000-0000-0000-0000-000000000000}"/>
-          </ac:spMkLst>
-        </pc:spChg>
-        <pc:picChg chg="del">
-          <ac:chgData name="Dattila  Federico" userId="3fbddd6b-c98a-4780-9364-b5d8323ec50d" providerId="ADAL" clId="{18EE679E-41E9-4931-9DD6-7F62B1A6261A}" dt="2022-11-11T09:48:32.275" v="1739" actId="478"/>
-          <ac:picMkLst>
-            <pc:docMk/>
-            <pc:sldMk cId="3975943769" sldId="366"/>
-            <ac:picMk id="3" creationId="{55BF6060-05E4-5B8D-4DA9-23F76D4EC043}"/>
-          </ac:picMkLst>
-        </pc:picChg>
-        <pc:picChg chg="del">
-          <ac:chgData name="Dattila  Federico" userId="3fbddd6b-c98a-4780-9364-b5d8323ec50d" providerId="ADAL" clId="{18EE679E-41E9-4931-9DD6-7F62B1A6261A}" dt="2022-11-11T09:48:33.697" v="1742" actId="478"/>
-          <ac:picMkLst>
-            <pc:docMk/>
-            <pc:sldMk cId="3975943769" sldId="366"/>
-            <ac:picMk id="4" creationId="{8B713EA7-6212-704E-713E-E42D09B0E04B}"/>
-          </ac:picMkLst>
-        </pc:picChg>
-        <pc:picChg chg="del">
-          <ac:chgData name="Dattila  Federico" userId="3fbddd6b-c98a-4780-9364-b5d8323ec50d" providerId="ADAL" clId="{18EE679E-41E9-4931-9DD6-7F62B1A6261A}" dt="2022-11-11T09:48:33.281" v="1741" actId="478"/>
-          <ac:picMkLst>
-            <pc:docMk/>
-            <pc:sldMk cId="3975943769" sldId="366"/>
-            <ac:picMk id="5" creationId="{11033C81-6BCD-F82F-816B-907921B59BCC}"/>
-          </ac:picMkLst>
-        </pc:picChg>
-        <pc:picChg chg="del">
-          <ac:chgData name="Dattila  Federico" userId="3fbddd6b-c98a-4780-9364-b5d8323ec50d" providerId="ADAL" clId="{18EE679E-41E9-4931-9DD6-7F62B1A6261A}" dt="2022-11-11T09:48:32.795" v="1740" actId="478"/>
-          <ac:picMkLst>
-            <pc:docMk/>
-            <pc:sldMk cId="3975943769" sldId="366"/>
-            <ac:picMk id="13" creationId="{F777CB90-DFF1-033B-E16B-010AA6667ED1}"/>
-          </ac:picMkLst>
-        </pc:picChg>
-        <pc:picChg chg="del">
-          <ac:chgData name="Dattila  Federico" userId="3fbddd6b-c98a-4780-9364-b5d8323ec50d" providerId="ADAL" clId="{18EE679E-41E9-4931-9DD6-7F62B1A6261A}" dt="2022-11-11T09:48:31.183" v="1738" actId="478"/>
-          <ac:picMkLst>
-            <pc:docMk/>
-            <pc:sldMk cId="3975943769" sldId="366"/>
-            <ac:picMk id="16" creationId="{7C402FF9-8E72-8FD8-82FB-54469E465977}"/>
-          </ac:picMkLst>
-        </pc:picChg>
-        <pc:picChg chg="del">
-          <ac:chgData name="Dattila  Federico" userId="3fbddd6b-c98a-4780-9364-b5d8323ec50d" providerId="ADAL" clId="{18EE679E-41E9-4931-9DD6-7F62B1A6261A}" dt="2022-11-11T09:48:31.183" v="1738" actId="478"/>
-          <ac:picMkLst>
-            <pc:docMk/>
-            <pc:sldMk cId="3975943769" sldId="366"/>
-            <ac:picMk id="85" creationId="{00000000-0000-0000-0000-000000000000}"/>
-          </ac:picMkLst>
-        </pc:picChg>
-        <pc:picChg chg="del">
-          <ac:chgData name="Dattila  Federico" userId="3fbddd6b-c98a-4780-9364-b5d8323ec50d" providerId="ADAL" clId="{18EE679E-41E9-4931-9DD6-7F62B1A6261A}" dt="2022-11-11T09:48:31.183" v="1738" actId="478"/>
-          <ac:picMkLst>
-            <pc:docMk/>
-            <pc:sldMk cId="3975943769" sldId="366"/>
-            <ac:picMk id="1026" creationId="{FD6E59A3-9B78-47CB-8AC2-675990EF3D4D}"/>
-          </ac:picMkLst>
-        </pc:picChg>
-      </pc:sldChg>
-      <pc:sldChg chg="addSp delSp modSp add mod">
-        <pc:chgData name="Dattila  Federico" userId="3fbddd6b-c98a-4780-9364-b5d8323ec50d" providerId="ADAL" clId="{18EE679E-41E9-4931-9DD6-7F62B1A6261A}" dt="2022-11-13T11:03:21.578" v="2626" actId="20577"/>
-        <pc:sldMkLst>
-          <pc:docMk/>
-          <pc:sldMk cId="1908972765" sldId="367"/>
-        </pc:sldMkLst>
-        <pc:spChg chg="add del mod">
-          <ac:chgData name="Dattila  Federico" userId="3fbddd6b-c98a-4780-9364-b5d8323ec50d" providerId="ADAL" clId="{18EE679E-41E9-4931-9DD6-7F62B1A6261A}" dt="2022-11-11T10:00:24.081" v="2393" actId="478"/>
-          <ac:spMkLst>
-            <pc:docMk/>
-            <pc:sldMk cId="1908972765" sldId="367"/>
-            <ac:spMk id="2" creationId="{BE94DA54-0EDF-903E-C151-5AA468164305}"/>
-          </ac:spMkLst>
-        </pc:spChg>
-        <pc:spChg chg="mod">
-          <ac:chgData name="Dattila  Federico" userId="3fbddd6b-c98a-4780-9364-b5d8323ec50d" providerId="ADAL" clId="{18EE679E-41E9-4931-9DD6-7F62B1A6261A}" dt="2022-11-13T09:10:27.636" v="2560" actId="20577"/>
-          <ac:spMkLst>
-            <pc:docMk/>
-            <pc:sldMk cId="1908972765" sldId="367"/>
-            <ac:spMk id="10" creationId="{D5EC3236-1AF1-036D-BDA9-7C4299D10EC9}"/>
-          </ac:spMkLst>
-        </pc:spChg>
-        <pc:spChg chg="mod">
-          <ac:chgData name="Dattila  Federico" userId="3fbddd6b-c98a-4780-9364-b5d8323ec50d" providerId="ADAL" clId="{18EE679E-41E9-4931-9DD6-7F62B1A6261A}" dt="2022-11-13T09:10:14.188" v="2556" actId="20577"/>
-          <ac:spMkLst>
-            <pc:docMk/>
-            <pc:sldMk cId="1908972765" sldId="367"/>
-            <ac:spMk id="11" creationId="{D9FED98C-5C73-B2F3-8929-ECED233DA1C7}"/>
-          </ac:spMkLst>
-        </pc:spChg>
-        <pc:spChg chg="mod">
-          <ac:chgData name="Dattila  Federico" userId="3fbddd6b-c98a-4780-9364-b5d8323ec50d" providerId="ADAL" clId="{18EE679E-41E9-4931-9DD6-7F62B1A6261A}" dt="2022-11-13T09:10:23.918" v="2558" actId="20577"/>
-          <ac:spMkLst>
-            <pc:docMk/>
-            <pc:sldMk cId="1908972765" sldId="367"/>
-            <ac:spMk id="13" creationId="{ADAB539E-18A2-D39D-175F-94B192F63C4E}"/>
-          </ac:spMkLst>
-        </pc:spChg>
-        <pc:spChg chg="mod">
-          <ac:chgData name="Dattila  Federico" userId="3fbddd6b-c98a-4780-9364-b5d8323ec50d" providerId="ADAL" clId="{18EE679E-41E9-4931-9DD6-7F62B1A6261A}" dt="2022-11-13T09:10:06.540" v="2554" actId="20577"/>
-          <ac:spMkLst>
-            <pc:docMk/>
-            <pc:sldMk cId="1908972765" sldId="367"/>
-            <ac:spMk id="14" creationId="{8652BF97-302F-BD33-D092-00C827BF2E07}"/>
-          </ac:spMkLst>
-        </pc:spChg>
-        <pc:spChg chg="mod">
-          <ac:chgData name="Dattila  Federico" userId="3fbddd6b-c98a-4780-9364-b5d8323ec50d" providerId="ADAL" clId="{18EE679E-41E9-4931-9DD6-7F62B1A6261A}" dt="2022-11-11T10:00:45.674" v="2435" actId="207"/>
-          <ac:spMkLst>
-            <pc:docMk/>
-            <pc:sldMk cId="1908972765" sldId="367"/>
-            <ac:spMk id="16" creationId="{C3C4B75F-E07B-74CD-675D-AC022CF9901F}"/>
-          </ac:spMkLst>
-        </pc:spChg>
-        <pc:spChg chg="mod">
-          <ac:chgData name="Dattila  Federico" userId="3fbddd6b-c98a-4780-9364-b5d8323ec50d" providerId="ADAL" clId="{18EE679E-41E9-4931-9DD6-7F62B1A6261A}" dt="2022-11-13T11:03:21.578" v="2626" actId="20577"/>
-          <ac:spMkLst>
-            <pc:docMk/>
-            <pc:sldMk cId="1908972765" sldId="367"/>
-            <ac:spMk id="22" creationId="{2B18EA2B-1B43-ABCB-F038-F8A8A54C344E}"/>
-          </ac:spMkLst>
-        </pc:spChg>
-        <pc:spChg chg="mod">
-          <ac:chgData name="Dattila  Federico" userId="3fbddd6b-c98a-4780-9364-b5d8323ec50d" providerId="ADAL" clId="{18EE679E-41E9-4931-9DD6-7F62B1A6261A}" dt="2022-11-11T10:04:45.437" v="2444" actId="20577"/>
-          <ac:spMkLst>
-            <pc:docMk/>
-            <pc:sldMk cId="1908972765" sldId="367"/>
-            <ac:spMk id="24" creationId="{B8B0096C-1B3D-981E-B18F-146BC56DF28F}"/>
-          </ac:spMkLst>
-        </pc:spChg>
-      </pc:sldChg>
-      <pc:sldMasterChg chg="del delSldLayout">
-        <pc:chgData name="Dattila  Federico" userId="3fbddd6b-c98a-4780-9364-b5d8323ec50d" providerId="ADAL" clId="{18EE679E-41E9-4931-9DD6-7F62B1A6261A}" dt="2022-11-11T09:19:06.414" v="843" actId="47"/>
-        <pc:sldMasterMkLst>
-          <pc:docMk/>
-          <pc:sldMasterMk cId="2717403484" sldId="2147483648"/>
-        </pc:sldMasterMkLst>
-        <pc:sldLayoutChg chg="del">
-          <pc:chgData name="Dattila  Federico" userId="3fbddd6b-c98a-4780-9364-b5d8323ec50d" providerId="ADAL" clId="{18EE679E-41E9-4931-9DD6-7F62B1A6261A}" dt="2022-11-11T09:19:06.414" v="843" actId="47"/>
-          <pc:sldLayoutMkLst>
-            <pc:docMk/>
-            <pc:sldMasterMk cId="2717403484" sldId="2147483648"/>
-            <pc:sldLayoutMk cId="1195458567" sldId="2147483649"/>
-          </pc:sldLayoutMkLst>
-        </pc:sldLayoutChg>
-        <pc:sldLayoutChg chg="del">
-          <pc:chgData name="Dattila  Federico" userId="3fbddd6b-c98a-4780-9364-b5d8323ec50d" providerId="ADAL" clId="{18EE679E-41E9-4931-9DD6-7F62B1A6261A}" dt="2022-11-11T09:19:06.414" v="843" actId="47"/>
-          <pc:sldLayoutMkLst>
-            <pc:docMk/>
-            <pc:sldMasterMk cId="2717403484" sldId="2147483648"/>
-            <pc:sldLayoutMk cId="3997311202" sldId="2147483650"/>
-          </pc:sldLayoutMkLst>
-        </pc:sldLayoutChg>
-        <pc:sldLayoutChg chg="del">
-          <pc:chgData name="Dattila  Federico" userId="3fbddd6b-c98a-4780-9364-b5d8323ec50d" providerId="ADAL" clId="{18EE679E-41E9-4931-9DD6-7F62B1A6261A}" dt="2022-11-11T09:19:06.414" v="843" actId="47"/>
-          <pc:sldLayoutMkLst>
-            <pc:docMk/>
-            <pc:sldMasterMk cId="2717403484" sldId="2147483648"/>
-            <pc:sldLayoutMk cId="744838985" sldId="2147483651"/>
-          </pc:sldLayoutMkLst>
-        </pc:sldLayoutChg>
-        <pc:sldLayoutChg chg="del">
-          <pc:chgData name="Dattila  Federico" userId="3fbddd6b-c98a-4780-9364-b5d8323ec50d" providerId="ADAL" clId="{18EE679E-41E9-4931-9DD6-7F62B1A6261A}" dt="2022-11-11T09:19:06.414" v="843" actId="47"/>
-          <pc:sldLayoutMkLst>
-            <pc:docMk/>
-            <pc:sldMasterMk cId="2717403484" sldId="2147483648"/>
-            <pc:sldLayoutMk cId="2920962358" sldId="2147483652"/>
-          </pc:sldLayoutMkLst>
-        </pc:sldLayoutChg>
-        <pc:sldLayoutChg chg="del">
-          <pc:chgData name="Dattila  Federico" userId="3fbddd6b-c98a-4780-9364-b5d8323ec50d" providerId="ADAL" clId="{18EE679E-41E9-4931-9DD6-7F62B1A6261A}" dt="2022-11-11T09:19:06.414" v="843" actId="47"/>
-          <pc:sldLayoutMkLst>
-            <pc:docMk/>
-            <pc:sldMasterMk cId="2717403484" sldId="2147483648"/>
-            <pc:sldLayoutMk cId="817556675" sldId="2147483653"/>
-          </pc:sldLayoutMkLst>
-        </pc:sldLayoutChg>
-        <pc:sldLayoutChg chg="del">
-          <pc:chgData name="Dattila  Federico" userId="3fbddd6b-c98a-4780-9364-b5d8323ec50d" providerId="ADAL" clId="{18EE679E-41E9-4931-9DD6-7F62B1A6261A}" dt="2022-11-11T09:19:06.414" v="843" actId="47"/>
-          <pc:sldLayoutMkLst>
-            <pc:docMk/>
-            <pc:sldMasterMk cId="2717403484" sldId="2147483648"/>
-            <pc:sldLayoutMk cId="3861523059" sldId="2147483654"/>
-          </pc:sldLayoutMkLst>
-        </pc:sldLayoutChg>
-        <pc:sldLayoutChg chg="del">
-          <pc:chgData name="Dattila  Federico" userId="3fbddd6b-c98a-4780-9364-b5d8323ec50d" providerId="ADAL" clId="{18EE679E-41E9-4931-9DD6-7F62B1A6261A}" dt="2022-11-11T09:19:06.414" v="843" actId="47"/>
-          <pc:sldLayoutMkLst>
-            <pc:docMk/>
-            <pc:sldMasterMk cId="2717403484" sldId="2147483648"/>
-            <pc:sldLayoutMk cId="2939237792" sldId="2147483655"/>
-          </pc:sldLayoutMkLst>
-        </pc:sldLayoutChg>
-        <pc:sldLayoutChg chg="del">
-          <pc:chgData name="Dattila  Federico" userId="3fbddd6b-c98a-4780-9364-b5d8323ec50d" providerId="ADAL" clId="{18EE679E-41E9-4931-9DD6-7F62B1A6261A}" dt="2022-11-11T09:19:06.414" v="843" actId="47"/>
-          <pc:sldLayoutMkLst>
-            <pc:docMk/>
-            <pc:sldMasterMk cId="2717403484" sldId="2147483648"/>
-            <pc:sldLayoutMk cId="3541859866" sldId="2147483656"/>
-          </pc:sldLayoutMkLst>
-        </pc:sldLayoutChg>
-        <pc:sldLayoutChg chg="del">
-          <pc:chgData name="Dattila  Federico" userId="3fbddd6b-c98a-4780-9364-b5d8323ec50d" providerId="ADAL" clId="{18EE679E-41E9-4931-9DD6-7F62B1A6261A}" dt="2022-11-11T09:19:06.414" v="843" actId="47"/>
-          <pc:sldLayoutMkLst>
-            <pc:docMk/>
-            <pc:sldMasterMk cId="2717403484" sldId="2147483648"/>
-            <pc:sldLayoutMk cId="63937081" sldId="2147483657"/>
-          </pc:sldLayoutMkLst>
-        </pc:sldLayoutChg>
-        <pc:sldLayoutChg chg="del">
-          <pc:chgData name="Dattila  Federico" userId="3fbddd6b-c98a-4780-9364-b5d8323ec50d" providerId="ADAL" clId="{18EE679E-41E9-4931-9DD6-7F62B1A6261A}" dt="2022-11-11T09:19:06.414" v="843" actId="47"/>
-          <pc:sldLayoutMkLst>
-            <pc:docMk/>
-            <pc:sldMasterMk cId="2717403484" sldId="2147483648"/>
-            <pc:sldLayoutMk cId="4210230871" sldId="2147483658"/>
-          </pc:sldLayoutMkLst>
-        </pc:sldLayoutChg>
-        <pc:sldLayoutChg chg="del">
-          <pc:chgData name="Dattila  Federico" userId="3fbddd6b-c98a-4780-9364-b5d8323ec50d" providerId="ADAL" clId="{18EE679E-41E9-4931-9DD6-7F62B1A6261A}" dt="2022-11-11T09:19:06.414" v="843" actId="47"/>
-          <pc:sldLayoutMkLst>
-            <pc:docMk/>
-            <pc:sldMasterMk cId="2717403484" sldId="2147483648"/>
-            <pc:sldLayoutMk cId="2048673085" sldId="2147483659"/>
-          </pc:sldLayoutMkLst>
-        </pc:sldLayoutChg>
-      </pc:sldMasterChg>
-      <pc:sldMasterChg chg="delSldLayout">
-        <pc:chgData name="Dattila  Federico" userId="3fbddd6b-c98a-4780-9364-b5d8323ec50d" providerId="ADAL" clId="{18EE679E-41E9-4931-9DD6-7F62B1A6261A}" dt="2022-11-11T09:19:06.414" v="843" actId="47"/>
-        <pc:sldMasterMkLst>
-          <pc:docMk/>
-          <pc:sldMasterMk cId="3895028970" sldId="2147483661"/>
-        </pc:sldMasterMkLst>
-        <pc:sldLayoutChg chg="del">
-          <pc:chgData name="Dattila  Federico" userId="3fbddd6b-c98a-4780-9364-b5d8323ec50d" providerId="ADAL" clId="{18EE679E-41E9-4931-9DD6-7F62B1A6261A}" dt="2022-11-11T09:19:06.414" v="843" actId="47"/>
-          <pc:sldLayoutMkLst>
-            <pc:docMk/>
-            <pc:sldMasterMk cId="3895028970" sldId="2147483661"/>
-            <pc:sldLayoutMk cId="471800923" sldId="2147483674"/>
-          </pc:sldLayoutMkLst>
-        </pc:sldLayoutChg>
-      </pc:sldMasterChg>
     </pc:docChg>
   </pc:docChgLst>
 </pc:chgInfo>
@@ -9373,13 +6474,15 @@
               </a:ext>
             </a:extLst>
           </a:blip>
-          <a:srcRect t="12782" b="34834"/>
-          <a:stretch/>
+          <a:srcRect t="12782" b="28603"/>
+          <a:stretch>
+            <a:fillRect/>
+          </a:stretch>
         </p:blipFill>
         <p:spPr>
           <a:xfrm>
             <a:off x="4826001" y="1003300"/>
-            <a:ext cx="7251700" cy="5232400"/>
+            <a:ext cx="7251700" cy="5854700"/>
           </a:xfrm>
           <a:prstGeom prst="rect">
             <a:avLst/>
@@ -9401,7 +6504,7 @@
         <p:spPr>
           <a:xfrm>
             <a:off x="5327014" y="2550155"/>
-            <a:ext cx="1925829" cy="1200329"/>
+            <a:ext cx="1925829" cy="861774"/>
           </a:xfrm>
           <a:prstGeom prst="rect">
             <a:avLst/>
@@ -9419,422 +6522,21 @@
             <a:pPr algn="ctr"/>
             <a:r>
               <a:rPr lang="en-US" dirty="0">
-                <a:latin typeface="Amasis MT Pro Medium" panose="02040604050005020304" pitchFamily="18" charset="0"/>
-              </a:rPr>
-              <a:t>Ricercatori/</a:t>
+                <a:latin typeface="Biome" panose="020B0503030204020804" pitchFamily="34" charset="0"/>
+                <a:cs typeface="Biome" panose="020B0503030204020804" pitchFamily="34" charset="0"/>
+              </a:rPr>
+              <a:t>Researchers</a:t>
             </a:r>
           </a:p>
           <a:p>
             <a:pPr algn="ctr"/>
             <a:r>
-              <a:rPr lang="en-US" dirty="0" err="1">
-                <a:latin typeface="Amasis MT Pro Medium" panose="02040604050005020304" pitchFamily="18" charset="0"/>
-              </a:rPr>
-              <a:t>Ricercatrici</a:t>
-            </a:r>
-            <a:endParaRPr lang="en-US" dirty="0">
-              <a:latin typeface="Amasis MT Pro Medium" panose="02040604050005020304" pitchFamily="18" charset="0"/>
-            </a:endParaRPr>
-          </a:p>
-          <a:p>
-            <a:pPr algn="ctr"/>
-            <a:r>
-              <a:rPr lang="en-US" dirty="0" err="1">
-                <a:latin typeface="Amasis MT Pro Light" panose="02040304050005020304" pitchFamily="18" charset="0"/>
-              </a:rPr>
-              <a:t>Studiano</a:t>
-            </a:r>
-            <a:r>
-              <a:rPr lang="en-US" dirty="0">
-                <a:latin typeface="Amasis MT Pro Light" panose="02040304050005020304" pitchFamily="18" charset="0"/>
-              </a:rPr>
-              <a:t> </a:t>
-            </a:r>
-            <a:r>
-              <a:rPr lang="en-US" dirty="0" err="1">
-                <a:latin typeface="Amasis MT Pro Light" panose="02040304050005020304" pitchFamily="18" charset="0"/>
-              </a:rPr>
-              <a:t>ricerche</a:t>
-            </a:r>
-            <a:r>
-              <a:rPr lang="en-US" dirty="0">
-                <a:latin typeface="Amasis MT Pro Light" panose="02040304050005020304" pitchFamily="18" charset="0"/>
-              </a:rPr>
-              <a:t> </a:t>
-            </a:r>
-            <a:r>
-              <a:rPr lang="en-US" dirty="0" err="1">
-                <a:latin typeface="Amasis MT Pro Light" panose="02040304050005020304" pitchFamily="18" charset="0"/>
-              </a:rPr>
-              <a:t>precedenti</a:t>
-            </a:r>
-            <a:endParaRPr lang="en-US" dirty="0">
-              <a:latin typeface="Amasis MT Pro Light" panose="02040304050005020304" pitchFamily="18" charset="0"/>
-            </a:endParaRPr>
-          </a:p>
-        </p:txBody>
-      </p:sp>
-      <p:sp>
-        <p:nvSpPr>
-          <p:cNvPr id="5" name="TextBox 4">
-            <a:extLst>
-              <a:ext uri="{FF2B5EF4-FFF2-40B4-BE49-F238E27FC236}">
-                <a16:creationId xmlns:a16="http://schemas.microsoft.com/office/drawing/2014/main" id="{0FA94861-4904-F5D0-8806-F81F0211B2D1}"/>
-              </a:ext>
-            </a:extLst>
-          </p:cNvPr>
-          <p:cNvSpPr txBox="1"/>
-          <p:nvPr/>
-        </p:nvSpPr>
-        <p:spPr>
-          <a:xfrm>
-            <a:off x="7347456" y="2550155"/>
-            <a:ext cx="1925829" cy="1200329"/>
-          </a:xfrm>
-          <a:prstGeom prst="rect">
-            <a:avLst/>
-          </a:prstGeom>
-          <a:solidFill>
-            <a:srgbClr val="E8E8E9"/>
-          </a:solidFill>
-        </p:spPr>
-        <p:txBody>
-          <a:bodyPr wrap="square" rtlCol="0">
-            <a:spAutoFit/>
-          </a:bodyPr>
-          <a:lstStyle/>
-          <a:p>
-            <a:pPr algn="ctr"/>
-            <a:r>
-              <a:rPr lang="en-US" dirty="0">
-                <a:latin typeface="Amasis MT Pro Medium" panose="02040604050005020304" pitchFamily="18" charset="0"/>
-              </a:rPr>
-              <a:t>Ricercatori/</a:t>
-            </a:r>
-          </a:p>
-          <a:p>
-            <a:pPr algn="ctr"/>
-            <a:r>
-              <a:rPr lang="en-US" dirty="0" err="1">
-                <a:latin typeface="Amasis MT Pro Medium" panose="02040604050005020304" pitchFamily="18" charset="0"/>
-              </a:rPr>
-              <a:t>Ricercatrici</a:t>
-            </a:r>
-            <a:endParaRPr lang="en-US" dirty="0">
-              <a:latin typeface="Amasis MT Pro Medium" panose="02040604050005020304" pitchFamily="18" charset="0"/>
-            </a:endParaRPr>
-          </a:p>
-          <a:p>
-            <a:pPr algn="ctr"/>
-            <a:r>
-              <a:rPr lang="en-US" dirty="0" err="1">
-                <a:latin typeface="Amasis MT Pro Light" panose="02040304050005020304" pitchFamily="18" charset="0"/>
-              </a:rPr>
-              <a:t>Conducono</a:t>
-            </a:r>
-            <a:r>
-              <a:rPr lang="en-US" dirty="0">
-                <a:latin typeface="Amasis MT Pro Light" panose="02040304050005020304" pitchFamily="18" charset="0"/>
-              </a:rPr>
-              <a:t> </a:t>
-            </a:r>
-            <a:r>
-              <a:rPr lang="en-US" dirty="0" err="1">
-                <a:latin typeface="Amasis MT Pro Light" panose="02040304050005020304" pitchFamily="18" charset="0"/>
-              </a:rPr>
-              <a:t>nuove</a:t>
-            </a:r>
-            <a:r>
-              <a:rPr lang="en-US" dirty="0">
-                <a:latin typeface="Amasis MT Pro Light" panose="02040304050005020304" pitchFamily="18" charset="0"/>
-              </a:rPr>
-              <a:t> </a:t>
-            </a:r>
-            <a:r>
-              <a:rPr lang="en-US" dirty="0" err="1">
-                <a:latin typeface="Amasis MT Pro Light" panose="02040304050005020304" pitchFamily="18" charset="0"/>
-              </a:rPr>
-              <a:t>ricerche</a:t>
-            </a:r>
-            <a:endParaRPr lang="en-US" dirty="0">
-              <a:latin typeface="Amasis MT Pro Light" panose="02040304050005020304" pitchFamily="18" charset="0"/>
-            </a:endParaRPr>
-          </a:p>
-        </p:txBody>
-      </p:sp>
-      <p:sp>
-        <p:nvSpPr>
-          <p:cNvPr id="6" name="TextBox 5">
-            <a:extLst>
-              <a:ext uri="{FF2B5EF4-FFF2-40B4-BE49-F238E27FC236}">
-                <a16:creationId xmlns:a16="http://schemas.microsoft.com/office/drawing/2014/main" id="{27466D3C-8B07-EF8B-1535-C6362F8BF8E3}"/>
-              </a:ext>
-            </a:extLst>
-          </p:cNvPr>
-          <p:cNvSpPr txBox="1"/>
-          <p:nvPr/>
-        </p:nvSpPr>
-        <p:spPr>
-          <a:xfrm>
-            <a:off x="9367898" y="2549435"/>
-            <a:ext cx="1603759" cy="1200329"/>
-          </a:xfrm>
-          <a:prstGeom prst="rect">
-            <a:avLst/>
-          </a:prstGeom>
-          <a:solidFill>
-            <a:srgbClr val="E8E8E9"/>
-          </a:solidFill>
-        </p:spPr>
-        <p:txBody>
-          <a:bodyPr wrap="square" rtlCol="0">
-            <a:spAutoFit/>
-          </a:bodyPr>
-          <a:lstStyle/>
-          <a:p>
-            <a:pPr algn="ctr"/>
-            <a:r>
-              <a:rPr lang="en-US" dirty="0">
-                <a:latin typeface="Amasis MT Pro Medium" panose="02040604050005020304" pitchFamily="18" charset="0"/>
-              </a:rPr>
-              <a:t>Ricercatori/</a:t>
-            </a:r>
-          </a:p>
-          <a:p>
-            <a:pPr algn="ctr"/>
-            <a:r>
-              <a:rPr lang="en-US" dirty="0" err="1">
-                <a:latin typeface="Amasis MT Pro Medium" panose="02040604050005020304" pitchFamily="18" charset="0"/>
-              </a:rPr>
-              <a:t>Ricercatrici</a:t>
-            </a:r>
-            <a:endParaRPr lang="en-US" dirty="0">
-              <a:latin typeface="Amasis MT Pro Medium" panose="02040604050005020304" pitchFamily="18" charset="0"/>
-            </a:endParaRPr>
-          </a:p>
-          <a:p>
-            <a:pPr algn="ctr"/>
-            <a:r>
-              <a:rPr lang="en-US" dirty="0" err="1">
-                <a:latin typeface="Amasis MT Pro Light" panose="02040304050005020304" pitchFamily="18" charset="0"/>
-              </a:rPr>
-              <a:t>Scrivono</a:t>
-            </a:r>
-            <a:r>
-              <a:rPr lang="en-US" dirty="0">
-                <a:latin typeface="Amasis MT Pro Light" panose="02040304050005020304" pitchFamily="18" charset="0"/>
-              </a:rPr>
-              <a:t> un </a:t>
-            </a:r>
-            <a:r>
-              <a:rPr lang="en-US" dirty="0" err="1">
-                <a:latin typeface="Amasis MT Pro Light" panose="02040304050005020304" pitchFamily="18" charset="0"/>
-              </a:rPr>
-              <a:t>articolo</a:t>
-            </a:r>
-            <a:endParaRPr lang="en-US" dirty="0">
-              <a:latin typeface="Amasis MT Pro Light" panose="02040304050005020304" pitchFamily="18" charset="0"/>
-            </a:endParaRPr>
-          </a:p>
-        </p:txBody>
-      </p:sp>
-      <p:sp>
-        <p:nvSpPr>
-          <p:cNvPr id="7" name="TextBox 6">
-            <a:extLst>
-              <a:ext uri="{FF2B5EF4-FFF2-40B4-BE49-F238E27FC236}">
-                <a16:creationId xmlns:a16="http://schemas.microsoft.com/office/drawing/2014/main" id="{95180BA9-3454-574E-4241-B7D27D7608C6}"/>
-              </a:ext>
-            </a:extLst>
-          </p:cNvPr>
-          <p:cNvSpPr txBox="1"/>
-          <p:nvPr/>
-        </p:nvSpPr>
-        <p:spPr>
-          <a:xfrm>
-            <a:off x="8851900" y="5606871"/>
-            <a:ext cx="3200400" cy="646331"/>
-          </a:xfrm>
-          <a:prstGeom prst="rect">
-            <a:avLst/>
-          </a:prstGeom>
-          <a:solidFill>
-            <a:srgbClr val="E8E8E9"/>
-          </a:solidFill>
-        </p:spPr>
-        <p:txBody>
-          <a:bodyPr wrap="square" rtlCol="0">
-            <a:spAutoFit/>
-          </a:bodyPr>
-          <a:lstStyle/>
-          <a:p>
-            <a:pPr algn="ctr"/>
-            <a:r>
-              <a:rPr lang="en-US" dirty="0">
-                <a:latin typeface="Amasis MT Pro Medium" panose="02040604050005020304" pitchFamily="18" charset="0"/>
-              </a:rPr>
-              <a:t>Ricercatori/</a:t>
-            </a:r>
-            <a:r>
-              <a:rPr lang="en-US" dirty="0" err="1">
-                <a:latin typeface="Amasis MT Pro Medium" panose="02040604050005020304" pitchFamily="18" charset="0"/>
-              </a:rPr>
-              <a:t>Ricercatrici</a:t>
-            </a:r>
-            <a:endParaRPr lang="en-US" dirty="0">
-              <a:latin typeface="Amasis MT Pro Medium" panose="02040604050005020304" pitchFamily="18" charset="0"/>
-            </a:endParaRPr>
-          </a:p>
-          <a:p>
-            <a:pPr algn="ctr"/>
-            <a:r>
-              <a:rPr lang="en-US" dirty="0" err="1">
-                <a:latin typeface="Amasis MT Pro Light" panose="02040304050005020304" pitchFamily="18" charset="0"/>
-              </a:rPr>
-              <a:t>Inviano</a:t>
-            </a:r>
-            <a:r>
-              <a:rPr lang="en-US" dirty="0">
-                <a:latin typeface="Amasis MT Pro Light" panose="02040304050005020304" pitchFamily="18" charset="0"/>
-              </a:rPr>
-              <a:t> </a:t>
-            </a:r>
-            <a:r>
-              <a:rPr lang="en-US" dirty="0" err="1">
-                <a:latin typeface="Amasis MT Pro Light" panose="02040304050005020304" pitchFamily="18" charset="0"/>
-              </a:rPr>
-              <a:t>l’articolo</a:t>
-            </a:r>
-            <a:r>
-              <a:rPr lang="en-US" dirty="0">
-                <a:latin typeface="Amasis MT Pro Light" panose="02040304050005020304" pitchFamily="18" charset="0"/>
-              </a:rPr>
-              <a:t> ad </a:t>
-            </a:r>
-            <a:r>
-              <a:rPr lang="en-US" dirty="0" err="1">
-                <a:latin typeface="Amasis MT Pro Light" panose="02040304050005020304" pitchFamily="18" charset="0"/>
-              </a:rPr>
-              <a:t>una</a:t>
-            </a:r>
-            <a:r>
-              <a:rPr lang="en-US" dirty="0">
-                <a:latin typeface="Amasis MT Pro Light" panose="02040304050005020304" pitchFamily="18" charset="0"/>
-              </a:rPr>
-              <a:t> </a:t>
-            </a:r>
-            <a:r>
-              <a:rPr lang="en-US" dirty="0" err="1">
-                <a:latin typeface="Amasis MT Pro Light" panose="02040304050005020304" pitchFamily="18" charset="0"/>
-              </a:rPr>
-              <a:t>rivista</a:t>
-            </a:r>
-            <a:endParaRPr lang="en-US" dirty="0">
-              <a:latin typeface="Amasis MT Pro Light" panose="02040304050005020304" pitchFamily="18" charset="0"/>
-            </a:endParaRPr>
-          </a:p>
-        </p:txBody>
-      </p:sp>
-      <p:sp>
-        <p:nvSpPr>
-          <p:cNvPr id="8" name="TextBox 7">
-            <a:extLst>
-              <a:ext uri="{FF2B5EF4-FFF2-40B4-BE49-F238E27FC236}">
-                <a16:creationId xmlns:a16="http://schemas.microsoft.com/office/drawing/2014/main" id="{EC522CDF-FF91-1630-0CA1-2C3E078982FA}"/>
-              </a:ext>
-            </a:extLst>
-          </p:cNvPr>
-          <p:cNvSpPr txBox="1"/>
-          <p:nvPr/>
-        </p:nvSpPr>
-        <p:spPr>
-          <a:xfrm>
-            <a:off x="5626098" y="5594170"/>
-            <a:ext cx="3327401" cy="646331"/>
-          </a:xfrm>
-          <a:prstGeom prst="rect">
-            <a:avLst/>
-          </a:prstGeom>
-          <a:solidFill>
-            <a:srgbClr val="E8E8E9"/>
-          </a:solidFill>
-        </p:spPr>
-        <p:txBody>
-          <a:bodyPr wrap="square" rtlCol="0">
-            <a:spAutoFit/>
-          </a:bodyPr>
-          <a:lstStyle/>
-          <a:p>
-            <a:pPr algn="ctr"/>
-            <a:r>
-              <a:rPr lang="en-US" dirty="0" err="1">
-                <a:latin typeface="Amasis MT Pro Medium" panose="02040604050005020304" pitchFamily="18" charset="0"/>
-              </a:rPr>
-              <a:t>L’articolo</a:t>
-            </a:r>
-            <a:r>
-              <a:rPr lang="en-US" dirty="0">
-                <a:latin typeface="Amasis MT Pro Medium" panose="02040604050005020304" pitchFamily="18" charset="0"/>
-              </a:rPr>
-              <a:t> </a:t>
-            </a:r>
-            <a:r>
-              <a:rPr lang="en-US" dirty="0" err="1">
-                <a:latin typeface="Amasis MT Pro Medium" panose="02040604050005020304" pitchFamily="18" charset="0"/>
-              </a:rPr>
-              <a:t>viene</a:t>
-            </a:r>
-            <a:r>
-              <a:rPr lang="en-US" dirty="0">
-                <a:latin typeface="Amasis MT Pro Medium" panose="02040604050005020304" pitchFamily="18" charset="0"/>
-              </a:rPr>
-              <a:t> </a:t>
-            </a:r>
-            <a:r>
-              <a:rPr lang="en-US" dirty="0" err="1">
-                <a:latin typeface="Amasis MT Pro Medium" panose="02040604050005020304" pitchFamily="18" charset="0"/>
-              </a:rPr>
-              <a:t>letto</a:t>
-            </a:r>
-            <a:r>
-              <a:rPr lang="en-US" dirty="0">
-                <a:latin typeface="Amasis MT Pro Medium" panose="02040604050005020304" pitchFamily="18" charset="0"/>
-              </a:rPr>
-              <a:t> e </a:t>
-            </a:r>
-            <a:r>
-              <a:rPr lang="en-US" dirty="0" err="1">
-                <a:latin typeface="Amasis MT Pro Medium" panose="02040604050005020304" pitchFamily="18" charset="0"/>
-              </a:rPr>
-              <a:t>valutato</a:t>
-            </a:r>
-            <a:r>
-              <a:rPr lang="en-US" dirty="0">
-                <a:latin typeface="Amasis MT Pro Medium" panose="02040604050005020304" pitchFamily="18" charset="0"/>
-              </a:rPr>
-              <a:t> da </a:t>
-            </a:r>
-            <a:r>
-              <a:rPr lang="en-US" dirty="0" err="1">
-                <a:latin typeface="Amasis MT Pro Medium" panose="02040604050005020304" pitchFamily="18" charset="0"/>
-              </a:rPr>
-              <a:t>esperti</a:t>
-            </a:r>
-            <a:r>
-              <a:rPr lang="en-US" dirty="0">
-                <a:latin typeface="Amasis MT Pro Medium" panose="02040604050005020304" pitchFamily="18" charset="0"/>
-              </a:rPr>
-              <a:t>/</a:t>
-            </a:r>
-            <a:r>
-              <a:rPr lang="en-US" dirty="0" err="1">
-                <a:latin typeface="Amasis MT Pro Medium" panose="02040604050005020304" pitchFamily="18" charset="0"/>
-              </a:rPr>
-              <a:t>esperte</a:t>
-            </a:r>
-            <a:endParaRPr lang="en-US" dirty="0">
-              <a:latin typeface="Amasis MT Pro Light" panose="02040304050005020304" pitchFamily="18" charset="0"/>
-            </a:endParaRPr>
+              <a:rPr lang="en-US" sz="1600" dirty="0">
+                <a:latin typeface="Biome Light" panose="020B0303030204020804" pitchFamily="34" charset="0"/>
+                <a:cs typeface="Biome Light" panose="020B0303030204020804" pitchFamily="34" charset="0"/>
+              </a:rPr>
+              <a:t>Read peer-reviewed articles</a:t>
+            </a:r>
           </a:p>
         </p:txBody>
       </p:sp>
@@ -9898,6 +6600,210 @@
           </a:prstGeom>
         </p:spPr>
       </p:pic>
+      <p:sp>
+        <p:nvSpPr>
+          <p:cNvPr id="2" name="TextBox 1">
+            <a:extLst>
+              <a:ext uri="{FF2B5EF4-FFF2-40B4-BE49-F238E27FC236}">
+                <a16:creationId xmlns:a16="http://schemas.microsoft.com/office/drawing/2014/main" id="{0FA94861-4904-F5D0-8806-F81F0211B2D1}"/>
+              </a:ext>
+            </a:extLst>
+          </p:cNvPr>
+          <p:cNvSpPr txBox="1"/>
+          <p:nvPr/>
+        </p:nvSpPr>
+        <p:spPr>
+          <a:xfrm>
+            <a:off x="7347456" y="2550155"/>
+            <a:ext cx="1925829" cy="861774"/>
+          </a:xfrm>
+          <a:prstGeom prst="rect">
+            <a:avLst/>
+          </a:prstGeom>
+          <a:solidFill>
+            <a:srgbClr val="E8E8E9"/>
+          </a:solidFill>
+        </p:spPr>
+        <p:txBody>
+          <a:bodyPr wrap="square" rtlCol="0">
+            <a:spAutoFit/>
+          </a:bodyPr>
+          <a:lstStyle/>
+          <a:p>
+            <a:pPr algn="ctr"/>
+            <a:r>
+              <a:rPr lang="en-US" dirty="0">
+                <a:latin typeface="Biome" panose="020B0503030204020804" pitchFamily="34" charset="0"/>
+                <a:cs typeface="Biome" panose="020B0503030204020804" pitchFamily="34" charset="0"/>
+              </a:rPr>
+              <a:t>Researchers</a:t>
+            </a:r>
+          </a:p>
+          <a:p>
+            <a:pPr algn="ctr"/>
+            <a:r>
+              <a:rPr lang="en-US" sz="1600" dirty="0">
+                <a:latin typeface="Biome Light" panose="020B0303030204020804" pitchFamily="34" charset="0"/>
+                <a:cs typeface="Biome Light" panose="020B0303030204020804" pitchFamily="34" charset="0"/>
+              </a:rPr>
+              <a:t>Conduct new research</a:t>
+            </a:r>
+          </a:p>
+        </p:txBody>
+      </p:sp>
+      <p:sp>
+        <p:nvSpPr>
+          <p:cNvPr id="9" name="TextBox 8">
+            <a:extLst>
+              <a:ext uri="{FF2B5EF4-FFF2-40B4-BE49-F238E27FC236}">
+                <a16:creationId xmlns:a16="http://schemas.microsoft.com/office/drawing/2014/main" id="{27466D3C-8B07-EF8B-1535-C6362F8BF8E3}"/>
+              </a:ext>
+            </a:extLst>
+          </p:cNvPr>
+          <p:cNvSpPr txBox="1"/>
+          <p:nvPr/>
+        </p:nvSpPr>
+        <p:spPr>
+          <a:xfrm>
+            <a:off x="9367898" y="2549435"/>
+            <a:ext cx="1603759" cy="1354217"/>
+          </a:xfrm>
+          <a:prstGeom prst="rect">
+            <a:avLst/>
+          </a:prstGeom>
+          <a:solidFill>
+            <a:srgbClr val="E8E8E9"/>
+          </a:solidFill>
+        </p:spPr>
+        <p:txBody>
+          <a:bodyPr wrap="square" rtlCol="0">
+            <a:spAutoFit/>
+          </a:bodyPr>
+          <a:lstStyle/>
+          <a:p>
+            <a:pPr algn="ctr"/>
+            <a:r>
+              <a:rPr lang="en-US" dirty="0">
+                <a:latin typeface="Biome" panose="020B0503030204020804" pitchFamily="34" charset="0"/>
+                <a:cs typeface="Biome" panose="020B0503030204020804" pitchFamily="34" charset="0"/>
+              </a:rPr>
+              <a:t>Researchers</a:t>
+            </a:r>
+          </a:p>
+          <a:p>
+            <a:pPr algn="ctr"/>
+            <a:r>
+              <a:rPr lang="en-US" sz="1600" dirty="0">
+                <a:latin typeface="Biome Light" panose="020B0303030204020804" pitchFamily="34" charset="0"/>
+                <a:cs typeface="Biome Light" panose="020B0303030204020804" pitchFamily="34" charset="0"/>
+              </a:rPr>
+              <a:t>Write an article describing their findings</a:t>
+            </a:r>
+          </a:p>
+        </p:txBody>
+      </p:sp>
+      <p:sp>
+        <p:nvSpPr>
+          <p:cNvPr id="10" name="TextBox 9">
+            <a:extLst>
+              <a:ext uri="{FF2B5EF4-FFF2-40B4-BE49-F238E27FC236}">
+                <a16:creationId xmlns:a16="http://schemas.microsoft.com/office/drawing/2014/main" id="{95180BA9-3454-574E-4241-B7D27D7608C6}"/>
+              </a:ext>
+            </a:extLst>
+          </p:cNvPr>
+          <p:cNvSpPr txBox="1"/>
+          <p:nvPr/>
+        </p:nvSpPr>
+        <p:spPr>
+          <a:xfrm>
+            <a:off x="8851900" y="5606871"/>
+            <a:ext cx="3200400" cy="861774"/>
+          </a:xfrm>
+          <a:prstGeom prst="rect">
+            <a:avLst/>
+          </a:prstGeom>
+          <a:solidFill>
+            <a:srgbClr val="E8E8E9"/>
+          </a:solidFill>
+        </p:spPr>
+        <p:txBody>
+          <a:bodyPr wrap="square" rtlCol="0">
+            <a:spAutoFit/>
+          </a:bodyPr>
+          <a:lstStyle/>
+          <a:p>
+            <a:pPr algn="ctr"/>
+            <a:r>
+              <a:rPr lang="en-US" dirty="0">
+                <a:latin typeface="Biome" panose="020B0503030204020804" pitchFamily="34" charset="0"/>
+                <a:cs typeface="Biome" panose="020B0503030204020804" pitchFamily="34" charset="0"/>
+              </a:rPr>
+              <a:t>Researchers</a:t>
+            </a:r>
+          </a:p>
+          <a:p>
+            <a:pPr algn="ctr"/>
+            <a:r>
+              <a:rPr lang="en-US" sz="1600" dirty="0">
+                <a:latin typeface="Biome Light" panose="020B0303030204020804" pitchFamily="34" charset="0"/>
+                <a:cs typeface="Biome Light" panose="020B0303030204020804" pitchFamily="34" charset="0"/>
+              </a:rPr>
+              <a:t>Submit their article to a peer-reviewed journal</a:t>
+            </a:r>
+          </a:p>
+        </p:txBody>
+      </p:sp>
+      <p:sp>
+        <p:nvSpPr>
+          <p:cNvPr id="14" name="TextBox 13">
+            <a:extLst>
+              <a:ext uri="{FF2B5EF4-FFF2-40B4-BE49-F238E27FC236}">
+                <a16:creationId xmlns:a16="http://schemas.microsoft.com/office/drawing/2014/main" id="{EC522CDF-FF91-1630-0CA1-2C3E078982FA}"/>
+              </a:ext>
+            </a:extLst>
+          </p:cNvPr>
+          <p:cNvSpPr txBox="1"/>
+          <p:nvPr/>
+        </p:nvSpPr>
+        <p:spPr>
+          <a:xfrm>
+            <a:off x="5626098" y="5594170"/>
+            <a:ext cx="3327401" cy="861774"/>
+          </a:xfrm>
+          <a:prstGeom prst="rect">
+            <a:avLst/>
+          </a:prstGeom>
+          <a:solidFill>
+            <a:srgbClr val="E8E8E9"/>
+          </a:solidFill>
+        </p:spPr>
+        <p:txBody>
+          <a:bodyPr wrap="square" rtlCol="0">
+            <a:spAutoFit/>
+          </a:bodyPr>
+          <a:lstStyle/>
+          <a:p>
+            <a:pPr algn="ctr"/>
+            <a:r>
+              <a:rPr lang="en-US" dirty="0">
+                <a:latin typeface="Biome" panose="020B0503030204020804" pitchFamily="34" charset="0"/>
+                <a:cs typeface="Biome" panose="020B0503030204020804" pitchFamily="34" charset="0"/>
+              </a:rPr>
+              <a:t>Selected experts</a:t>
+            </a:r>
+          </a:p>
+          <a:p>
+            <a:pPr algn="ctr"/>
+            <a:r>
+              <a:rPr lang="en-US" sz="1600" dirty="0">
+                <a:latin typeface="Biome Light" panose="020B0303030204020804" pitchFamily="34" charset="0"/>
+                <a:cs typeface="Biome Light" panose="020B0303030204020804" pitchFamily="34" charset="0"/>
+              </a:rPr>
+              <a:t>Read the article &amp; make publication decision </a:t>
+            </a:r>
+          </a:p>
+        </p:txBody>
+      </p:sp>
     </p:spTree>
     <p:extLst>
       <p:ext uri="{BB962C8B-B14F-4D97-AF65-F5344CB8AC3E}">

</xml_diff>

<commit_message>
Updated CO2 hunters slides
</commit_message>
<xml_diff>
--- a/outreach/games/CO2-hunters/CO2-hunters_slides.pptx
+++ b/outreach/games/CO2-hunters/CO2-hunters_slides.pptx
@@ -123,7 +123,7 @@
 <file path=ppt/revisionInfo.xml><?xml version="1.0" encoding="utf-8"?>
 <p1510:revInfo xmlns:a="http://schemas.openxmlformats.org/drawingml/2006/main" xmlns:r="http://schemas.openxmlformats.org/officeDocument/2006/relationships" xmlns:p1510="http://schemas.microsoft.com/office/powerpoint/2015/10/main">
   <p1510:revLst>
-    <p1510:client id="{51143CCF-75BA-4DA2-8285-2D5EBD2C5F7F}" v="7" dt="2025-12-11T12:47:44.550"/>
+    <p1510:client id="{51143CCF-75BA-4DA2-8285-2D5EBD2C5F7F}" v="8" dt="2025-12-11T12:57:12.693"/>
   </p1510:revLst>
 </p1510:revInfo>
 </file>
@@ -133,10 +133,49 @@
   <pc:docChgLst>
     <pc:chgData name="Federico  Dattila" userId="3fbddd6b-c98a-4780-9364-b5d8323ec50d" providerId="ADAL" clId="{74B85A1C-3F89-447F-BB10-160DA5B5EB87}"/>
     <pc:docChg chg="undo custSel modSld">
-      <pc:chgData name="Federico  Dattila" userId="3fbddd6b-c98a-4780-9364-b5d8323ec50d" providerId="ADAL" clId="{74B85A1C-3F89-447F-BB10-160DA5B5EB87}" dt="2025-12-11T12:47:56.527" v="406" actId="404"/>
+      <pc:chgData name="Federico  Dattila" userId="3fbddd6b-c98a-4780-9364-b5d8323ec50d" providerId="ADAL" clId="{74B85A1C-3F89-447F-BB10-160DA5B5EB87}" dt="2025-12-11T12:57:21.719" v="433" actId="1035"/>
       <pc:docMkLst>
         <pc:docMk/>
       </pc:docMkLst>
+      <pc:sldChg chg="addSp modSp mod">
+        <pc:chgData name="Federico  Dattila" userId="3fbddd6b-c98a-4780-9364-b5d8323ec50d" providerId="ADAL" clId="{74B85A1C-3F89-447F-BB10-160DA5B5EB87}" dt="2025-12-11T12:57:21.719" v="433" actId="1035"/>
+        <pc:sldMkLst>
+          <pc:docMk/>
+          <pc:sldMk cId="0" sldId="256"/>
+        </pc:sldMkLst>
+        <pc:spChg chg="mod">
+          <ac:chgData name="Federico  Dattila" userId="3fbddd6b-c98a-4780-9364-b5d8323ec50d" providerId="ADAL" clId="{74B85A1C-3F89-447F-BB10-160DA5B5EB87}" dt="2025-12-11T12:57:21.719" v="433" actId="1035"/>
+          <ac:spMkLst>
+            <pc:docMk/>
+            <pc:sldMk cId="0" sldId="256"/>
+            <ac:spMk id="7" creationId="{09495CBD-24A4-452D-97B2-D96D38B4BC8A}"/>
+          </ac:spMkLst>
+        </pc:spChg>
+        <pc:spChg chg="mod">
+          <ac:chgData name="Federico  Dattila" userId="3fbddd6b-c98a-4780-9364-b5d8323ec50d" providerId="ADAL" clId="{74B85A1C-3F89-447F-BB10-160DA5B5EB87}" dt="2025-12-11T12:57:21.719" v="433" actId="1035"/>
+          <ac:spMkLst>
+            <pc:docMk/>
+            <pc:sldMk cId="0" sldId="256"/>
+            <ac:spMk id="9" creationId="{0E91CB7C-6CAE-460B-8B21-F46E73BF512A}"/>
+          </ac:spMkLst>
+        </pc:spChg>
+        <pc:picChg chg="add mod">
+          <ac:chgData name="Federico  Dattila" userId="3fbddd6b-c98a-4780-9364-b5d8323ec50d" providerId="ADAL" clId="{74B85A1C-3F89-447F-BB10-160DA5B5EB87}" dt="2025-12-11T12:57:12.693" v="407"/>
+          <ac:picMkLst>
+            <pc:docMk/>
+            <pc:sldMk cId="0" sldId="256"/>
+            <ac:picMk id="2" creationId="{FDB67FFE-86BA-EF33-B854-1354DA43ACAB}"/>
+          </ac:picMkLst>
+        </pc:picChg>
+        <pc:picChg chg="add mod">
+          <ac:chgData name="Federico  Dattila" userId="3fbddd6b-c98a-4780-9364-b5d8323ec50d" providerId="ADAL" clId="{74B85A1C-3F89-447F-BB10-160DA5B5EB87}" dt="2025-12-11T12:57:12.693" v="407"/>
+          <ac:picMkLst>
+            <pc:docMk/>
+            <pc:sldMk cId="0" sldId="256"/>
+            <ac:picMk id="3" creationId="{2BB815F2-986F-6FAC-0426-52CBD25955DB}"/>
+          </ac:picMkLst>
+        </pc:picChg>
+      </pc:sldChg>
       <pc:sldChg chg="addSp delSp modSp mod">
         <pc:chgData name="Federico  Dattila" userId="3fbddd6b-c98a-4780-9364-b5d8323ec50d" providerId="ADAL" clId="{74B85A1C-3F89-447F-BB10-160DA5B5EB87}" dt="2025-12-11T12:47:56.527" v="406" actId="404"/>
         <pc:sldMkLst>
@@ -3134,7 +3173,7 @@
         </p:nvSpPr>
         <p:spPr>
           <a:xfrm>
-            <a:off x="0" y="1158294"/>
+            <a:off x="0" y="1597206"/>
             <a:ext cx="12192000" cy="3108543"/>
           </a:xfrm>
           <a:prstGeom prst="rect">
@@ -3242,7 +3281,7 @@
         </p:nvSpPr>
         <p:spPr>
           <a:xfrm>
-            <a:off x="-2837" y="4894045"/>
+            <a:off x="-2837" y="5332957"/>
             <a:ext cx="12191696" cy="1077218"/>
           </a:xfrm>
           <a:prstGeom prst="rect">
@@ -3303,6 +3342,87 @@
           </a:p>
         </p:txBody>
       </p:sp>
+      <p:pic>
+        <p:nvPicPr>
+          <p:cNvPr id="2" name="Picture 1" descr="A black text on a black background&#10;&#10;AI-generated content may be incorrect.">
+            <a:extLst>
+              <a:ext uri="{FF2B5EF4-FFF2-40B4-BE49-F238E27FC236}">
+                <a16:creationId xmlns:a16="http://schemas.microsoft.com/office/drawing/2014/main" id="{FDB67FFE-86BA-EF33-B854-1354DA43ACAB}"/>
+              </a:ext>
+            </a:extLst>
+          </p:cNvPr>
+          <p:cNvPicPr>
+            <a:picLocks noChangeAspect="1"/>
+          </p:cNvPicPr>
+          <p:nvPr/>
+        </p:nvPicPr>
+        <p:blipFill rotWithShape="1">
+          <a:blip r:embed="rId2">
+            <a:extLst>
+              <a:ext uri="{28A0092B-C50C-407E-A947-70E740481C1C}">
+                <a14:useLocalDpi xmlns:a14="http://schemas.microsoft.com/office/drawing/2010/main" val="0"/>
+              </a:ext>
+            </a:extLst>
+          </a:blip>
+          <a:srcRect l="10858" t="16907" r="11006" b="27999"/>
+          <a:stretch>
+            <a:fillRect/>
+          </a:stretch>
+        </p:blipFill>
+        <p:spPr bwMode="auto">
+          <a:xfrm>
+            <a:off x="344647" y="137320"/>
+            <a:ext cx="4925437" cy="1056694"/>
+          </a:xfrm>
+          <a:prstGeom prst="rect">
+            <a:avLst/>
+          </a:prstGeom>
+          <a:ln>
+            <a:noFill/>
+          </a:ln>
+          <a:extLst>
+            <a:ext uri="{53640926-AAD7-44D8-BBD7-CCE9431645EC}">
+              <a14:shadowObscured xmlns:a14="http://schemas.microsoft.com/office/drawing/2010/main"/>
+            </a:ext>
+          </a:extLst>
+        </p:spPr>
+      </p:pic>
+      <p:pic>
+        <p:nvPicPr>
+          <p:cNvPr id="3" name="Picture 2" descr="A logo with text on it&#10;&#10;AI-generated content may be incorrect.">
+            <a:extLst>
+              <a:ext uri="{FF2B5EF4-FFF2-40B4-BE49-F238E27FC236}">
+                <a16:creationId xmlns:a16="http://schemas.microsoft.com/office/drawing/2014/main" id="{2BB815F2-986F-6FAC-0426-52CBD25955DB}"/>
+              </a:ext>
+            </a:extLst>
+          </p:cNvPr>
+          <p:cNvPicPr>
+            <a:picLocks noChangeAspect="1"/>
+          </p:cNvPicPr>
+          <p:nvPr/>
+        </p:nvPicPr>
+        <p:blipFill>
+          <a:blip r:embed="rId3">
+            <a:extLst>
+              <a:ext uri="{28A0092B-C50C-407E-A947-70E740481C1C}">
+                <a14:useLocalDpi xmlns:a14="http://schemas.microsoft.com/office/drawing/2010/main" val="0"/>
+              </a:ext>
+            </a:extLst>
+          </a:blip>
+          <a:stretch>
+            <a:fillRect/>
+          </a:stretch>
+        </p:blipFill>
+        <p:spPr>
+          <a:xfrm>
+            <a:off x="7054096" y="21432"/>
+            <a:ext cx="4801442" cy="1257299"/>
+          </a:xfrm>
+          <a:prstGeom prst="rect">
+            <a:avLst/>
+          </a:prstGeom>
+        </p:spPr>
+      </p:pic>
     </p:spTree>
   </p:cSld>
   <p:clrMapOvr>

</xml_diff>